<commit_message>
/ ‘ntp/ntp-service.pdf’ / ‘ntp/ntp-service.pptx’
</commit_message>
<xml_diff>
--- a/ntp/ntp-service.pptx
+++ b/ntp/ntp-service.pptx
@@ -5,7 +5,7 @@
     <p:sldMasterId id="2147483648" r:id="rId1"/>
   </p:sldMasterIdLst>
   <p:notesMasterIdLst>
-    <p:notesMasterId r:id="rId18"/>
+    <p:notesMasterId r:id="rId19"/>
   </p:notesMasterIdLst>
   <p:sldIdLst>
     <p:sldId id="256" r:id="rId2"/>
@@ -20,10 +20,11 @@
     <p:sldId id="278" r:id="rId11"/>
     <p:sldId id="265" r:id="rId12"/>
     <p:sldId id="279" r:id="rId13"/>
-    <p:sldId id="280" r:id="rId14"/>
-    <p:sldId id="262" r:id="rId15"/>
-    <p:sldId id="270" r:id="rId16"/>
-    <p:sldId id="272" r:id="rId17"/>
+    <p:sldId id="281" r:id="rId14"/>
+    <p:sldId id="280" r:id="rId15"/>
+    <p:sldId id="262" r:id="rId16"/>
+    <p:sldId id="270" r:id="rId17"/>
+    <p:sldId id="272" r:id="rId18"/>
   </p:sldIdLst>
   <p:sldSz cx="10080625" cy="7559675"/>
   <p:notesSz cx="7772400" cy="10058400"/>
@@ -4156,6 +4157,562 @@
     </p:spTree>
     <p:extLst>
       <p:ext uri="{BB962C8B-B14F-4D97-AF65-F5344CB8AC3E}">
+        <p14:creationId xmlns:p14="http://schemas.microsoft.com/office/powerpoint/2010/main" val="441587734"/>
+      </p:ext>
+    </p:extLst>
+  </p:cSld>
+  <p:clrMapOvr>
+    <a:masterClrMapping/>
+  </p:clrMapOvr>
+</p:notes>
+</file>
+
+<file path=ppt/notesSlides/notesSlide14.xml><?xml version="1.0" encoding="utf-8"?>
+<p:notes xmlns:a="http://schemas.openxmlformats.org/drawingml/2006/main" xmlns:r="http://schemas.openxmlformats.org/officeDocument/2006/relationships" xmlns:p="http://schemas.openxmlformats.org/presentationml/2006/main">
+  <p:cSld>
+    <p:bg>
+      <p:bgPr>
+        <a:solidFill>
+          <a:srgbClr val="FFFFFF"/>
+        </a:solidFill>
+        <a:effectLst/>
+      </p:bgPr>
+    </p:bg>
+    <p:spTree>
+      <p:nvGrpSpPr>
+        <p:cNvPr id="1" name=""/>
+        <p:cNvGrpSpPr/>
+        <p:nvPr/>
+      </p:nvGrpSpPr>
+      <p:grpSpPr>
+        <a:xfrm>
+          <a:off x="0" y="0"/>
+          <a:ext cx="0" cy="0"/>
+          <a:chOff x="0" y="0"/>
+          <a:chExt cx="0" cy="0"/>
+        </a:xfrm>
+      </p:grpSpPr>
+      <p:sp>
+        <p:nvSpPr>
+          <p:cNvPr id="4" name="Rectangle 8"/>
+          <p:cNvSpPr>
+            <a:spLocks noGrp="1" noChangeArrowheads="1"/>
+          </p:cNvSpPr>
+          <p:nvPr>
+            <p:ph type="sldNum" sz="quarter"/>
+          </p:nvPr>
+        </p:nvSpPr>
+        <p:spPr>
+          <a:extLst>
+            <a:ext uri="{909E8E84-426E-40dd-AFC4-6F175D3DCCD1}">
+              <a14:hiddenFill xmlns:a14="http://schemas.microsoft.com/office/drawing/2010/main" xmlns="">
+                <a:solidFill>
+                  <a:srgbClr val="FFFFFF"/>
+                </a:solidFill>
+              </a14:hiddenFill>
+            </a:ext>
+            <a:ext uri="{91240B29-F687-4f45-9708-019B960494DF}">
+              <a14:hiddenLine xmlns:a14="http://schemas.microsoft.com/office/drawing/2010/main" xmlns="" w="9525" cap="flat">
+                <a:solidFill>
+                  <a:srgbClr val="3465A4"/>
+                </a:solidFill>
+                <a:round/>
+                <a:headEnd/>
+                <a:tailEnd/>
+              </a14:hiddenLine>
+            </a:ext>
+            <a:ext uri="{AF507438-7753-43e0-B8FC-AC1667EBCBE1}">
+              <a14:hiddenEffects xmlns:a14="http://schemas.microsoft.com/office/drawing/2010/main" xmlns="">
+                <a:effectLst>
+                  <a:outerShdw blurRad="63500" dist="38099" dir="2700000" algn="ctr" rotWithShape="0">
+                    <a:schemeClr val="bg2">
+                      <a:alpha val="74998"/>
+                    </a:schemeClr>
+                  </a:outerShdw>
+                </a:effectLst>
+              </a14:hiddenEffects>
+            </a:ext>
+          </a:extLst>
+        </p:spPr>
+        <p:txBody>
+          <a:bodyPr/>
+          <a:lstStyle>
+            <a:lvl1pPr eaLnBrk="0">
+              <a:tabLst>
+                <a:tab pos="0" algn="l"/>
+                <a:tab pos="457200" algn="l"/>
+                <a:tab pos="914400" algn="l"/>
+                <a:tab pos="1371600" algn="l"/>
+                <a:tab pos="1828800" algn="l"/>
+                <a:tab pos="2286000" algn="l"/>
+                <a:tab pos="2743200" algn="l"/>
+                <a:tab pos="3200400" algn="l"/>
+                <a:tab pos="3657600" algn="l"/>
+                <a:tab pos="4114800" algn="l"/>
+                <a:tab pos="4572000" algn="l"/>
+                <a:tab pos="5029200" algn="l"/>
+                <a:tab pos="5486400" algn="l"/>
+                <a:tab pos="5943600" algn="l"/>
+                <a:tab pos="6400800" algn="l"/>
+                <a:tab pos="6858000" algn="l"/>
+                <a:tab pos="7315200" algn="l"/>
+                <a:tab pos="7772400" algn="l"/>
+                <a:tab pos="8229600" algn="l"/>
+                <a:tab pos="8686800" algn="l"/>
+                <a:tab pos="9144000" algn="l"/>
+              </a:tabLst>
+              <a:defRPr sz="2400">
+                <a:solidFill>
+                  <a:schemeClr val="bg1"/>
+                </a:solidFill>
+                <a:latin typeface="Arial" charset="0"/>
+                <a:ea typeface="ＭＳ Ｐゴシック" charset="-128"/>
+              </a:defRPr>
+            </a:lvl1pPr>
+            <a:lvl2pPr eaLnBrk="0">
+              <a:tabLst>
+                <a:tab pos="0" algn="l"/>
+                <a:tab pos="457200" algn="l"/>
+                <a:tab pos="914400" algn="l"/>
+                <a:tab pos="1371600" algn="l"/>
+                <a:tab pos="1828800" algn="l"/>
+                <a:tab pos="2286000" algn="l"/>
+                <a:tab pos="2743200" algn="l"/>
+                <a:tab pos="3200400" algn="l"/>
+                <a:tab pos="3657600" algn="l"/>
+                <a:tab pos="4114800" algn="l"/>
+                <a:tab pos="4572000" algn="l"/>
+                <a:tab pos="5029200" algn="l"/>
+                <a:tab pos="5486400" algn="l"/>
+                <a:tab pos="5943600" algn="l"/>
+                <a:tab pos="6400800" algn="l"/>
+                <a:tab pos="6858000" algn="l"/>
+                <a:tab pos="7315200" algn="l"/>
+                <a:tab pos="7772400" algn="l"/>
+                <a:tab pos="8229600" algn="l"/>
+                <a:tab pos="8686800" algn="l"/>
+                <a:tab pos="9144000" algn="l"/>
+              </a:tabLst>
+              <a:defRPr sz="2400">
+                <a:solidFill>
+                  <a:schemeClr val="bg1"/>
+                </a:solidFill>
+                <a:latin typeface="Arial" charset="0"/>
+                <a:ea typeface="ＭＳ Ｐゴシック" charset="-128"/>
+              </a:defRPr>
+            </a:lvl2pPr>
+            <a:lvl3pPr eaLnBrk="0">
+              <a:tabLst>
+                <a:tab pos="0" algn="l"/>
+                <a:tab pos="457200" algn="l"/>
+                <a:tab pos="914400" algn="l"/>
+                <a:tab pos="1371600" algn="l"/>
+                <a:tab pos="1828800" algn="l"/>
+                <a:tab pos="2286000" algn="l"/>
+                <a:tab pos="2743200" algn="l"/>
+                <a:tab pos="3200400" algn="l"/>
+                <a:tab pos="3657600" algn="l"/>
+                <a:tab pos="4114800" algn="l"/>
+                <a:tab pos="4572000" algn="l"/>
+                <a:tab pos="5029200" algn="l"/>
+                <a:tab pos="5486400" algn="l"/>
+                <a:tab pos="5943600" algn="l"/>
+                <a:tab pos="6400800" algn="l"/>
+                <a:tab pos="6858000" algn="l"/>
+                <a:tab pos="7315200" algn="l"/>
+                <a:tab pos="7772400" algn="l"/>
+                <a:tab pos="8229600" algn="l"/>
+                <a:tab pos="8686800" algn="l"/>
+                <a:tab pos="9144000" algn="l"/>
+              </a:tabLst>
+              <a:defRPr sz="2400">
+                <a:solidFill>
+                  <a:schemeClr val="bg1"/>
+                </a:solidFill>
+                <a:latin typeface="Arial" charset="0"/>
+                <a:ea typeface="ＭＳ Ｐゴシック" charset="-128"/>
+              </a:defRPr>
+            </a:lvl3pPr>
+            <a:lvl4pPr eaLnBrk="0">
+              <a:tabLst>
+                <a:tab pos="0" algn="l"/>
+                <a:tab pos="457200" algn="l"/>
+                <a:tab pos="914400" algn="l"/>
+                <a:tab pos="1371600" algn="l"/>
+                <a:tab pos="1828800" algn="l"/>
+                <a:tab pos="2286000" algn="l"/>
+                <a:tab pos="2743200" algn="l"/>
+                <a:tab pos="3200400" algn="l"/>
+                <a:tab pos="3657600" algn="l"/>
+                <a:tab pos="4114800" algn="l"/>
+                <a:tab pos="4572000" algn="l"/>
+                <a:tab pos="5029200" algn="l"/>
+                <a:tab pos="5486400" algn="l"/>
+                <a:tab pos="5943600" algn="l"/>
+                <a:tab pos="6400800" algn="l"/>
+                <a:tab pos="6858000" algn="l"/>
+                <a:tab pos="7315200" algn="l"/>
+                <a:tab pos="7772400" algn="l"/>
+                <a:tab pos="8229600" algn="l"/>
+                <a:tab pos="8686800" algn="l"/>
+                <a:tab pos="9144000" algn="l"/>
+              </a:tabLst>
+              <a:defRPr sz="2400">
+                <a:solidFill>
+                  <a:schemeClr val="bg1"/>
+                </a:solidFill>
+                <a:latin typeface="Arial" charset="0"/>
+                <a:ea typeface="ＭＳ Ｐゴシック" charset="-128"/>
+              </a:defRPr>
+            </a:lvl4pPr>
+            <a:lvl5pPr eaLnBrk="0">
+              <a:tabLst>
+                <a:tab pos="0" algn="l"/>
+                <a:tab pos="457200" algn="l"/>
+                <a:tab pos="914400" algn="l"/>
+                <a:tab pos="1371600" algn="l"/>
+                <a:tab pos="1828800" algn="l"/>
+                <a:tab pos="2286000" algn="l"/>
+                <a:tab pos="2743200" algn="l"/>
+                <a:tab pos="3200400" algn="l"/>
+                <a:tab pos="3657600" algn="l"/>
+                <a:tab pos="4114800" algn="l"/>
+                <a:tab pos="4572000" algn="l"/>
+                <a:tab pos="5029200" algn="l"/>
+                <a:tab pos="5486400" algn="l"/>
+                <a:tab pos="5943600" algn="l"/>
+                <a:tab pos="6400800" algn="l"/>
+                <a:tab pos="6858000" algn="l"/>
+                <a:tab pos="7315200" algn="l"/>
+                <a:tab pos="7772400" algn="l"/>
+                <a:tab pos="8229600" algn="l"/>
+                <a:tab pos="8686800" algn="l"/>
+                <a:tab pos="9144000" algn="l"/>
+              </a:tabLst>
+              <a:defRPr sz="2400">
+                <a:solidFill>
+                  <a:schemeClr val="bg1"/>
+                </a:solidFill>
+                <a:latin typeface="Arial" charset="0"/>
+                <a:ea typeface="ＭＳ Ｐゴシック" charset="-128"/>
+              </a:defRPr>
+            </a:lvl5pPr>
+            <a:lvl6pPr marL="2514600" indent="-228600" defTabSz="457200" eaLnBrk="0" fontAlgn="base" hangingPunct="0">
+              <a:lnSpc>
+                <a:spcPct val="96000"/>
+              </a:lnSpc>
+              <a:spcBef>
+                <a:spcPct val="0"/>
+              </a:spcBef>
+              <a:spcAft>
+                <a:spcPct val="0"/>
+              </a:spcAft>
+              <a:buClr>
+                <a:srgbClr val="000000"/>
+              </a:buClr>
+              <a:buSzPct val="100000"/>
+              <a:buFont typeface="Times New Roman" charset="0"/>
+              <a:tabLst>
+                <a:tab pos="0" algn="l"/>
+                <a:tab pos="457200" algn="l"/>
+                <a:tab pos="914400" algn="l"/>
+                <a:tab pos="1371600" algn="l"/>
+                <a:tab pos="1828800" algn="l"/>
+                <a:tab pos="2286000" algn="l"/>
+                <a:tab pos="2743200" algn="l"/>
+                <a:tab pos="3200400" algn="l"/>
+                <a:tab pos="3657600" algn="l"/>
+                <a:tab pos="4114800" algn="l"/>
+                <a:tab pos="4572000" algn="l"/>
+                <a:tab pos="5029200" algn="l"/>
+                <a:tab pos="5486400" algn="l"/>
+                <a:tab pos="5943600" algn="l"/>
+                <a:tab pos="6400800" algn="l"/>
+                <a:tab pos="6858000" algn="l"/>
+                <a:tab pos="7315200" algn="l"/>
+                <a:tab pos="7772400" algn="l"/>
+                <a:tab pos="8229600" algn="l"/>
+                <a:tab pos="8686800" algn="l"/>
+                <a:tab pos="9144000" algn="l"/>
+              </a:tabLst>
+              <a:defRPr sz="2400">
+                <a:solidFill>
+                  <a:schemeClr val="bg1"/>
+                </a:solidFill>
+                <a:latin typeface="Arial" charset="0"/>
+                <a:ea typeface="ＭＳ Ｐゴシック" charset="-128"/>
+              </a:defRPr>
+            </a:lvl6pPr>
+            <a:lvl7pPr marL="2971800" indent="-228600" defTabSz="457200" eaLnBrk="0" fontAlgn="base" hangingPunct="0">
+              <a:lnSpc>
+                <a:spcPct val="96000"/>
+              </a:lnSpc>
+              <a:spcBef>
+                <a:spcPct val="0"/>
+              </a:spcBef>
+              <a:spcAft>
+                <a:spcPct val="0"/>
+              </a:spcAft>
+              <a:buClr>
+                <a:srgbClr val="000000"/>
+              </a:buClr>
+              <a:buSzPct val="100000"/>
+              <a:buFont typeface="Times New Roman" charset="0"/>
+              <a:tabLst>
+                <a:tab pos="0" algn="l"/>
+                <a:tab pos="457200" algn="l"/>
+                <a:tab pos="914400" algn="l"/>
+                <a:tab pos="1371600" algn="l"/>
+                <a:tab pos="1828800" algn="l"/>
+                <a:tab pos="2286000" algn="l"/>
+                <a:tab pos="2743200" algn="l"/>
+                <a:tab pos="3200400" algn="l"/>
+                <a:tab pos="3657600" algn="l"/>
+                <a:tab pos="4114800" algn="l"/>
+                <a:tab pos="4572000" algn="l"/>
+                <a:tab pos="5029200" algn="l"/>
+                <a:tab pos="5486400" algn="l"/>
+                <a:tab pos="5943600" algn="l"/>
+                <a:tab pos="6400800" algn="l"/>
+                <a:tab pos="6858000" algn="l"/>
+                <a:tab pos="7315200" algn="l"/>
+                <a:tab pos="7772400" algn="l"/>
+                <a:tab pos="8229600" algn="l"/>
+                <a:tab pos="8686800" algn="l"/>
+                <a:tab pos="9144000" algn="l"/>
+              </a:tabLst>
+              <a:defRPr sz="2400">
+                <a:solidFill>
+                  <a:schemeClr val="bg1"/>
+                </a:solidFill>
+                <a:latin typeface="Arial" charset="0"/>
+                <a:ea typeface="ＭＳ Ｐゴシック" charset="-128"/>
+              </a:defRPr>
+            </a:lvl7pPr>
+            <a:lvl8pPr marL="3429000" indent="-228600" defTabSz="457200" eaLnBrk="0" fontAlgn="base" hangingPunct="0">
+              <a:lnSpc>
+                <a:spcPct val="96000"/>
+              </a:lnSpc>
+              <a:spcBef>
+                <a:spcPct val="0"/>
+              </a:spcBef>
+              <a:spcAft>
+                <a:spcPct val="0"/>
+              </a:spcAft>
+              <a:buClr>
+                <a:srgbClr val="000000"/>
+              </a:buClr>
+              <a:buSzPct val="100000"/>
+              <a:buFont typeface="Times New Roman" charset="0"/>
+              <a:tabLst>
+                <a:tab pos="0" algn="l"/>
+                <a:tab pos="457200" algn="l"/>
+                <a:tab pos="914400" algn="l"/>
+                <a:tab pos="1371600" algn="l"/>
+                <a:tab pos="1828800" algn="l"/>
+                <a:tab pos="2286000" algn="l"/>
+                <a:tab pos="2743200" algn="l"/>
+                <a:tab pos="3200400" algn="l"/>
+                <a:tab pos="3657600" algn="l"/>
+                <a:tab pos="4114800" algn="l"/>
+                <a:tab pos="4572000" algn="l"/>
+                <a:tab pos="5029200" algn="l"/>
+                <a:tab pos="5486400" algn="l"/>
+                <a:tab pos="5943600" algn="l"/>
+                <a:tab pos="6400800" algn="l"/>
+                <a:tab pos="6858000" algn="l"/>
+                <a:tab pos="7315200" algn="l"/>
+                <a:tab pos="7772400" algn="l"/>
+                <a:tab pos="8229600" algn="l"/>
+                <a:tab pos="8686800" algn="l"/>
+                <a:tab pos="9144000" algn="l"/>
+              </a:tabLst>
+              <a:defRPr sz="2400">
+                <a:solidFill>
+                  <a:schemeClr val="bg1"/>
+                </a:solidFill>
+                <a:latin typeface="Arial" charset="0"/>
+                <a:ea typeface="ＭＳ Ｐゴシック" charset="-128"/>
+              </a:defRPr>
+            </a:lvl8pPr>
+            <a:lvl9pPr marL="3886200" indent="-228600" defTabSz="457200" eaLnBrk="0" fontAlgn="base" hangingPunct="0">
+              <a:lnSpc>
+                <a:spcPct val="96000"/>
+              </a:lnSpc>
+              <a:spcBef>
+                <a:spcPct val="0"/>
+              </a:spcBef>
+              <a:spcAft>
+                <a:spcPct val="0"/>
+              </a:spcAft>
+              <a:buClr>
+                <a:srgbClr val="000000"/>
+              </a:buClr>
+              <a:buSzPct val="100000"/>
+              <a:buFont typeface="Times New Roman" charset="0"/>
+              <a:tabLst>
+                <a:tab pos="0" algn="l"/>
+                <a:tab pos="457200" algn="l"/>
+                <a:tab pos="914400" algn="l"/>
+                <a:tab pos="1371600" algn="l"/>
+                <a:tab pos="1828800" algn="l"/>
+                <a:tab pos="2286000" algn="l"/>
+                <a:tab pos="2743200" algn="l"/>
+                <a:tab pos="3200400" algn="l"/>
+                <a:tab pos="3657600" algn="l"/>
+                <a:tab pos="4114800" algn="l"/>
+                <a:tab pos="4572000" algn="l"/>
+                <a:tab pos="5029200" algn="l"/>
+                <a:tab pos="5486400" algn="l"/>
+                <a:tab pos="5943600" algn="l"/>
+                <a:tab pos="6400800" algn="l"/>
+                <a:tab pos="6858000" algn="l"/>
+                <a:tab pos="7315200" algn="l"/>
+                <a:tab pos="7772400" algn="l"/>
+                <a:tab pos="8229600" algn="l"/>
+                <a:tab pos="8686800" algn="l"/>
+                <a:tab pos="9144000" algn="l"/>
+              </a:tabLst>
+              <a:defRPr sz="2400">
+                <a:solidFill>
+                  <a:schemeClr val="bg1"/>
+                </a:solidFill>
+                <a:latin typeface="Arial" charset="0"/>
+                <a:ea typeface="ＭＳ Ｐゴシック" charset="-128"/>
+              </a:defRPr>
+            </a:lvl9pPr>
+          </a:lstStyle>
+          <a:p>
+            <a:pPr eaLnBrk="1"/>
+            <a:fld id="{AF151737-B980-9E47-B951-95A3861A1A5F}" type="slidenum">
+              <a:rPr lang="en-GB" altLang="x-none" sz="1400">
+                <a:solidFill>
+                  <a:srgbClr val="000000"/>
+                </a:solidFill>
+                <a:latin typeface="Times New Roman" charset="0"/>
+              </a:rPr>
+              <a:pPr eaLnBrk="1"/>
+              <a:t>14</a:t>
+            </a:fld>
+            <a:endParaRPr lang="en-GB" altLang="x-none" sz="1400">
+              <a:solidFill>
+                <a:srgbClr val="000000"/>
+              </a:solidFill>
+              <a:latin typeface="Times New Roman" charset="0"/>
+            </a:endParaRPr>
+          </a:p>
+        </p:txBody>
+      </p:sp>
+      <p:sp>
+        <p:nvSpPr>
+          <p:cNvPr id="29697" name="Text Box 1"/>
+          <p:cNvSpPr txBox="1">
+            <a:spLocks noGrp="1" noRot="1" noChangeAspect="1" noChangeArrowheads="1"/>
+          </p:cNvSpPr>
+          <p:nvPr>
+            <p:ph type="sldImg"/>
+          </p:nvPr>
+        </p:nvSpPr>
+        <p:spPr>
+          <a:xfrm>
+            <a:off x="1371600" y="763588"/>
+            <a:ext cx="5027613" cy="3770312"/>
+          </a:xfrm>
+          <a:solidFill>
+            <a:srgbClr val="FFFFFF"/>
+          </a:solidFill>
+          <a:ln>
+            <a:solidFill>
+              <a:srgbClr val="000000"/>
+            </a:solidFill>
+            <a:miter lim="800000"/>
+            <a:headEnd/>
+            <a:tailEnd/>
+          </a:ln>
+          <a:extLst>
+            <a:ext uri="{AF507438-7753-43e0-B8FC-AC1667EBCBE1}">
+              <a14:hiddenEffects xmlns:a14="http://schemas.microsoft.com/office/drawing/2010/main" xmlns="">
+                <a:effectLst>
+                  <a:outerShdw blurRad="63500" dist="38099" dir="2700000" algn="ctr" rotWithShape="0">
+                    <a:srgbClr val="000000">
+                      <a:alpha val="74998"/>
+                    </a:srgbClr>
+                  </a:outerShdw>
+                </a:effectLst>
+              </a14:hiddenEffects>
+            </a:ext>
+          </a:extLst>
+        </p:spPr>
+      </p:sp>
+      <p:sp>
+        <p:nvSpPr>
+          <p:cNvPr id="29698" name="Text Box 2"/>
+          <p:cNvSpPr txBox="1">
+            <a:spLocks noChangeArrowheads="1"/>
+          </p:cNvSpPr>
+          <p:nvPr/>
+        </p:nvSpPr>
+        <p:spPr bwMode="auto">
+          <a:xfrm>
+            <a:off x="777875" y="4776788"/>
+            <a:ext cx="6216650" cy="4524375"/>
+          </a:xfrm>
+          <a:prstGeom prst="rect">
+            <a:avLst/>
+          </a:prstGeom>
+          <a:noFill/>
+          <a:ln>
+            <a:noFill/>
+          </a:ln>
+          <a:effectLst/>
+          <a:extLst>
+            <a:ext uri="{909E8E84-426E-40dd-AFC4-6F175D3DCCD1}">
+              <a14:hiddenFill xmlns:a14="http://schemas.microsoft.com/office/drawing/2010/main" xmlns="">
+                <a:solidFill>
+                  <a:srgbClr val="FFFFFF"/>
+                </a:solidFill>
+              </a14:hiddenFill>
+            </a:ext>
+            <a:ext uri="{91240B29-F687-4f45-9708-019B960494DF}">
+              <a14:hiddenLine xmlns:a14="http://schemas.microsoft.com/office/drawing/2010/main" xmlns="" w="9525" cap="flat">
+                <a:solidFill>
+                  <a:srgbClr val="3465A4"/>
+                </a:solidFill>
+                <a:round/>
+                <a:headEnd/>
+                <a:tailEnd/>
+              </a14:hiddenLine>
+            </a:ext>
+            <a:ext uri="{AF507438-7753-43e0-B8FC-AC1667EBCBE1}">
+              <a14:hiddenEffects xmlns:a14="http://schemas.microsoft.com/office/drawing/2010/main" xmlns="">
+                <a:effectLst>
+                  <a:outerShdw blurRad="63500" dist="38099" dir="2700000" algn="ctr" rotWithShape="0">
+                    <a:srgbClr val="000000">
+                      <a:alpha val="74998"/>
+                    </a:srgbClr>
+                  </a:outerShdw>
+                </a:effectLst>
+              </a14:hiddenEffects>
+            </a:ext>
+          </a:extLst>
+        </p:spPr>
+        <p:txBody>
+          <a:bodyPr wrap="none" anchor="ctr"/>
+          <a:lstStyle/>
+          <a:p>
+            <a:pPr>
+              <a:defRPr/>
+            </a:pPr>
+            <a:endParaRPr lang="en-US">
+              <a:ea typeface="ＭＳ Ｐゴシック" charset="0"/>
+              <a:cs typeface="DejaVu Sans" charset="0"/>
+            </a:endParaRPr>
+          </a:p>
+        </p:txBody>
+      </p:sp>
+    </p:spTree>
+    <p:extLst>
+      <p:ext uri="{BB962C8B-B14F-4D97-AF65-F5344CB8AC3E}">
         <p14:creationId xmlns:p14="http://schemas.microsoft.com/office/powerpoint/2010/main" val="434389555"/>
       </p:ext>
     </p:extLst>
@@ -4166,7 +4723,7 @@
 </p:notes>
 </file>
 
-<file path=ppt/notesSlides/notesSlide14.xml><?xml version="1.0" encoding="utf-8"?>
+<file path=ppt/notesSlides/notesSlide15.xml><?xml version="1.0" encoding="utf-8"?>
 <p:notes xmlns:a="http://schemas.openxmlformats.org/drawingml/2006/main" xmlns:r="http://schemas.openxmlformats.org/officeDocument/2006/relationships" xmlns:p="http://schemas.openxmlformats.org/presentationml/2006/main">
   <p:cSld>
     <p:bg>
@@ -4591,7 +5148,7 @@
                 <a:latin typeface="Times New Roman" charset="0"/>
               </a:rPr>
               <a:pPr eaLnBrk="1"/>
-              <a:t>14</a:t>
+              <a:t>15</a:t>
             </a:fld>
             <a:endParaRPr lang="en-GB" altLang="x-none" sz="1400">
               <a:solidFill>
@@ -5022,7 +5579,7 @@
                 <a:buFontTx/>
                 <a:buNone/>
               </a:pPr>
-              <a:t>14</a:t>
+              <a:t>15</a:t>
             </a:fld>
             <a:endParaRPr lang="en-GB" altLang="x-none" sz="1400">
               <a:solidFill>
@@ -5148,7 +5705,7 @@
 </p:notes>
 </file>
 
-<file path=ppt/notesSlides/notesSlide15.xml><?xml version="1.0" encoding="utf-8"?>
+<file path=ppt/notesSlides/notesSlide16.xml><?xml version="1.0" encoding="utf-8"?>
 <p:notes xmlns:a="http://schemas.openxmlformats.org/drawingml/2006/main" xmlns:r="http://schemas.openxmlformats.org/officeDocument/2006/relationships" xmlns:p="http://schemas.openxmlformats.org/presentationml/2006/main">
   <p:cSld>
     <p:bg>
@@ -5573,7 +6130,7 @@
                 <a:latin typeface="Times New Roman" charset="0"/>
               </a:rPr>
               <a:pPr eaLnBrk="1"/>
-              <a:t>15</a:t>
+              <a:t>16</a:t>
             </a:fld>
             <a:endParaRPr lang="en-GB" altLang="x-none" sz="1400">
               <a:solidFill>
@@ -6004,7 +6561,7 @@
                 <a:buFontTx/>
                 <a:buNone/>
               </a:pPr>
-              <a:t>15</a:t>
+              <a:t>16</a:t>
             </a:fld>
             <a:endParaRPr lang="en-GB" altLang="x-none" sz="1400">
               <a:solidFill>
@@ -6130,7 +6687,7 @@
 </p:notes>
 </file>
 
-<file path=ppt/notesSlides/notesSlide16.xml><?xml version="1.0" encoding="utf-8"?>
+<file path=ppt/notesSlides/notesSlide17.xml><?xml version="1.0" encoding="utf-8"?>
 <p:notes xmlns:a="http://schemas.openxmlformats.org/drawingml/2006/main" xmlns:r="http://schemas.openxmlformats.org/officeDocument/2006/relationships" xmlns:p="http://schemas.openxmlformats.org/presentationml/2006/main">
   <p:cSld>
     <p:bg>
@@ -6555,7 +7112,7 @@
                 <a:latin typeface="Times New Roman" charset="0"/>
               </a:rPr>
               <a:pPr eaLnBrk="1"/>
-              <a:t>16</a:t>
+              <a:t>17</a:t>
             </a:fld>
             <a:endParaRPr lang="en-GB" altLang="x-none" sz="1400">
               <a:solidFill>
@@ -16774,7 +17331,7 @@
         </p:nvSpPr>
         <p:spPr>
           <a:xfrm>
-            <a:off x="1154112" y="2179637"/>
+            <a:off x="1154112" y="2103437"/>
             <a:ext cx="7924800" cy="1510670"/>
           </a:xfrm>
           <a:prstGeom prst="rect">
@@ -16927,7 +17484,7 @@
         </p:nvSpPr>
         <p:spPr>
           <a:xfrm>
-            <a:off x="1146174" y="4230119"/>
+            <a:off x="1146174" y="4160837"/>
             <a:ext cx="7932738" cy="1510670"/>
           </a:xfrm>
           <a:prstGeom prst="rect">
@@ -18150,8 +18707,8 @@
         </p:nvSpPr>
         <p:spPr>
           <a:xfrm>
-            <a:off x="925512" y="4262437"/>
-            <a:ext cx="8648701" cy="978729"/>
+            <a:off x="925512" y="4084637"/>
+            <a:ext cx="8648701" cy="1274195"/>
           </a:xfrm>
           <a:prstGeom prst="rect">
             <a:avLst/>
@@ -18167,95 +18724,302 @@
           <a:lstStyle/>
           <a:p>
             <a:r>
-              <a:rPr lang="en-US" sz="2000" dirty="0"/>
-              <a:t># By default, exchange time with everybody, but don't allow configuration.</a:t>
+              <a:rPr lang="en-US" sz="2000" dirty="0">
+                <a:solidFill>
+                  <a:schemeClr val="tx1"/>
+                </a:solidFill>
+                <a:latin typeface="Courier" charset="0"/>
+                <a:ea typeface="Courier" charset="0"/>
+                <a:cs typeface="Courier" charset="0"/>
+              </a:rPr>
+              <a:t># By default, exchange time with everybody, but </a:t>
+            </a:r>
+            <a:r>
+              <a:rPr lang="en-US" sz="2000" dirty="0" smtClean="0">
+                <a:solidFill>
+                  <a:schemeClr val="tx1"/>
+                </a:solidFill>
+                <a:latin typeface="Courier" charset="0"/>
+                <a:ea typeface="Courier" charset="0"/>
+                <a:cs typeface="Courier" charset="0"/>
+              </a:rPr>
+              <a:t>don't</a:t>
             </a:r>
           </a:p>
           <a:p>
             <a:r>
-              <a:rPr lang="en-US" sz="2000" dirty="0"/>
-              <a:t>restrict -4 default </a:t>
-            </a:r>
-            <a:r>
-              <a:rPr lang="en-US" sz="2000" dirty="0" err="1"/>
-              <a:t>kod</a:t>
-            </a:r>
-            <a:r>
-              <a:rPr lang="en-US" sz="2000" dirty="0"/>
+              <a:rPr lang="en-US" sz="2000" dirty="0">
+                <a:solidFill>
+                  <a:schemeClr val="tx1"/>
+                </a:solidFill>
+                <a:latin typeface="Courier" charset="0"/>
+                <a:ea typeface="Courier" charset="0"/>
+                <a:cs typeface="Courier" charset="0"/>
+              </a:rPr>
+              <a:t>#</a:t>
+            </a:r>
+            <a:r>
+              <a:rPr lang="en-US" sz="2000" dirty="0" smtClean="0">
+                <a:solidFill>
+                  <a:schemeClr val="tx1"/>
+                </a:solidFill>
+                <a:latin typeface="Courier" charset="0"/>
+                <a:ea typeface="Courier" charset="0"/>
+                <a:cs typeface="Courier" charset="0"/>
+              </a:rPr>
               <a:t> </a:t>
             </a:r>
             <a:r>
-              <a:rPr lang="en-US" sz="2000" dirty="0" err="1"/>
-              <a:t>notrap</a:t>
-            </a:r>
-            <a:r>
-              <a:rPr lang="en-US" sz="2000" dirty="0"/>
-              <a:t> </a:t>
-            </a:r>
-            <a:r>
-              <a:rPr lang="en-US" sz="2000" dirty="0" err="1"/>
-              <a:t>nomodify</a:t>
-            </a:r>
-            <a:r>
-              <a:rPr lang="en-US" sz="2000" dirty="0"/>
-              <a:t> </a:t>
-            </a:r>
-            <a:r>
-              <a:rPr lang="en-US" sz="2000" dirty="0" err="1"/>
-              <a:t>nopeer</a:t>
-            </a:r>
-            <a:r>
-              <a:rPr lang="en-US" sz="2000" dirty="0"/>
-              <a:t> </a:t>
-            </a:r>
-            <a:r>
-              <a:rPr lang="en-US" sz="2000" dirty="0" err="1"/>
-              <a:t>noquery</a:t>
-            </a:r>
-            <a:endParaRPr lang="en-US" sz="2000" dirty="0"/>
+              <a:rPr lang="en-US" sz="2000" dirty="0">
+                <a:solidFill>
+                  <a:schemeClr val="tx1"/>
+                </a:solidFill>
+                <a:latin typeface="Courier" charset="0"/>
+                <a:ea typeface="Courier" charset="0"/>
+                <a:cs typeface="Courier" charset="0"/>
+              </a:rPr>
+              <a:t>allow configuration.</a:t>
+            </a:r>
           </a:p>
           <a:p>
             <a:r>
-              <a:rPr lang="en-US" sz="2000" dirty="0"/>
+              <a:rPr lang="en-US" sz="2000" dirty="0">
+                <a:solidFill>
+                  <a:schemeClr val="tx1"/>
+                </a:solidFill>
+                <a:latin typeface="Courier" charset="0"/>
+                <a:ea typeface="Courier" charset="0"/>
+                <a:cs typeface="Courier" charset="0"/>
+              </a:rPr>
+              <a:t>restrict -4 default </a:t>
+            </a:r>
+            <a:r>
+              <a:rPr lang="en-US" sz="2000" dirty="0" err="1">
+                <a:solidFill>
+                  <a:schemeClr val="tx1"/>
+                </a:solidFill>
+                <a:latin typeface="Courier" charset="0"/>
+                <a:ea typeface="Courier" charset="0"/>
+                <a:cs typeface="Courier" charset="0"/>
+              </a:rPr>
+              <a:t>kod</a:t>
+            </a:r>
+            <a:r>
+              <a:rPr lang="en-US" sz="2000" dirty="0">
+                <a:solidFill>
+                  <a:schemeClr val="tx1"/>
+                </a:solidFill>
+                <a:latin typeface="Courier" charset="0"/>
+                <a:ea typeface="Courier" charset="0"/>
+                <a:cs typeface="Courier" charset="0"/>
+              </a:rPr>
+              <a:t> </a:t>
+            </a:r>
+            <a:r>
+              <a:rPr lang="en-US" sz="2000" dirty="0" err="1">
+                <a:solidFill>
+                  <a:schemeClr val="tx1"/>
+                </a:solidFill>
+                <a:latin typeface="Courier" charset="0"/>
+                <a:ea typeface="Courier" charset="0"/>
+                <a:cs typeface="Courier" charset="0"/>
+              </a:rPr>
+              <a:t>notrap</a:t>
+            </a:r>
+            <a:r>
+              <a:rPr lang="en-US" sz="2000" dirty="0">
+                <a:solidFill>
+                  <a:schemeClr val="tx1"/>
+                </a:solidFill>
+                <a:latin typeface="Courier" charset="0"/>
+                <a:ea typeface="Courier" charset="0"/>
+                <a:cs typeface="Courier" charset="0"/>
+              </a:rPr>
+              <a:t> </a:t>
+            </a:r>
+            <a:r>
+              <a:rPr lang="en-US" sz="2000" dirty="0" err="1">
+                <a:solidFill>
+                  <a:schemeClr val="tx1"/>
+                </a:solidFill>
+                <a:latin typeface="Courier" charset="0"/>
+                <a:ea typeface="Courier" charset="0"/>
+                <a:cs typeface="Courier" charset="0"/>
+              </a:rPr>
+              <a:t>nomodify</a:t>
+            </a:r>
+            <a:r>
+              <a:rPr lang="en-US" sz="2000" dirty="0">
+                <a:solidFill>
+                  <a:schemeClr val="tx1"/>
+                </a:solidFill>
+                <a:latin typeface="Courier" charset="0"/>
+                <a:ea typeface="Courier" charset="0"/>
+                <a:cs typeface="Courier" charset="0"/>
+              </a:rPr>
+              <a:t> </a:t>
+            </a:r>
+            <a:r>
+              <a:rPr lang="en-US" sz="2000" dirty="0" err="1">
+                <a:solidFill>
+                  <a:schemeClr val="tx1"/>
+                </a:solidFill>
+                <a:latin typeface="Courier" charset="0"/>
+                <a:ea typeface="Courier" charset="0"/>
+                <a:cs typeface="Courier" charset="0"/>
+              </a:rPr>
+              <a:t>nopeer</a:t>
+            </a:r>
+            <a:r>
+              <a:rPr lang="en-US" sz="2000" dirty="0">
+                <a:solidFill>
+                  <a:schemeClr val="tx1"/>
+                </a:solidFill>
+                <a:latin typeface="Courier" charset="0"/>
+                <a:ea typeface="Courier" charset="0"/>
+                <a:cs typeface="Courier" charset="0"/>
+              </a:rPr>
+              <a:t> </a:t>
+            </a:r>
+            <a:r>
+              <a:rPr lang="en-US" sz="2000" dirty="0" err="1">
+                <a:solidFill>
+                  <a:schemeClr val="tx1"/>
+                </a:solidFill>
+                <a:latin typeface="Courier" charset="0"/>
+                <a:ea typeface="Courier" charset="0"/>
+                <a:cs typeface="Courier" charset="0"/>
+              </a:rPr>
+              <a:t>noquery</a:t>
+            </a:r>
+            <a:endParaRPr lang="en-US" sz="2000" dirty="0">
+              <a:solidFill>
+                <a:schemeClr val="tx1"/>
+              </a:solidFill>
+              <a:latin typeface="Courier" charset="0"/>
+              <a:ea typeface="Courier" charset="0"/>
+              <a:cs typeface="Courier" charset="0"/>
+            </a:endParaRPr>
+          </a:p>
+          <a:p>
+            <a:r>
+              <a:rPr lang="en-US" sz="2000" dirty="0">
+                <a:solidFill>
+                  <a:schemeClr val="tx1"/>
+                </a:solidFill>
+                <a:latin typeface="Courier" charset="0"/>
+                <a:ea typeface="Courier" charset="0"/>
+                <a:cs typeface="Courier" charset="0"/>
+              </a:rPr>
               <a:t>restrict -6 default </a:t>
             </a:r>
             <a:r>
-              <a:rPr lang="en-US" sz="2000" dirty="0" err="1"/>
+              <a:rPr lang="en-US" sz="2000" dirty="0" err="1">
+                <a:solidFill>
+                  <a:schemeClr val="tx1"/>
+                </a:solidFill>
+                <a:latin typeface="Courier" charset="0"/>
+                <a:ea typeface="Courier" charset="0"/>
+                <a:cs typeface="Courier" charset="0"/>
+              </a:rPr>
               <a:t>kod</a:t>
             </a:r>
             <a:r>
-              <a:rPr lang="en-US" sz="2000" dirty="0"/>
+              <a:rPr lang="en-US" sz="2000" dirty="0">
+                <a:solidFill>
+                  <a:schemeClr val="tx1"/>
+                </a:solidFill>
+                <a:latin typeface="Courier" charset="0"/>
+                <a:ea typeface="Courier" charset="0"/>
+                <a:cs typeface="Courier" charset="0"/>
+              </a:rPr>
               <a:t> </a:t>
             </a:r>
             <a:r>
-              <a:rPr lang="en-US" sz="2000" dirty="0" err="1"/>
+              <a:rPr lang="en-US" sz="2000" dirty="0" err="1">
+                <a:solidFill>
+                  <a:schemeClr val="tx1"/>
+                </a:solidFill>
+                <a:latin typeface="Courier" charset="0"/>
+                <a:ea typeface="Courier" charset="0"/>
+                <a:cs typeface="Courier" charset="0"/>
+              </a:rPr>
               <a:t>notrap</a:t>
             </a:r>
             <a:r>
-              <a:rPr lang="en-US" sz="2000" dirty="0"/>
+              <a:rPr lang="en-US" sz="2000" dirty="0">
+                <a:solidFill>
+                  <a:schemeClr val="tx1"/>
+                </a:solidFill>
+                <a:latin typeface="Courier" charset="0"/>
+                <a:ea typeface="Courier" charset="0"/>
+                <a:cs typeface="Courier" charset="0"/>
+              </a:rPr>
               <a:t> </a:t>
             </a:r>
             <a:r>
-              <a:rPr lang="en-US" sz="2000" dirty="0" err="1"/>
+              <a:rPr lang="en-US" sz="2000" dirty="0" err="1">
+                <a:solidFill>
+                  <a:schemeClr val="tx1"/>
+                </a:solidFill>
+                <a:latin typeface="Courier" charset="0"/>
+                <a:ea typeface="Courier" charset="0"/>
+                <a:cs typeface="Courier" charset="0"/>
+              </a:rPr>
               <a:t>nomodify</a:t>
             </a:r>
             <a:r>
-              <a:rPr lang="en-US" sz="2000" dirty="0"/>
+              <a:rPr lang="en-US" sz="2000" dirty="0">
+                <a:solidFill>
+                  <a:schemeClr val="tx1"/>
+                </a:solidFill>
+                <a:latin typeface="Courier" charset="0"/>
+                <a:ea typeface="Courier" charset="0"/>
+                <a:cs typeface="Courier" charset="0"/>
+              </a:rPr>
               <a:t> </a:t>
             </a:r>
             <a:r>
-              <a:rPr lang="en-US" sz="2000" dirty="0" err="1"/>
+              <a:rPr lang="en-US" sz="2000" dirty="0" err="1">
+                <a:solidFill>
+                  <a:schemeClr val="tx1"/>
+                </a:solidFill>
+                <a:latin typeface="Courier" charset="0"/>
+                <a:ea typeface="Courier" charset="0"/>
+                <a:cs typeface="Courier" charset="0"/>
+              </a:rPr>
               <a:t>nopeer</a:t>
             </a:r>
             <a:r>
-              <a:rPr lang="en-US" sz="2000" dirty="0"/>
+              <a:rPr lang="en-US" sz="2000" dirty="0">
+                <a:solidFill>
+                  <a:schemeClr val="tx1"/>
+                </a:solidFill>
+                <a:latin typeface="Courier" charset="0"/>
+                <a:ea typeface="Courier" charset="0"/>
+                <a:cs typeface="Courier" charset="0"/>
+              </a:rPr>
               <a:t> </a:t>
             </a:r>
             <a:r>
-              <a:rPr lang="en-US" sz="2000" dirty="0" err="1"/>
+              <a:rPr lang="en-US" sz="2000" dirty="0" err="1">
+                <a:solidFill>
+                  <a:schemeClr val="tx1"/>
+                </a:solidFill>
+                <a:latin typeface="Courier" charset="0"/>
+                <a:ea typeface="Courier" charset="0"/>
+                <a:cs typeface="Courier" charset="0"/>
+              </a:rPr>
               <a:t>noquer</a:t>
             </a:r>
-            <a:endParaRPr lang="en-US" sz="2000" dirty="0"/>
+            <a:endParaRPr lang="en-US" sz="2000" dirty="0">
+              <a:solidFill>
+                <a:schemeClr val="tx1"/>
+              </a:solidFill>
+              <a:latin typeface="Courier" charset="0"/>
+              <a:ea typeface="Courier" charset="0"/>
+              <a:cs typeface="Courier" charset="0"/>
+            </a:endParaRPr>
           </a:p>
         </p:txBody>
       </p:sp>
@@ -19219,6 +19983,107 @@
               <a:buChar char=""/>
               <a:defRPr/>
             </a:pPr>
+            <a:endParaRPr lang="en-US" sz="2800" dirty="0">
+              <a:ea typeface="Arial" charset="0"/>
+              <a:cs typeface="Arial" charset="0"/>
+            </a:endParaRPr>
+          </a:p>
+          <a:p>
+            <a:pPr>
+              <a:lnSpc>
+                <a:spcPct val="97000"/>
+              </a:lnSpc>
+              <a:spcAft>
+                <a:spcPts val="1413"/>
+              </a:spcAft>
+              <a:buClr>
+                <a:srgbClr val="FF6309"/>
+              </a:buClr>
+              <a:buSzPct val="45000"/>
+              <a:buFont typeface="Wingdings" charset="0"/>
+              <a:buChar char=""/>
+              <a:defRPr/>
+            </a:pPr>
+            <a:endParaRPr lang="en-US" sz="2800" dirty="0" smtClean="0">
+              <a:ea typeface="Arial" charset="0"/>
+              <a:cs typeface="Arial" charset="0"/>
+            </a:endParaRPr>
+          </a:p>
+          <a:p>
+            <a:pPr>
+              <a:lnSpc>
+                <a:spcPct val="97000"/>
+              </a:lnSpc>
+              <a:spcAft>
+                <a:spcPts val="1413"/>
+              </a:spcAft>
+              <a:buClr>
+                <a:srgbClr val="FF6309"/>
+              </a:buClr>
+              <a:buSzPct val="45000"/>
+              <a:buFont typeface="Wingdings" charset="0"/>
+              <a:buChar char=""/>
+              <a:defRPr/>
+            </a:pPr>
+            <a:endParaRPr lang="en-US" sz="2800" dirty="0">
+              <a:ea typeface="Arial" charset="0"/>
+              <a:cs typeface="Arial" charset="0"/>
+            </a:endParaRPr>
+          </a:p>
+          <a:p>
+            <a:pPr>
+              <a:lnSpc>
+                <a:spcPct val="97000"/>
+              </a:lnSpc>
+              <a:spcAft>
+                <a:spcPts val="1413"/>
+              </a:spcAft>
+              <a:buClr>
+                <a:srgbClr val="FF6309"/>
+              </a:buClr>
+              <a:buSzPct val="45000"/>
+              <a:buFont typeface="Wingdings" charset="0"/>
+              <a:buChar char=""/>
+              <a:defRPr/>
+            </a:pPr>
+            <a:r>
+              <a:rPr lang="en-US" sz="2800" dirty="0" smtClean="0">
+                <a:ea typeface="Arial" charset="0"/>
+                <a:cs typeface="Arial" charset="0"/>
+              </a:rPr>
+              <a:t>We can also restrict the server from answering </a:t>
+            </a:r>
+            <a:r>
+              <a:rPr lang="en-US" sz="2800" dirty="0" err="1" smtClean="0">
+                <a:ea typeface="Arial" charset="0"/>
+                <a:cs typeface="Arial" charset="0"/>
+              </a:rPr>
+              <a:t>ntp</a:t>
+            </a:r>
+            <a:r>
+              <a:rPr lang="en-US" sz="2800" dirty="0" smtClean="0">
+                <a:ea typeface="Arial" charset="0"/>
+                <a:cs typeface="Arial" charset="0"/>
+              </a:rPr>
+              <a:t> queries</a:t>
+            </a:r>
+          </a:p>
+          <a:p>
+            <a:pPr>
+              <a:lnSpc>
+                <a:spcPct val="97000"/>
+              </a:lnSpc>
+              <a:spcAft>
+                <a:spcPts val="1413"/>
+              </a:spcAft>
+              <a:buClr>
+                <a:srgbClr val="FF6309"/>
+              </a:buClr>
+              <a:buSzPct val="45000"/>
+              <a:buFont typeface="Wingdings" charset="0"/>
+              <a:buChar char=""/>
+              <a:defRPr/>
+            </a:pPr>
             <a:endParaRPr lang="en-US" sz="2800" dirty="0" smtClean="0">
               <a:ea typeface="Arial" charset="0"/>
               <a:cs typeface="Arial" charset="0"/>
@@ -19255,8 +20120,8 @@
         </p:nvSpPr>
         <p:spPr>
           <a:xfrm>
-            <a:off x="863599" y="3170237"/>
-            <a:ext cx="8648701" cy="1569660"/>
+            <a:off x="503237" y="3170237"/>
+            <a:ext cx="9185275" cy="1628779"/>
           </a:xfrm>
           <a:prstGeom prst="rect">
             <a:avLst/>
@@ -19272,108 +20137,369 @@
           <a:lstStyle/>
           <a:p>
             <a:r>
-              <a:rPr lang="en-US" sz="2000" dirty="0" smtClean="0"/>
+              <a:rPr lang="en-US" sz="2000" dirty="0" smtClean="0">
+                <a:solidFill>
+                  <a:schemeClr val="tx1"/>
+                </a:solidFill>
+                <a:latin typeface="Courier" charset="0"/>
+                <a:ea typeface="Courier" charset="0"/>
+                <a:cs typeface="Courier" charset="0"/>
+              </a:rPr>
               <a:t>restrict 196.200.219.0 mask 255.255.255.0 limited </a:t>
             </a:r>
             <a:r>
-              <a:rPr lang="en-US" sz="2000" dirty="0" err="1" smtClean="0"/>
+              <a:rPr lang="en-US" sz="2000" dirty="0" err="1" smtClean="0">
+                <a:solidFill>
+                  <a:schemeClr val="tx1"/>
+                </a:solidFill>
+                <a:latin typeface="Courier" charset="0"/>
+                <a:ea typeface="Courier" charset="0"/>
+                <a:cs typeface="Courier" charset="0"/>
+              </a:rPr>
               <a:t>kod</a:t>
             </a:r>
             <a:r>
-              <a:rPr lang="en-US" sz="2000" dirty="0" smtClean="0"/>
+              <a:rPr lang="en-US" sz="2000" dirty="0" smtClean="0">
+                <a:solidFill>
+                  <a:schemeClr val="tx1"/>
+                </a:solidFill>
+                <a:latin typeface="Courier" charset="0"/>
+                <a:ea typeface="Courier" charset="0"/>
+                <a:cs typeface="Courier" charset="0"/>
+              </a:rPr>
               <a:t> </a:t>
             </a:r>
             <a:r>
-              <a:rPr lang="en-US" sz="2000" dirty="0" err="1"/>
+              <a:rPr lang="en-US" sz="2000" dirty="0" err="1">
+                <a:solidFill>
+                  <a:schemeClr val="tx1"/>
+                </a:solidFill>
+                <a:latin typeface="Courier" charset="0"/>
+                <a:ea typeface="Courier" charset="0"/>
+                <a:cs typeface="Courier" charset="0"/>
+              </a:rPr>
               <a:t>notrap</a:t>
             </a:r>
             <a:r>
-              <a:rPr lang="en-US" sz="2000" dirty="0"/>
+              <a:rPr lang="en-US" sz="2000" dirty="0">
+                <a:solidFill>
+                  <a:schemeClr val="tx1"/>
+                </a:solidFill>
+                <a:latin typeface="Courier" charset="0"/>
+                <a:ea typeface="Courier" charset="0"/>
+                <a:cs typeface="Courier" charset="0"/>
+              </a:rPr>
               <a:t> </a:t>
             </a:r>
             <a:r>
-              <a:rPr lang="en-US" sz="2000" dirty="0" err="1"/>
+              <a:rPr lang="en-US" sz="2000" dirty="0" err="1">
+                <a:solidFill>
+                  <a:schemeClr val="tx1"/>
+                </a:solidFill>
+                <a:latin typeface="Courier" charset="0"/>
+                <a:ea typeface="Courier" charset="0"/>
+                <a:cs typeface="Courier" charset="0"/>
+              </a:rPr>
               <a:t>nomodify</a:t>
             </a:r>
             <a:r>
-              <a:rPr lang="en-US" sz="2000" dirty="0"/>
+              <a:rPr lang="en-US" sz="2000" dirty="0">
+                <a:solidFill>
+                  <a:schemeClr val="tx1"/>
+                </a:solidFill>
+                <a:latin typeface="Courier" charset="0"/>
+                <a:ea typeface="Courier" charset="0"/>
+                <a:cs typeface="Courier" charset="0"/>
+              </a:rPr>
               <a:t> </a:t>
             </a:r>
             <a:r>
-              <a:rPr lang="en-US" sz="2000" dirty="0" err="1"/>
+              <a:rPr lang="en-US" sz="2000" dirty="0" err="1">
+                <a:solidFill>
+                  <a:schemeClr val="tx1"/>
+                </a:solidFill>
+                <a:latin typeface="Courier" charset="0"/>
+                <a:ea typeface="Courier" charset="0"/>
+                <a:cs typeface="Courier" charset="0"/>
+              </a:rPr>
               <a:t>nopeer</a:t>
             </a:r>
             <a:r>
-              <a:rPr lang="en-US" sz="2000" dirty="0"/>
+              <a:rPr lang="en-US" sz="2000" dirty="0">
+                <a:solidFill>
+                  <a:schemeClr val="tx1"/>
+                </a:solidFill>
+                <a:latin typeface="Courier" charset="0"/>
+                <a:ea typeface="Courier" charset="0"/>
+                <a:cs typeface="Courier" charset="0"/>
+              </a:rPr>
               <a:t> </a:t>
             </a:r>
             <a:r>
-              <a:rPr lang="en-US" sz="2000" dirty="0" err="1" smtClean="0"/>
+              <a:rPr lang="en-US" sz="2000" dirty="0" err="1" smtClean="0">
+                <a:solidFill>
+                  <a:schemeClr val="tx1"/>
+                </a:solidFill>
+                <a:latin typeface="Courier" charset="0"/>
+                <a:ea typeface="Courier" charset="0"/>
+                <a:cs typeface="Courier" charset="0"/>
+              </a:rPr>
               <a:t>noquery</a:t>
             </a:r>
-            <a:endParaRPr lang="en-US" sz="2000" dirty="0" smtClean="0"/>
+            <a:endParaRPr lang="en-US" sz="2000" dirty="0" smtClean="0">
+              <a:solidFill>
+                <a:schemeClr val="tx1"/>
+              </a:solidFill>
+              <a:latin typeface="Courier" charset="0"/>
+              <a:ea typeface="Courier" charset="0"/>
+              <a:cs typeface="Courier" charset="0"/>
+            </a:endParaRPr>
           </a:p>
           <a:p>
             <a:r>
-              <a:rPr lang="en-US" sz="2000" dirty="0"/>
+              <a:rPr lang="en-US" sz="2000" dirty="0">
+                <a:solidFill>
+                  <a:schemeClr val="tx1"/>
+                </a:solidFill>
+                <a:latin typeface="Courier" charset="0"/>
+                <a:ea typeface="Courier" charset="0"/>
+                <a:cs typeface="Courier" charset="0"/>
+              </a:rPr>
               <a:t>restrict </a:t>
             </a:r>
             <a:r>
-              <a:rPr lang="en-US" sz="2000" dirty="0" smtClean="0"/>
+              <a:rPr lang="en-US" sz="2000" dirty="0" smtClean="0">
+                <a:solidFill>
+                  <a:schemeClr val="tx1"/>
+                </a:solidFill>
+                <a:latin typeface="Courier" charset="0"/>
+                <a:ea typeface="Courier" charset="0"/>
+                <a:cs typeface="Courier" charset="0"/>
+              </a:rPr>
               <a:t>2001:43f8:0220:219:: </a:t>
             </a:r>
             <a:r>
-              <a:rPr lang="en-US" sz="2000" dirty="0"/>
+              <a:rPr lang="en-US" sz="2000" dirty="0">
+                <a:solidFill>
+                  <a:schemeClr val="tx1"/>
+                </a:solidFill>
+                <a:latin typeface="Courier" charset="0"/>
+                <a:ea typeface="Courier" charset="0"/>
+                <a:cs typeface="Courier" charset="0"/>
+              </a:rPr>
               <a:t>mask </a:t>
             </a:r>
             <a:r>
-              <a:rPr lang="en-US" sz="2000" dirty="0" err="1" smtClean="0"/>
+              <a:rPr lang="en-US" sz="2000" dirty="0" err="1" smtClean="0">
+                <a:solidFill>
+                  <a:schemeClr val="tx1"/>
+                </a:solidFill>
+                <a:latin typeface="Courier" charset="0"/>
+                <a:ea typeface="Courier" charset="0"/>
+                <a:cs typeface="Courier" charset="0"/>
+              </a:rPr>
               <a:t>ffff:ffff:ffff:ffff</a:t>
             </a:r>
             <a:r>
-              <a:rPr lang="en-US" sz="2000" dirty="0" smtClean="0"/>
+              <a:rPr lang="en-US" sz="2000" dirty="0" smtClean="0">
+                <a:solidFill>
+                  <a:schemeClr val="tx1"/>
+                </a:solidFill>
+                <a:latin typeface="Courier" charset="0"/>
+                <a:ea typeface="Courier" charset="0"/>
+                <a:cs typeface="Courier" charset="0"/>
+              </a:rPr>
               <a:t>:: limited </a:t>
             </a:r>
             <a:r>
-              <a:rPr lang="en-US" sz="2000" dirty="0" err="1" smtClean="0"/>
+              <a:rPr lang="en-US" sz="2000" dirty="0" err="1" smtClean="0">
+                <a:solidFill>
+                  <a:schemeClr val="tx1"/>
+                </a:solidFill>
+                <a:latin typeface="Courier" charset="0"/>
+                <a:ea typeface="Courier" charset="0"/>
+                <a:cs typeface="Courier" charset="0"/>
+              </a:rPr>
               <a:t>kod</a:t>
             </a:r>
             <a:r>
-              <a:rPr lang="en-US" sz="2000" dirty="0" smtClean="0"/>
+              <a:rPr lang="en-US" sz="2000" dirty="0" smtClean="0">
+                <a:solidFill>
+                  <a:schemeClr val="tx1"/>
+                </a:solidFill>
+                <a:latin typeface="Courier" charset="0"/>
+                <a:ea typeface="Courier" charset="0"/>
+                <a:cs typeface="Courier" charset="0"/>
+              </a:rPr>
               <a:t> </a:t>
             </a:r>
             <a:r>
-              <a:rPr lang="en-US" sz="2000" dirty="0" err="1" smtClean="0"/>
+              <a:rPr lang="en-US" sz="2000" dirty="0" err="1" smtClean="0">
+                <a:solidFill>
+                  <a:schemeClr val="tx1"/>
+                </a:solidFill>
+                <a:latin typeface="Courier" charset="0"/>
+                <a:ea typeface="Courier" charset="0"/>
+                <a:cs typeface="Courier" charset="0"/>
+              </a:rPr>
               <a:t>notrap</a:t>
             </a:r>
             <a:r>
-              <a:rPr lang="en-US" sz="2000" dirty="0" smtClean="0"/>
+              <a:rPr lang="en-US" sz="2000" dirty="0" smtClean="0">
+                <a:solidFill>
+                  <a:schemeClr val="tx1"/>
+                </a:solidFill>
+                <a:latin typeface="Courier" charset="0"/>
+                <a:ea typeface="Courier" charset="0"/>
+                <a:cs typeface="Courier" charset="0"/>
+              </a:rPr>
               <a:t> </a:t>
             </a:r>
             <a:r>
-              <a:rPr lang="en-US" sz="2000" dirty="0" err="1" smtClean="0"/>
+              <a:rPr lang="en-US" sz="2000" dirty="0" err="1" smtClean="0">
+                <a:solidFill>
+                  <a:schemeClr val="tx1"/>
+                </a:solidFill>
+                <a:latin typeface="Courier" charset="0"/>
+                <a:ea typeface="Courier" charset="0"/>
+                <a:cs typeface="Courier" charset="0"/>
+              </a:rPr>
               <a:t>nomodify</a:t>
             </a:r>
             <a:r>
-              <a:rPr lang="en-US" sz="2000" dirty="0" smtClean="0"/>
+              <a:rPr lang="en-US" sz="2000" dirty="0" smtClean="0">
+                <a:solidFill>
+                  <a:schemeClr val="tx1"/>
+                </a:solidFill>
+                <a:latin typeface="Courier" charset="0"/>
+                <a:ea typeface="Courier" charset="0"/>
+                <a:cs typeface="Courier" charset="0"/>
+              </a:rPr>
               <a:t> </a:t>
             </a:r>
             <a:r>
-              <a:rPr lang="en-US" sz="2000" dirty="0" err="1" smtClean="0"/>
+              <a:rPr lang="en-US" sz="2000" dirty="0" err="1" smtClean="0">
+                <a:solidFill>
+                  <a:schemeClr val="tx1"/>
+                </a:solidFill>
+                <a:latin typeface="Courier" charset="0"/>
+                <a:ea typeface="Courier" charset="0"/>
+                <a:cs typeface="Courier" charset="0"/>
+              </a:rPr>
               <a:t>nopeer</a:t>
             </a:r>
             <a:r>
-              <a:rPr lang="en-US" sz="2000" dirty="0" smtClean="0"/>
+              <a:rPr lang="en-US" sz="2000" dirty="0" smtClean="0">
+                <a:solidFill>
+                  <a:schemeClr val="tx1"/>
+                </a:solidFill>
+                <a:latin typeface="Courier" charset="0"/>
+                <a:ea typeface="Courier" charset="0"/>
+                <a:cs typeface="Courier" charset="0"/>
+              </a:rPr>
               <a:t> </a:t>
             </a:r>
             <a:r>
-              <a:rPr lang="en-US" sz="2000" dirty="0" err="1" smtClean="0"/>
+              <a:rPr lang="en-US" sz="2000" dirty="0" err="1" smtClean="0">
+                <a:solidFill>
+                  <a:schemeClr val="tx1"/>
+                </a:solidFill>
+                <a:latin typeface="Courier" charset="0"/>
+                <a:ea typeface="Courier" charset="0"/>
+                <a:cs typeface="Courier" charset="0"/>
+              </a:rPr>
               <a:t>noquery</a:t>
             </a:r>
-            <a:endParaRPr lang="en-US" sz="2000" dirty="0"/>
+            <a:endParaRPr lang="en-US" sz="2000" dirty="0">
+              <a:solidFill>
+                <a:schemeClr val="tx1"/>
+              </a:solidFill>
+              <a:latin typeface="Courier" charset="0"/>
+              <a:ea typeface="Courier" charset="0"/>
+              <a:cs typeface="Courier" charset="0"/>
+            </a:endParaRPr>
           </a:p>
           <a:p>
-            <a:endParaRPr lang="en-US" sz="2000" dirty="0"/>
+            <a:endParaRPr lang="en-US" dirty="0">
+              <a:solidFill>
+                <a:schemeClr val="tx1"/>
+              </a:solidFill>
+              <a:latin typeface="Courier" charset="0"/>
+              <a:ea typeface="Courier" charset="0"/>
+              <a:cs typeface="Courier" charset="0"/>
+            </a:endParaRPr>
+          </a:p>
+        </p:txBody>
+      </p:sp>
+      <p:sp>
+        <p:nvSpPr>
+          <p:cNvPr id="6" name="TextBox 5"/>
+          <p:cNvSpPr txBox="1"/>
+          <p:nvPr/>
+        </p:nvSpPr>
+        <p:spPr>
+          <a:xfrm>
+            <a:off x="863599" y="5947760"/>
+            <a:ext cx="8648701" cy="978729"/>
+          </a:xfrm>
+          <a:prstGeom prst="rect">
+            <a:avLst/>
+          </a:prstGeom>
+          <a:solidFill>
+            <a:schemeClr val="bg2"/>
+          </a:solidFill>
+        </p:spPr>
+        <p:txBody>
+          <a:bodyPr wrap="square" rtlCol="0">
+            <a:spAutoFit/>
+          </a:bodyPr>
+          <a:lstStyle/>
+          <a:p>
+            <a:r>
+              <a:rPr lang="en-US" sz="2000" dirty="0" smtClean="0">
+                <a:solidFill>
+                  <a:schemeClr val="tx1"/>
+                </a:solidFill>
+                <a:latin typeface="Courier" charset="0"/>
+                <a:ea typeface="Courier" charset="0"/>
+                <a:cs typeface="Courier" charset="0"/>
+              </a:rPr>
+              <a:t># By default don’t answer anything</a:t>
+            </a:r>
+          </a:p>
+          <a:p>
+            <a:r>
+              <a:rPr lang="en-US" sz="2000" dirty="0" smtClean="0">
+                <a:solidFill>
+                  <a:schemeClr val="tx1"/>
+                </a:solidFill>
+                <a:latin typeface="Courier" charset="0"/>
+                <a:ea typeface="Courier" charset="0"/>
+                <a:cs typeface="Courier" charset="0"/>
+              </a:rPr>
+              <a:t>restrict default ignore</a:t>
+            </a:r>
+          </a:p>
+          <a:p>
+            <a:r>
+              <a:rPr lang="en-US" sz="2000" dirty="0" smtClean="0">
+                <a:solidFill>
+                  <a:schemeClr val="tx1"/>
+                </a:solidFill>
+                <a:latin typeface="Courier" charset="0"/>
+                <a:ea typeface="Courier" charset="0"/>
+                <a:cs typeface="Courier" charset="0"/>
+              </a:rPr>
+              <a:t>restrict -6 default ignore </a:t>
+            </a:r>
+            <a:endParaRPr lang="en-US" sz="2000" dirty="0">
+              <a:solidFill>
+                <a:schemeClr val="tx1"/>
+              </a:solidFill>
+              <a:latin typeface="Courier" charset="0"/>
+              <a:ea typeface="Courier" charset="0"/>
+              <a:cs typeface="Courier" charset="0"/>
+            </a:endParaRPr>
           </a:p>
         </p:txBody>
       </p:sp>
@@ -20312,20 +21438,11 @@
               <a:defRPr/>
             </a:pPr>
             <a:r>
-              <a:rPr lang="en-US" sz="2000" b="1" dirty="0"/>
-              <a:t>l</a:t>
-            </a:r>
-            <a:r>
-              <a:rPr lang="en-US" sz="2000" b="1" dirty="0" smtClean="0"/>
-              <a:t>imited</a:t>
-            </a:r>
-            <a:r>
-              <a:rPr lang="en-US" sz="2000" b="1" dirty="0"/>
-              <a:t>: </a:t>
-            </a:r>
-            <a:r>
-              <a:rPr lang="en-US" sz="2000" dirty="0"/>
-              <a:t>Indicates that if a client should abuse the number of packets rate control, the packets will be discarded by the sever. If the Kiss of Death packet is enabled, it will be sent back to the abusive host. The rates are configurable by an admin but the defaults are assumed here.</a:t>
+              <a:rPr lang="en-US" sz="2800" dirty="0" smtClean="0">
+                <a:ea typeface="Arial" charset="0"/>
+                <a:cs typeface="Arial" charset="0"/>
+              </a:rPr>
+              <a:t>Configure the server to unrestricted access to local users</a:t>
             </a:r>
           </a:p>
           <a:p>
@@ -20344,26 +21461,10 @@
               <a:buChar char=""/>
               <a:defRPr/>
             </a:pPr>
-            <a:r>
-              <a:rPr lang="en-US" sz="2000" b="1" dirty="0" err="1" smtClean="0"/>
-              <a:t>kod</a:t>
-            </a:r>
-            <a:r>
-              <a:rPr lang="en-US" sz="2000" b="1" dirty="0" smtClean="0"/>
-              <a:t>: </a:t>
-            </a:r>
-            <a:r>
-              <a:rPr lang="en-US" sz="2000" dirty="0"/>
-              <a:t>Kiss of Death. If a host violates the limit of packets to the server, the server will respond with s </a:t>
-            </a:r>
-            <a:r>
-              <a:rPr lang="en-US" sz="2000" dirty="0" err="1"/>
-              <a:t>KoD</a:t>
-            </a:r>
-            <a:r>
-              <a:rPr lang="en-US" sz="2000" dirty="0"/>
-              <a:t> packet to the violating host.</a:t>
-            </a:r>
+            <a:endParaRPr lang="en-US" sz="2800" dirty="0">
+              <a:ea typeface="Arial" charset="0"/>
+              <a:cs typeface="Arial" charset="0"/>
+            </a:endParaRPr>
           </a:p>
           <a:p>
             <a:pPr>
@@ -20381,18 +21482,10 @@
               <a:buChar char=""/>
               <a:defRPr/>
             </a:pPr>
-            <a:r>
-              <a:rPr lang="en-US" sz="2000" b="1" dirty="0" err="1" smtClean="0"/>
-              <a:t>notrap</a:t>
-            </a:r>
-            <a:r>
-              <a:rPr lang="en-US" sz="2000" b="1" dirty="0"/>
-              <a:t>: </a:t>
-            </a:r>
-            <a:r>
-              <a:rPr lang="en-US" sz="2000" dirty="0"/>
-              <a:t>Decline mode 6 control messages. These control messages are used for remote logging programs.</a:t>
-            </a:r>
+            <a:endParaRPr lang="en-US" sz="2800" dirty="0" smtClean="0">
+              <a:ea typeface="Arial" charset="0"/>
+              <a:cs typeface="Arial" charset="0"/>
+            </a:endParaRPr>
           </a:p>
           <a:p>
             <a:pPr>
@@ -20410,34 +21503,10 @@
               <a:buChar char=""/>
               <a:defRPr/>
             </a:pPr>
-            <a:r>
-              <a:rPr lang="en-US" sz="2000" b="1" dirty="0" err="1" smtClean="0"/>
-              <a:t>nomodify</a:t>
-            </a:r>
-            <a:r>
-              <a:rPr lang="en-US" sz="2000" b="1" dirty="0"/>
-              <a:t>: </a:t>
-            </a:r>
-            <a:r>
-              <a:rPr lang="en-US" sz="2000" dirty="0"/>
-              <a:t>Prevents </a:t>
-            </a:r>
-            <a:r>
-              <a:rPr lang="en-US" sz="2000" dirty="0" err="1"/>
-              <a:t>ntpq</a:t>
-            </a:r>
-            <a:r>
-              <a:rPr lang="en-US" sz="2000" dirty="0"/>
-              <a:t> and </a:t>
-            </a:r>
-            <a:r>
-              <a:rPr lang="en-US" sz="2000" dirty="0" err="1"/>
-              <a:t>ntpdc</a:t>
-            </a:r>
-            <a:r>
-              <a:rPr lang="en-US" sz="2000" dirty="0"/>
-              <a:t> queries that would modify the server’s configuration but informational queries are still permitted.</a:t>
-            </a:r>
+            <a:endParaRPr lang="en-US" sz="2800" dirty="0">
+              <a:ea typeface="Arial" charset="0"/>
+              <a:cs typeface="Arial" charset="0"/>
+            </a:endParaRPr>
           </a:p>
           <a:p>
             <a:pPr>
@@ -20456,7 +21525,1566 @@
               <a:defRPr/>
             </a:pPr>
             <a:r>
-              <a:rPr lang="en-US" sz="2000" b="1" dirty="0" err="1" smtClean="0"/>
+              <a:rPr lang="en-US" sz="2800" dirty="0" smtClean="0">
+                <a:ea typeface="Arial" charset="0"/>
+                <a:cs typeface="Arial" charset="0"/>
+              </a:rPr>
+              <a:t>We can also restrict the server from answering </a:t>
+            </a:r>
+            <a:r>
+              <a:rPr lang="en-US" sz="2800" dirty="0" err="1" smtClean="0">
+                <a:ea typeface="Arial" charset="0"/>
+                <a:cs typeface="Arial" charset="0"/>
+              </a:rPr>
+              <a:t>ntp</a:t>
+            </a:r>
+            <a:r>
+              <a:rPr lang="en-US" sz="2800" dirty="0" smtClean="0">
+                <a:ea typeface="Arial" charset="0"/>
+                <a:cs typeface="Arial" charset="0"/>
+              </a:rPr>
+              <a:t> queries</a:t>
+            </a:r>
+          </a:p>
+          <a:p>
+            <a:pPr>
+              <a:lnSpc>
+                <a:spcPct val="97000"/>
+              </a:lnSpc>
+              <a:spcAft>
+                <a:spcPts val="1413"/>
+              </a:spcAft>
+              <a:buClr>
+                <a:srgbClr val="FF6309"/>
+              </a:buClr>
+              <a:buSzPct val="45000"/>
+              <a:buFont typeface="Wingdings" charset="0"/>
+              <a:buChar char=""/>
+              <a:defRPr/>
+            </a:pPr>
+            <a:endParaRPr lang="en-US" sz="2800" dirty="0" smtClean="0">
+              <a:ea typeface="Arial" charset="0"/>
+              <a:cs typeface="Arial" charset="0"/>
+            </a:endParaRPr>
+          </a:p>
+          <a:p>
+            <a:pPr>
+              <a:lnSpc>
+                <a:spcPct val="97000"/>
+              </a:lnSpc>
+              <a:spcAft>
+                <a:spcPts val="1413"/>
+              </a:spcAft>
+              <a:buClr>
+                <a:srgbClr val="FF6309"/>
+              </a:buClr>
+              <a:buSzPct val="45000"/>
+              <a:buFont typeface="Wingdings" charset="0"/>
+              <a:buChar char=""/>
+              <a:defRPr/>
+            </a:pPr>
+            <a:endParaRPr lang="en-US" sz="2800" dirty="0">
+              <a:ea typeface="Arial" charset="0"/>
+              <a:cs typeface="Arial" charset="0"/>
+            </a:endParaRPr>
+          </a:p>
+        </p:txBody>
+      </p:sp>
+      <p:sp>
+        <p:nvSpPr>
+          <p:cNvPr id="4" name="TextBox 3"/>
+          <p:cNvSpPr txBox="1"/>
+          <p:nvPr/>
+        </p:nvSpPr>
+        <p:spPr>
+          <a:xfrm>
+            <a:off x="863599" y="2636837"/>
+            <a:ext cx="8648701" cy="1865126"/>
+          </a:xfrm>
+          <a:prstGeom prst="rect">
+            <a:avLst/>
+          </a:prstGeom>
+          <a:solidFill>
+            <a:schemeClr val="bg2"/>
+          </a:solidFill>
+        </p:spPr>
+        <p:txBody>
+          <a:bodyPr wrap="square" rtlCol="0">
+            <a:spAutoFit/>
+          </a:bodyPr>
+          <a:lstStyle/>
+          <a:p>
+            <a:r>
+              <a:rPr lang="en-US" sz="2000" dirty="0" smtClean="0">
+                <a:solidFill>
+                  <a:schemeClr val="tx1"/>
+                </a:solidFill>
+                <a:latin typeface="Courier" charset="0"/>
+                <a:ea typeface="Courier" charset="0"/>
+                <a:cs typeface="Courier" charset="0"/>
+              </a:rPr>
+              <a:t>restrict 196.200.219.0 mask 255.255.255.0 limited </a:t>
+            </a:r>
+            <a:r>
+              <a:rPr lang="en-US" sz="2000" dirty="0" err="1" smtClean="0">
+                <a:solidFill>
+                  <a:schemeClr val="tx1"/>
+                </a:solidFill>
+                <a:latin typeface="Courier" charset="0"/>
+                <a:ea typeface="Courier" charset="0"/>
+                <a:cs typeface="Courier" charset="0"/>
+              </a:rPr>
+              <a:t>kod</a:t>
+            </a:r>
+            <a:r>
+              <a:rPr lang="en-US" sz="2000" dirty="0" smtClean="0">
+                <a:solidFill>
+                  <a:schemeClr val="tx1"/>
+                </a:solidFill>
+                <a:latin typeface="Courier" charset="0"/>
+                <a:ea typeface="Courier" charset="0"/>
+                <a:cs typeface="Courier" charset="0"/>
+              </a:rPr>
+              <a:t> </a:t>
+            </a:r>
+            <a:r>
+              <a:rPr lang="en-US" sz="2000" dirty="0" err="1">
+                <a:solidFill>
+                  <a:schemeClr val="tx1"/>
+                </a:solidFill>
+                <a:latin typeface="Courier" charset="0"/>
+                <a:ea typeface="Courier" charset="0"/>
+                <a:cs typeface="Courier" charset="0"/>
+              </a:rPr>
+              <a:t>notrap</a:t>
+            </a:r>
+            <a:r>
+              <a:rPr lang="en-US" sz="2000" dirty="0">
+                <a:solidFill>
+                  <a:schemeClr val="tx1"/>
+                </a:solidFill>
+                <a:latin typeface="Courier" charset="0"/>
+                <a:ea typeface="Courier" charset="0"/>
+                <a:cs typeface="Courier" charset="0"/>
+              </a:rPr>
+              <a:t> </a:t>
+            </a:r>
+            <a:r>
+              <a:rPr lang="en-US" sz="2000" dirty="0" err="1">
+                <a:solidFill>
+                  <a:schemeClr val="tx1"/>
+                </a:solidFill>
+                <a:latin typeface="Courier" charset="0"/>
+                <a:ea typeface="Courier" charset="0"/>
+                <a:cs typeface="Courier" charset="0"/>
+              </a:rPr>
+              <a:t>nomodify</a:t>
+            </a:r>
+            <a:r>
+              <a:rPr lang="en-US" sz="2000" dirty="0">
+                <a:solidFill>
+                  <a:schemeClr val="tx1"/>
+                </a:solidFill>
+                <a:latin typeface="Courier" charset="0"/>
+                <a:ea typeface="Courier" charset="0"/>
+                <a:cs typeface="Courier" charset="0"/>
+              </a:rPr>
+              <a:t> </a:t>
+            </a:r>
+            <a:r>
+              <a:rPr lang="en-US" sz="2000" dirty="0" err="1">
+                <a:solidFill>
+                  <a:schemeClr val="tx1"/>
+                </a:solidFill>
+                <a:latin typeface="Courier" charset="0"/>
+                <a:ea typeface="Courier" charset="0"/>
+                <a:cs typeface="Courier" charset="0"/>
+              </a:rPr>
+              <a:t>nopeer</a:t>
+            </a:r>
+            <a:r>
+              <a:rPr lang="en-US" sz="2000" dirty="0">
+                <a:solidFill>
+                  <a:schemeClr val="tx1"/>
+                </a:solidFill>
+                <a:latin typeface="Courier" charset="0"/>
+                <a:ea typeface="Courier" charset="0"/>
+                <a:cs typeface="Courier" charset="0"/>
+              </a:rPr>
+              <a:t> </a:t>
+            </a:r>
+            <a:r>
+              <a:rPr lang="en-US" sz="2000" dirty="0" err="1" smtClean="0">
+                <a:solidFill>
+                  <a:schemeClr val="tx1"/>
+                </a:solidFill>
+                <a:latin typeface="Courier" charset="0"/>
+                <a:ea typeface="Courier" charset="0"/>
+                <a:cs typeface="Courier" charset="0"/>
+              </a:rPr>
+              <a:t>noquery</a:t>
+            </a:r>
+            <a:endParaRPr lang="en-US" sz="2000" dirty="0" smtClean="0">
+              <a:solidFill>
+                <a:schemeClr val="tx1"/>
+              </a:solidFill>
+              <a:latin typeface="Courier" charset="0"/>
+              <a:ea typeface="Courier" charset="0"/>
+              <a:cs typeface="Courier" charset="0"/>
+            </a:endParaRPr>
+          </a:p>
+          <a:p>
+            <a:r>
+              <a:rPr lang="en-US" sz="2000" dirty="0">
+                <a:solidFill>
+                  <a:schemeClr val="tx1"/>
+                </a:solidFill>
+                <a:latin typeface="Courier" charset="0"/>
+                <a:ea typeface="Courier" charset="0"/>
+                <a:cs typeface="Courier" charset="0"/>
+              </a:rPr>
+              <a:t>restrict </a:t>
+            </a:r>
+            <a:r>
+              <a:rPr lang="en-US" sz="2000" dirty="0" smtClean="0">
+                <a:solidFill>
+                  <a:schemeClr val="tx1"/>
+                </a:solidFill>
+                <a:latin typeface="Courier" charset="0"/>
+                <a:ea typeface="Courier" charset="0"/>
+                <a:cs typeface="Courier" charset="0"/>
+              </a:rPr>
+              <a:t>2001:43f8:0220:219:: </a:t>
+            </a:r>
+            <a:r>
+              <a:rPr lang="en-US" sz="2000" dirty="0">
+                <a:solidFill>
+                  <a:schemeClr val="tx1"/>
+                </a:solidFill>
+                <a:latin typeface="Courier" charset="0"/>
+                <a:ea typeface="Courier" charset="0"/>
+                <a:cs typeface="Courier" charset="0"/>
+              </a:rPr>
+              <a:t>mask </a:t>
+            </a:r>
+            <a:r>
+              <a:rPr lang="en-US" sz="2000" dirty="0" err="1" smtClean="0">
+                <a:solidFill>
+                  <a:schemeClr val="tx1"/>
+                </a:solidFill>
+                <a:latin typeface="Courier" charset="0"/>
+                <a:ea typeface="Courier" charset="0"/>
+                <a:cs typeface="Courier" charset="0"/>
+              </a:rPr>
+              <a:t>ffff:ffff:ffff:ffff</a:t>
+            </a:r>
+            <a:r>
+              <a:rPr lang="en-US" sz="2000" dirty="0" smtClean="0">
+                <a:solidFill>
+                  <a:schemeClr val="tx1"/>
+                </a:solidFill>
+                <a:latin typeface="Courier" charset="0"/>
+                <a:ea typeface="Courier" charset="0"/>
+                <a:cs typeface="Courier" charset="0"/>
+              </a:rPr>
+              <a:t>:: limited </a:t>
+            </a:r>
+            <a:r>
+              <a:rPr lang="en-US" sz="2000" dirty="0" err="1" smtClean="0">
+                <a:solidFill>
+                  <a:schemeClr val="tx1"/>
+                </a:solidFill>
+                <a:latin typeface="Courier" charset="0"/>
+                <a:ea typeface="Courier" charset="0"/>
+                <a:cs typeface="Courier" charset="0"/>
+              </a:rPr>
+              <a:t>kod</a:t>
+            </a:r>
+            <a:r>
+              <a:rPr lang="en-US" sz="2000" dirty="0" smtClean="0">
+                <a:solidFill>
+                  <a:schemeClr val="tx1"/>
+                </a:solidFill>
+                <a:latin typeface="Courier" charset="0"/>
+                <a:ea typeface="Courier" charset="0"/>
+                <a:cs typeface="Courier" charset="0"/>
+              </a:rPr>
+              <a:t> </a:t>
+            </a:r>
+            <a:r>
+              <a:rPr lang="en-US" sz="2000" dirty="0" err="1" smtClean="0">
+                <a:solidFill>
+                  <a:schemeClr val="tx1"/>
+                </a:solidFill>
+                <a:latin typeface="Courier" charset="0"/>
+                <a:ea typeface="Courier" charset="0"/>
+                <a:cs typeface="Courier" charset="0"/>
+              </a:rPr>
+              <a:t>notrap</a:t>
+            </a:r>
+            <a:r>
+              <a:rPr lang="en-US" sz="2000" dirty="0" smtClean="0">
+                <a:solidFill>
+                  <a:schemeClr val="tx1"/>
+                </a:solidFill>
+                <a:latin typeface="Courier" charset="0"/>
+                <a:ea typeface="Courier" charset="0"/>
+                <a:cs typeface="Courier" charset="0"/>
+              </a:rPr>
+              <a:t> </a:t>
+            </a:r>
+            <a:r>
+              <a:rPr lang="en-US" sz="2000" dirty="0" err="1" smtClean="0">
+                <a:solidFill>
+                  <a:schemeClr val="tx1"/>
+                </a:solidFill>
+                <a:latin typeface="Courier" charset="0"/>
+                <a:ea typeface="Courier" charset="0"/>
+                <a:cs typeface="Courier" charset="0"/>
+              </a:rPr>
+              <a:t>nomodify</a:t>
+            </a:r>
+            <a:r>
+              <a:rPr lang="en-US" sz="2000" dirty="0" smtClean="0">
+                <a:solidFill>
+                  <a:schemeClr val="tx1"/>
+                </a:solidFill>
+                <a:latin typeface="Courier" charset="0"/>
+                <a:ea typeface="Courier" charset="0"/>
+                <a:cs typeface="Courier" charset="0"/>
+              </a:rPr>
+              <a:t> </a:t>
+            </a:r>
+            <a:r>
+              <a:rPr lang="en-US" sz="2000" dirty="0" err="1" smtClean="0">
+                <a:solidFill>
+                  <a:schemeClr val="tx1"/>
+                </a:solidFill>
+                <a:latin typeface="Courier" charset="0"/>
+                <a:ea typeface="Courier" charset="0"/>
+                <a:cs typeface="Courier" charset="0"/>
+              </a:rPr>
+              <a:t>nopeer</a:t>
+            </a:r>
+            <a:r>
+              <a:rPr lang="en-US" sz="2000" dirty="0" smtClean="0">
+                <a:solidFill>
+                  <a:schemeClr val="tx1"/>
+                </a:solidFill>
+                <a:latin typeface="Courier" charset="0"/>
+                <a:ea typeface="Courier" charset="0"/>
+                <a:cs typeface="Courier" charset="0"/>
+              </a:rPr>
+              <a:t> </a:t>
+            </a:r>
+            <a:r>
+              <a:rPr lang="en-US" sz="2000" dirty="0" err="1" smtClean="0">
+                <a:solidFill>
+                  <a:schemeClr val="tx1"/>
+                </a:solidFill>
+                <a:latin typeface="Courier" charset="0"/>
+                <a:ea typeface="Courier" charset="0"/>
+                <a:cs typeface="Courier" charset="0"/>
+              </a:rPr>
+              <a:t>noquery</a:t>
+            </a:r>
+            <a:endParaRPr lang="en-US" sz="2000" dirty="0">
+              <a:solidFill>
+                <a:schemeClr val="tx1"/>
+              </a:solidFill>
+              <a:latin typeface="Courier" charset="0"/>
+              <a:ea typeface="Courier" charset="0"/>
+              <a:cs typeface="Courier" charset="0"/>
+            </a:endParaRPr>
+          </a:p>
+          <a:p>
+            <a:endParaRPr lang="en-US" sz="2000" dirty="0">
+              <a:solidFill>
+                <a:schemeClr val="tx1"/>
+              </a:solidFill>
+              <a:latin typeface="Courier" charset="0"/>
+              <a:ea typeface="Courier" charset="0"/>
+              <a:cs typeface="Courier" charset="0"/>
+            </a:endParaRPr>
+          </a:p>
+        </p:txBody>
+      </p:sp>
+      <p:sp>
+        <p:nvSpPr>
+          <p:cNvPr id="6" name="TextBox 5"/>
+          <p:cNvSpPr txBox="1"/>
+          <p:nvPr/>
+        </p:nvSpPr>
+        <p:spPr>
+          <a:xfrm>
+            <a:off x="887411" y="5608637"/>
+            <a:ext cx="8648701" cy="978729"/>
+          </a:xfrm>
+          <a:prstGeom prst="rect">
+            <a:avLst/>
+          </a:prstGeom>
+          <a:solidFill>
+            <a:schemeClr val="bg2"/>
+          </a:solidFill>
+        </p:spPr>
+        <p:txBody>
+          <a:bodyPr wrap="square" rtlCol="0">
+            <a:spAutoFit/>
+          </a:bodyPr>
+          <a:lstStyle/>
+          <a:p>
+            <a:r>
+              <a:rPr lang="en-US" sz="2000" dirty="0" smtClean="0">
+                <a:solidFill>
+                  <a:schemeClr val="tx1"/>
+                </a:solidFill>
+                <a:latin typeface="Courier" charset="0"/>
+                <a:ea typeface="Courier" charset="0"/>
+                <a:cs typeface="Courier" charset="0"/>
+              </a:rPr>
+              <a:t># By default don’t answer anything</a:t>
+            </a:r>
+          </a:p>
+          <a:p>
+            <a:r>
+              <a:rPr lang="en-US" sz="2000" dirty="0" smtClean="0">
+                <a:solidFill>
+                  <a:schemeClr val="tx1"/>
+                </a:solidFill>
+                <a:latin typeface="Courier" charset="0"/>
+                <a:ea typeface="Courier" charset="0"/>
+                <a:cs typeface="Courier" charset="0"/>
+              </a:rPr>
+              <a:t>restrict default ignore</a:t>
+            </a:r>
+          </a:p>
+          <a:p>
+            <a:r>
+              <a:rPr lang="en-US" sz="2000" dirty="0" smtClean="0">
+                <a:solidFill>
+                  <a:schemeClr val="tx1"/>
+                </a:solidFill>
+                <a:latin typeface="Courier" charset="0"/>
+                <a:ea typeface="Courier" charset="0"/>
+                <a:cs typeface="Courier" charset="0"/>
+              </a:rPr>
+              <a:t>restrict -6 default ignore </a:t>
+            </a:r>
+            <a:endParaRPr lang="en-US" sz="2000" dirty="0">
+              <a:solidFill>
+                <a:schemeClr val="tx1"/>
+              </a:solidFill>
+              <a:latin typeface="Courier" charset="0"/>
+              <a:ea typeface="Courier" charset="0"/>
+              <a:cs typeface="Courier" charset="0"/>
+            </a:endParaRPr>
+          </a:p>
+        </p:txBody>
+      </p:sp>
+    </p:spTree>
+    <p:extLst>
+      <p:ext uri="{BB962C8B-B14F-4D97-AF65-F5344CB8AC3E}">
+        <p14:creationId xmlns:p14="http://schemas.microsoft.com/office/powerpoint/2010/main" val="1693148533"/>
+      </p:ext>
+    </p:extLst>
+  </p:cSld>
+  <p:clrMapOvr>
+    <a:masterClrMapping/>
+  </p:clrMapOvr>
+  <p:transition spd="med"/>
+  <p:timing>
+    <p:tnLst>
+      <p:par>
+        <p:cTn id="1" dur="indefinite" nodeType="tmRoot">
+          <p:childTnLst>
+            <p:seq concurrent="1" nextAc="seek">
+              <p:cTn id="2" dur="0" nodeType="mainSeq"/>
+              <p:prevCondLst>
+                <p:cond evt="onPrev" delay="0">
+                  <p:tgtEl>
+                    <p:sldTgt/>
+                  </p:tgtEl>
+                </p:cond>
+              </p:prevCondLst>
+              <p:nextCondLst>
+                <p:cond evt="onNext" delay="0">
+                  <p:tgtEl>
+                    <p:sldTgt/>
+                  </p:tgtEl>
+                </p:cond>
+              </p:nextCondLst>
+            </p:seq>
+          </p:childTnLst>
+        </p:cTn>
+      </p:par>
+    </p:tnLst>
+  </p:timing>
+</p:sld>
+</file>
+
+<file path=ppt/slides/slide14.xml><?xml version="1.0" encoding="utf-8"?>
+<p:sld xmlns:a="http://schemas.openxmlformats.org/drawingml/2006/main" xmlns:r="http://schemas.openxmlformats.org/officeDocument/2006/relationships" xmlns:p="http://schemas.openxmlformats.org/presentationml/2006/main">
+  <p:cSld>
+    <p:bg>
+      <p:bgPr>
+        <a:blipFill dpi="0" rotWithShape="0">
+          <a:blip r:embed="rId3"/>
+          <a:srcRect/>
+          <a:tile tx="0" ty="0" sx="100000" sy="100000" flip="none" algn="tl"/>
+        </a:blipFill>
+        <a:effectLst/>
+      </p:bgPr>
+    </p:bg>
+    <p:spTree>
+      <p:nvGrpSpPr>
+        <p:cNvPr id="1" name=""/>
+        <p:cNvGrpSpPr/>
+        <p:nvPr/>
+      </p:nvGrpSpPr>
+      <p:grpSpPr>
+        <a:xfrm>
+          <a:off x="0" y="0"/>
+          <a:ext cx="0" cy="0"/>
+          <a:chOff x="0" y="0"/>
+          <a:chExt cx="0" cy="0"/>
+        </a:xfrm>
+      </p:grpSpPr>
+      <p:sp>
+        <p:nvSpPr>
+          <p:cNvPr id="12289" name="Text Box 1"/>
+          <p:cNvSpPr txBox="1">
+            <a:spLocks noChangeArrowheads="1"/>
+          </p:cNvSpPr>
+          <p:nvPr/>
+        </p:nvSpPr>
+        <p:spPr bwMode="auto">
+          <a:xfrm>
+            <a:off x="468313" y="0"/>
+            <a:ext cx="9070975" cy="1260475"/>
+          </a:xfrm>
+          <a:prstGeom prst="rect">
+            <a:avLst/>
+          </a:prstGeom>
+          <a:noFill/>
+          <a:ln>
+            <a:noFill/>
+          </a:ln>
+          <a:effectLst/>
+          <a:extLst>
+            <a:ext uri="{909E8E84-426E-40dd-AFC4-6F175D3DCCD1}">
+              <a14:hiddenFill xmlns:a14="http://schemas.microsoft.com/office/drawing/2010/main" xmlns="">
+                <a:solidFill>
+                  <a:srgbClr val="FFFFFF"/>
+                </a:solidFill>
+              </a14:hiddenFill>
+            </a:ext>
+            <a:ext uri="{91240B29-F687-4f45-9708-019B960494DF}">
+              <a14:hiddenLine xmlns:a14="http://schemas.microsoft.com/office/drawing/2010/main" xmlns="" w="9525" cap="flat">
+                <a:solidFill>
+                  <a:srgbClr val="3465A4"/>
+                </a:solidFill>
+                <a:round/>
+                <a:headEnd/>
+                <a:tailEnd/>
+              </a14:hiddenLine>
+            </a:ext>
+            <a:ext uri="{AF507438-7753-43e0-B8FC-AC1667EBCBE1}">
+              <a14:hiddenEffects xmlns:a14="http://schemas.microsoft.com/office/drawing/2010/main" xmlns="">
+                <a:effectLst>
+                  <a:outerShdw blurRad="63500" dist="38099" dir="2700000" algn="ctr" rotWithShape="0">
+                    <a:srgbClr val="000000">
+                      <a:alpha val="74998"/>
+                    </a:srgbClr>
+                  </a:outerShdw>
+                </a:effectLst>
+              </a14:hiddenEffects>
+            </a:ext>
+          </a:extLst>
+        </p:spPr>
+        <p:txBody>
+          <a:bodyPr lIns="0" tIns="0" rIns="0" bIns="0" anchor="ctr"/>
+          <a:lstStyle>
+            <a:lvl1pPr>
+              <a:tabLst>
+                <a:tab pos="0" algn="l"/>
+                <a:tab pos="457200" algn="l"/>
+                <a:tab pos="914400" algn="l"/>
+                <a:tab pos="1371600" algn="l"/>
+                <a:tab pos="1828800" algn="l"/>
+                <a:tab pos="2286000" algn="l"/>
+                <a:tab pos="2743200" algn="l"/>
+                <a:tab pos="3200400" algn="l"/>
+                <a:tab pos="3657600" algn="l"/>
+                <a:tab pos="4114800" algn="l"/>
+                <a:tab pos="4572000" algn="l"/>
+                <a:tab pos="5029200" algn="l"/>
+                <a:tab pos="5486400" algn="l"/>
+                <a:tab pos="5943600" algn="l"/>
+                <a:tab pos="6400800" algn="l"/>
+                <a:tab pos="6858000" algn="l"/>
+                <a:tab pos="7315200" algn="l"/>
+                <a:tab pos="7772400" algn="l"/>
+                <a:tab pos="8229600" algn="l"/>
+                <a:tab pos="8686800" algn="l"/>
+                <a:tab pos="9144000" algn="l"/>
+              </a:tabLst>
+              <a:defRPr sz="2400">
+                <a:solidFill>
+                  <a:srgbClr val="000000"/>
+                </a:solidFill>
+                <a:latin typeface="Arial" charset="0"/>
+                <a:ea typeface="ＭＳ Ｐゴシック" charset="0"/>
+                <a:cs typeface="DejaVu Sans" charset="0"/>
+              </a:defRPr>
+            </a:lvl1pPr>
+            <a:lvl2pPr>
+              <a:tabLst>
+                <a:tab pos="0" algn="l"/>
+                <a:tab pos="457200" algn="l"/>
+                <a:tab pos="914400" algn="l"/>
+                <a:tab pos="1371600" algn="l"/>
+                <a:tab pos="1828800" algn="l"/>
+                <a:tab pos="2286000" algn="l"/>
+                <a:tab pos="2743200" algn="l"/>
+                <a:tab pos="3200400" algn="l"/>
+                <a:tab pos="3657600" algn="l"/>
+                <a:tab pos="4114800" algn="l"/>
+                <a:tab pos="4572000" algn="l"/>
+                <a:tab pos="5029200" algn="l"/>
+                <a:tab pos="5486400" algn="l"/>
+                <a:tab pos="5943600" algn="l"/>
+                <a:tab pos="6400800" algn="l"/>
+                <a:tab pos="6858000" algn="l"/>
+                <a:tab pos="7315200" algn="l"/>
+                <a:tab pos="7772400" algn="l"/>
+                <a:tab pos="8229600" algn="l"/>
+                <a:tab pos="8686800" algn="l"/>
+                <a:tab pos="9144000" algn="l"/>
+              </a:tabLst>
+              <a:defRPr sz="2400">
+                <a:solidFill>
+                  <a:srgbClr val="000000"/>
+                </a:solidFill>
+                <a:latin typeface="Arial" charset="0"/>
+                <a:ea typeface="ＭＳ Ｐゴシック" charset="0"/>
+                <a:cs typeface="DejaVu Sans" charset="0"/>
+              </a:defRPr>
+            </a:lvl2pPr>
+            <a:lvl3pPr>
+              <a:tabLst>
+                <a:tab pos="0" algn="l"/>
+                <a:tab pos="457200" algn="l"/>
+                <a:tab pos="914400" algn="l"/>
+                <a:tab pos="1371600" algn="l"/>
+                <a:tab pos="1828800" algn="l"/>
+                <a:tab pos="2286000" algn="l"/>
+                <a:tab pos="2743200" algn="l"/>
+                <a:tab pos="3200400" algn="l"/>
+                <a:tab pos="3657600" algn="l"/>
+                <a:tab pos="4114800" algn="l"/>
+                <a:tab pos="4572000" algn="l"/>
+                <a:tab pos="5029200" algn="l"/>
+                <a:tab pos="5486400" algn="l"/>
+                <a:tab pos="5943600" algn="l"/>
+                <a:tab pos="6400800" algn="l"/>
+                <a:tab pos="6858000" algn="l"/>
+                <a:tab pos="7315200" algn="l"/>
+                <a:tab pos="7772400" algn="l"/>
+                <a:tab pos="8229600" algn="l"/>
+                <a:tab pos="8686800" algn="l"/>
+                <a:tab pos="9144000" algn="l"/>
+              </a:tabLst>
+              <a:defRPr sz="2400">
+                <a:solidFill>
+                  <a:srgbClr val="000000"/>
+                </a:solidFill>
+                <a:latin typeface="Arial" charset="0"/>
+                <a:ea typeface="ＭＳ Ｐゴシック" charset="0"/>
+                <a:cs typeface="DejaVu Sans" charset="0"/>
+              </a:defRPr>
+            </a:lvl3pPr>
+            <a:lvl4pPr>
+              <a:tabLst>
+                <a:tab pos="0" algn="l"/>
+                <a:tab pos="457200" algn="l"/>
+                <a:tab pos="914400" algn="l"/>
+                <a:tab pos="1371600" algn="l"/>
+                <a:tab pos="1828800" algn="l"/>
+                <a:tab pos="2286000" algn="l"/>
+                <a:tab pos="2743200" algn="l"/>
+                <a:tab pos="3200400" algn="l"/>
+                <a:tab pos="3657600" algn="l"/>
+                <a:tab pos="4114800" algn="l"/>
+                <a:tab pos="4572000" algn="l"/>
+                <a:tab pos="5029200" algn="l"/>
+                <a:tab pos="5486400" algn="l"/>
+                <a:tab pos="5943600" algn="l"/>
+                <a:tab pos="6400800" algn="l"/>
+                <a:tab pos="6858000" algn="l"/>
+                <a:tab pos="7315200" algn="l"/>
+                <a:tab pos="7772400" algn="l"/>
+                <a:tab pos="8229600" algn="l"/>
+                <a:tab pos="8686800" algn="l"/>
+                <a:tab pos="9144000" algn="l"/>
+              </a:tabLst>
+              <a:defRPr sz="2400">
+                <a:solidFill>
+                  <a:srgbClr val="000000"/>
+                </a:solidFill>
+                <a:latin typeface="Arial" charset="0"/>
+                <a:ea typeface="ＭＳ Ｐゴシック" charset="0"/>
+                <a:cs typeface="DejaVu Sans" charset="0"/>
+              </a:defRPr>
+            </a:lvl4pPr>
+            <a:lvl5pPr>
+              <a:tabLst>
+                <a:tab pos="0" algn="l"/>
+                <a:tab pos="457200" algn="l"/>
+                <a:tab pos="914400" algn="l"/>
+                <a:tab pos="1371600" algn="l"/>
+                <a:tab pos="1828800" algn="l"/>
+                <a:tab pos="2286000" algn="l"/>
+                <a:tab pos="2743200" algn="l"/>
+                <a:tab pos="3200400" algn="l"/>
+                <a:tab pos="3657600" algn="l"/>
+                <a:tab pos="4114800" algn="l"/>
+                <a:tab pos="4572000" algn="l"/>
+                <a:tab pos="5029200" algn="l"/>
+                <a:tab pos="5486400" algn="l"/>
+                <a:tab pos="5943600" algn="l"/>
+                <a:tab pos="6400800" algn="l"/>
+                <a:tab pos="6858000" algn="l"/>
+                <a:tab pos="7315200" algn="l"/>
+                <a:tab pos="7772400" algn="l"/>
+                <a:tab pos="8229600" algn="l"/>
+                <a:tab pos="8686800" algn="l"/>
+                <a:tab pos="9144000" algn="l"/>
+              </a:tabLst>
+              <a:defRPr sz="2400">
+                <a:solidFill>
+                  <a:srgbClr val="000000"/>
+                </a:solidFill>
+                <a:latin typeface="Arial" charset="0"/>
+                <a:ea typeface="ＭＳ Ｐゴシック" charset="0"/>
+                <a:cs typeface="DejaVu Sans" charset="0"/>
+              </a:defRPr>
+            </a:lvl5pPr>
+            <a:lvl6pPr marL="2514600" indent="-228600" fontAlgn="base" hangingPunct="0">
+              <a:lnSpc>
+                <a:spcPct val="96000"/>
+              </a:lnSpc>
+              <a:spcBef>
+                <a:spcPct val="0"/>
+              </a:spcBef>
+              <a:spcAft>
+                <a:spcPct val="0"/>
+              </a:spcAft>
+              <a:buClr>
+                <a:srgbClr val="000000"/>
+              </a:buClr>
+              <a:buSzPct val="100000"/>
+              <a:buFont typeface="Times New Roman" charset="0"/>
+              <a:tabLst>
+                <a:tab pos="0" algn="l"/>
+                <a:tab pos="457200" algn="l"/>
+                <a:tab pos="914400" algn="l"/>
+                <a:tab pos="1371600" algn="l"/>
+                <a:tab pos="1828800" algn="l"/>
+                <a:tab pos="2286000" algn="l"/>
+                <a:tab pos="2743200" algn="l"/>
+                <a:tab pos="3200400" algn="l"/>
+                <a:tab pos="3657600" algn="l"/>
+                <a:tab pos="4114800" algn="l"/>
+                <a:tab pos="4572000" algn="l"/>
+                <a:tab pos="5029200" algn="l"/>
+                <a:tab pos="5486400" algn="l"/>
+                <a:tab pos="5943600" algn="l"/>
+                <a:tab pos="6400800" algn="l"/>
+                <a:tab pos="6858000" algn="l"/>
+                <a:tab pos="7315200" algn="l"/>
+                <a:tab pos="7772400" algn="l"/>
+                <a:tab pos="8229600" algn="l"/>
+                <a:tab pos="8686800" algn="l"/>
+                <a:tab pos="9144000" algn="l"/>
+              </a:tabLst>
+              <a:defRPr sz="2400">
+                <a:solidFill>
+                  <a:srgbClr val="000000"/>
+                </a:solidFill>
+                <a:latin typeface="Arial" charset="0"/>
+                <a:ea typeface="ＭＳ Ｐゴシック" charset="0"/>
+                <a:cs typeface="DejaVu Sans" charset="0"/>
+              </a:defRPr>
+            </a:lvl6pPr>
+            <a:lvl7pPr marL="2971800" indent="-228600" fontAlgn="base" hangingPunct="0">
+              <a:lnSpc>
+                <a:spcPct val="96000"/>
+              </a:lnSpc>
+              <a:spcBef>
+                <a:spcPct val="0"/>
+              </a:spcBef>
+              <a:spcAft>
+                <a:spcPct val="0"/>
+              </a:spcAft>
+              <a:buClr>
+                <a:srgbClr val="000000"/>
+              </a:buClr>
+              <a:buSzPct val="100000"/>
+              <a:buFont typeface="Times New Roman" charset="0"/>
+              <a:tabLst>
+                <a:tab pos="0" algn="l"/>
+                <a:tab pos="457200" algn="l"/>
+                <a:tab pos="914400" algn="l"/>
+                <a:tab pos="1371600" algn="l"/>
+                <a:tab pos="1828800" algn="l"/>
+                <a:tab pos="2286000" algn="l"/>
+                <a:tab pos="2743200" algn="l"/>
+                <a:tab pos="3200400" algn="l"/>
+                <a:tab pos="3657600" algn="l"/>
+                <a:tab pos="4114800" algn="l"/>
+                <a:tab pos="4572000" algn="l"/>
+                <a:tab pos="5029200" algn="l"/>
+                <a:tab pos="5486400" algn="l"/>
+                <a:tab pos="5943600" algn="l"/>
+                <a:tab pos="6400800" algn="l"/>
+                <a:tab pos="6858000" algn="l"/>
+                <a:tab pos="7315200" algn="l"/>
+                <a:tab pos="7772400" algn="l"/>
+                <a:tab pos="8229600" algn="l"/>
+                <a:tab pos="8686800" algn="l"/>
+                <a:tab pos="9144000" algn="l"/>
+              </a:tabLst>
+              <a:defRPr sz="2400">
+                <a:solidFill>
+                  <a:srgbClr val="000000"/>
+                </a:solidFill>
+                <a:latin typeface="Arial" charset="0"/>
+                <a:ea typeface="ＭＳ Ｐゴシック" charset="0"/>
+                <a:cs typeface="DejaVu Sans" charset="0"/>
+              </a:defRPr>
+            </a:lvl7pPr>
+            <a:lvl8pPr marL="3429000" indent="-228600" fontAlgn="base" hangingPunct="0">
+              <a:lnSpc>
+                <a:spcPct val="96000"/>
+              </a:lnSpc>
+              <a:spcBef>
+                <a:spcPct val="0"/>
+              </a:spcBef>
+              <a:spcAft>
+                <a:spcPct val="0"/>
+              </a:spcAft>
+              <a:buClr>
+                <a:srgbClr val="000000"/>
+              </a:buClr>
+              <a:buSzPct val="100000"/>
+              <a:buFont typeface="Times New Roman" charset="0"/>
+              <a:tabLst>
+                <a:tab pos="0" algn="l"/>
+                <a:tab pos="457200" algn="l"/>
+                <a:tab pos="914400" algn="l"/>
+                <a:tab pos="1371600" algn="l"/>
+                <a:tab pos="1828800" algn="l"/>
+                <a:tab pos="2286000" algn="l"/>
+                <a:tab pos="2743200" algn="l"/>
+                <a:tab pos="3200400" algn="l"/>
+                <a:tab pos="3657600" algn="l"/>
+                <a:tab pos="4114800" algn="l"/>
+                <a:tab pos="4572000" algn="l"/>
+                <a:tab pos="5029200" algn="l"/>
+                <a:tab pos="5486400" algn="l"/>
+                <a:tab pos="5943600" algn="l"/>
+                <a:tab pos="6400800" algn="l"/>
+                <a:tab pos="6858000" algn="l"/>
+                <a:tab pos="7315200" algn="l"/>
+                <a:tab pos="7772400" algn="l"/>
+                <a:tab pos="8229600" algn="l"/>
+                <a:tab pos="8686800" algn="l"/>
+                <a:tab pos="9144000" algn="l"/>
+              </a:tabLst>
+              <a:defRPr sz="2400">
+                <a:solidFill>
+                  <a:srgbClr val="000000"/>
+                </a:solidFill>
+                <a:latin typeface="Arial" charset="0"/>
+                <a:ea typeface="ＭＳ Ｐゴシック" charset="0"/>
+                <a:cs typeface="DejaVu Sans" charset="0"/>
+              </a:defRPr>
+            </a:lvl8pPr>
+            <a:lvl9pPr marL="3886200" indent="-228600" fontAlgn="base" hangingPunct="0">
+              <a:lnSpc>
+                <a:spcPct val="96000"/>
+              </a:lnSpc>
+              <a:spcBef>
+                <a:spcPct val="0"/>
+              </a:spcBef>
+              <a:spcAft>
+                <a:spcPct val="0"/>
+              </a:spcAft>
+              <a:buClr>
+                <a:srgbClr val="000000"/>
+              </a:buClr>
+              <a:buSzPct val="100000"/>
+              <a:buFont typeface="Times New Roman" charset="0"/>
+              <a:tabLst>
+                <a:tab pos="0" algn="l"/>
+                <a:tab pos="457200" algn="l"/>
+                <a:tab pos="914400" algn="l"/>
+                <a:tab pos="1371600" algn="l"/>
+                <a:tab pos="1828800" algn="l"/>
+                <a:tab pos="2286000" algn="l"/>
+                <a:tab pos="2743200" algn="l"/>
+                <a:tab pos="3200400" algn="l"/>
+                <a:tab pos="3657600" algn="l"/>
+                <a:tab pos="4114800" algn="l"/>
+                <a:tab pos="4572000" algn="l"/>
+                <a:tab pos="5029200" algn="l"/>
+                <a:tab pos="5486400" algn="l"/>
+                <a:tab pos="5943600" algn="l"/>
+                <a:tab pos="6400800" algn="l"/>
+                <a:tab pos="6858000" algn="l"/>
+                <a:tab pos="7315200" algn="l"/>
+                <a:tab pos="7772400" algn="l"/>
+                <a:tab pos="8229600" algn="l"/>
+                <a:tab pos="8686800" algn="l"/>
+                <a:tab pos="9144000" algn="l"/>
+              </a:tabLst>
+              <a:defRPr sz="2400">
+                <a:solidFill>
+                  <a:srgbClr val="000000"/>
+                </a:solidFill>
+                <a:latin typeface="Arial" charset="0"/>
+                <a:ea typeface="ＭＳ Ｐゴシック" charset="0"/>
+                <a:cs typeface="DejaVu Sans" charset="0"/>
+              </a:defRPr>
+            </a:lvl9pPr>
+          </a:lstStyle>
+          <a:p>
+            <a:pPr>
+              <a:lnSpc>
+                <a:spcPct val="97000"/>
+              </a:lnSpc>
+              <a:buClrTx/>
+              <a:buSzPct val="45000"/>
+              <a:buFontTx/>
+              <a:buNone/>
+              <a:defRPr/>
+            </a:pPr>
+            <a:r>
+              <a:rPr lang="en-US" sz="4400" b="1" dirty="0">
+                <a:latin typeface="Trebuchet MS" charset="0"/>
+              </a:rPr>
+              <a:t>Step 3: </a:t>
+            </a:r>
+            <a:r>
+              <a:rPr lang="en-US" sz="4400" b="1" dirty="0" smtClean="0">
+                <a:latin typeface="Trebuchet MS" charset="0"/>
+              </a:rPr>
+              <a:t>Configure NTP </a:t>
+            </a:r>
+            <a:r>
+              <a:rPr lang="en-US" sz="4400" b="1" dirty="0">
+                <a:latin typeface="Trebuchet MS" charset="0"/>
+              </a:rPr>
+              <a:t>Restrictions</a:t>
+            </a:r>
+          </a:p>
+        </p:txBody>
+      </p:sp>
+      <p:sp>
+        <p:nvSpPr>
+          <p:cNvPr id="12290" name="Text Box 2"/>
+          <p:cNvSpPr txBox="1">
+            <a:spLocks noChangeArrowheads="1"/>
+          </p:cNvSpPr>
+          <p:nvPr/>
+        </p:nvSpPr>
+        <p:spPr bwMode="auto">
+          <a:xfrm>
+            <a:off x="503238" y="1768475"/>
+            <a:ext cx="9070975" cy="4987925"/>
+          </a:xfrm>
+          <a:prstGeom prst="rect">
+            <a:avLst/>
+          </a:prstGeom>
+          <a:noFill/>
+          <a:ln>
+            <a:noFill/>
+          </a:ln>
+          <a:effectLst/>
+          <a:extLst>
+            <a:ext uri="{909E8E84-426E-40dd-AFC4-6F175D3DCCD1}">
+              <a14:hiddenFill xmlns:a14="http://schemas.microsoft.com/office/drawing/2010/main" xmlns="">
+                <a:solidFill>
+                  <a:srgbClr val="FFFFFF"/>
+                </a:solidFill>
+              </a14:hiddenFill>
+            </a:ext>
+            <a:ext uri="{91240B29-F687-4f45-9708-019B960494DF}">
+              <a14:hiddenLine xmlns:a14="http://schemas.microsoft.com/office/drawing/2010/main" xmlns="" w="9525" cap="flat">
+                <a:solidFill>
+                  <a:srgbClr val="3465A4"/>
+                </a:solidFill>
+                <a:round/>
+                <a:headEnd/>
+                <a:tailEnd/>
+              </a14:hiddenLine>
+            </a:ext>
+            <a:ext uri="{AF507438-7753-43e0-B8FC-AC1667EBCBE1}">
+              <a14:hiddenEffects xmlns:a14="http://schemas.microsoft.com/office/drawing/2010/main" xmlns="">
+                <a:effectLst>
+                  <a:outerShdw blurRad="63500" dist="38099" dir="2700000" algn="ctr" rotWithShape="0">
+                    <a:srgbClr val="000000">
+                      <a:alpha val="74998"/>
+                    </a:srgbClr>
+                  </a:outerShdw>
+                </a:effectLst>
+              </a14:hiddenEffects>
+            </a:ext>
+          </a:extLst>
+        </p:spPr>
+        <p:txBody>
+          <a:bodyPr lIns="0" tIns="0" rIns="0" bIns="0"/>
+          <a:lstStyle>
+            <a:lvl1pPr marL="428625" indent="-323850">
+              <a:tabLst>
+                <a:tab pos="428625" algn="l"/>
+                <a:tab pos="885825" algn="l"/>
+                <a:tab pos="1343025" algn="l"/>
+                <a:tab pos="1800225" algn="l"/>
+                <a:tab pos="2257425" algn="l"/>
+                <a:tab pos="2714625" algn="l"/>
+                <a:tab pos="3171825" algn="l"/>
+                <a:tab pos="3629025" algn="l"/>
+                <a:tab pos="4086225" algn="l"/>
+                <a:tab pos="4543425" algn="l"/>
+                <a:tab pos="5000625" algn="l"/>
+                <a:tab pos="5457825" algn="l"/>
+                <a:tab pos="5915025" algn="l"/>
+                <a:tab pos="6372225" algn="l"/>
+                <a:tab pos="6829425" algn="l"/>
+                <a:tab pos="7286625" algn="l"/>
+                <a:tab pos="7743825" algn="l"/>
+                <a:tab pos="8201025" algn="l"/>
+                <a:tab pos="8658225" algn="l"/>
+                <a:tab pos="9115425" algn="l"/>
+                <a:tab pos="9572625" algn="l"/>
+              </a:tabLst>
+              <a:defRPr sz="2400">
+                <a:solidFill>
+                  <a:srgbClr val="000000"/>
+                </a:solidFill>
+                <a:latin typeface="Arial" charset="0"/>
+                <a:ea typeface="ＭＳ Ｐゴシック" charset="0"/>
+                <a:cs typeface="DejaVu Sans" charset="0"/>
+              </a:defRPr>
+            </a:lvl1pPr>
+            <a:lvl2pPr>
+              <a:tabLst>
+                <a:tab pos="428625" algn="l"/>
+                <a:tab pos="885825" algn="l"/>
+                <a:tab pos="1343025" algn="l"/>
+                <a:tab pos="1800225" algn="l"/>
+                <a:tab pos="2257425" algn="l"/>
+                <a:tab pos="2714625" algn="l"/>
+                <a:tab pos="3171825" algn="l"/>
+                <a:tab pos="3629025" algn="l"/>
+                <a:tab pos="4086225" algn="l"/>
+                <a:tab pos="4543425" algn="l"/>
+                <a:tab pos="5000625" algn="l"/>
+                <a:tab pos="5457825" algn="l"/>
+                <a:tab pos="5915025" algn="l"/>
+                <a:tab pos="6372225" algn="l"/>
+                <a:tab pos="6829425" algn="l"/>
+                <a:tab pos="7286625" algn="l"/>
+                <a:tab pos="7743825" algn="l"/>
+                <a:tab pos="8201025" algn="l"/>
+                <a:tab pos="8658225" algn="l"/>
+                <a:tab pos="9115425" algn="l"/>
+                <a:tab pos="9572625" algn="l"/>
+              </a:tabLst>
+              <a:defRPr sz="2400">
+                <a:solidFill>
+                  <a:srgbClr val="000000"/>
+                </a:solidFill>
+                <a:latin typeface="Arial" charset="0"/>
+                <a:ea typeface="ＭＳ Ｐゴシック" charset="0"/>
+                <a:cs typeface="DejaVu Sans" charset="0"/>
+              </a:defRPr>
+            </a:lvl2pPr>
+            <a:lvl3pPr>
+              <a:tabLst>
+                <a:tab pos="428625" algn="l"/>
+                <a:tab pos="885825" algn="l"/>
+                <a:tab pos="1343025" algn="l"/>
+                <a:tab pos="1800225" algn="l"/>
+                <a:tab pos="2257425" algn="l"/>
+                <a:tab pos="2714625" algn="l"/>
+                <a:tab pos="3171825" algn="l"/>
+                <a:tab pos="3629025" algn="l"/>
+                <a:tab pos="4086225" algn="l"/>
+                <a:tab pos="4543425" algn="l"/>
+                <a:tab pos="5000625" algn="l"/>
+                <a:tab pos="5457825" algn="l"/>
+                <a:tab pos="5915025" algn="l"/>
+                <a:tab pos="6372225" algn="l"/>
+                <a:tab pos="6829425" algn="l"/>
+                <a:tab pos="7286625" algn="l"/>
+                <a:tab pos="7743825" algn="l"/>
+                <a:tab pos="8201025" algn="l"/>
+                <a:tab pos="8658225" algn="l"/>
+                <a:tab pos="9115425" algn="l"/>
+                <a:tab pos="9572625" algn="l"/>
+              </a:tabLst>
+              <a:defRPr sz="2400">
+                <a:solidFill>
+                  <a:srgbClr val="000000"/>
+                </a:solidFill>
+                <a:latin typeface="Arial" charset="0"/>
+                <a:ea typeface="ＭＳ Ｐゴシック" charset="0"/>
+                <a:cs typeface="DejaVu Sans" charset="0"/>
+              </a:defRPr>
+            </a:lvl3pPr>
+            <a:lvl4pPr>
+              <a:tabLst>
+                <a:tab pos="428625" algn="l"/>
+                <a:tab pos="885825" algn="l"/>
+                <a:tab pos="1343025" algn="l"/>
+                <a:tab pos="1800225" algn="l"/>
+                <a:tab pos="2257425" algn="l"/>
+                <a:tab pos="2714625" algn="l"/>
+                <a:tab pos="3171825" algn="l"/>
+                <a:tab pos="3629025" algn="l"/>
+                <a:tab pos="4086225" algn="l"/>
+                <a:tab pos="4543425" algn="l"/>
+                <a:tab pos="5000625" algn="l"/>
+                <a:tab pos="5457825" algn="l"/>
+                <a:tab pos="5915025" algn="l"/>
+                <a:tab pos="6372225" algn="l"/>
+                <a:tab pos="6829425" algn="l"/>
+                <a:tab pos="7286625" algn="l"/>
+                <a:tab pos="7743825" algn="l"/>
+                <a:tab pos="8201025" algn="l"/>
+                <a:tab pos="8658225" algn="l"/>
+                <a:tab pos="9115425" algn="l"/>
+                <a:tab pos="9572625" algn="l"/>
+              </a:tabLst>
+              <a:defRPr sz="2400">
+                <a:solidFill>
+                  <a:srgbClr val="000000"/>
+                </a:solidFill>
+                <a:latin typeface="Arial" charset="0"/>
+                <a:ea typeface="ＭＳ Ｐゴシック" charset="0"/>
+                <a:cs typeface="DejaVu Sans" charset="0"/>
+              </a:defRPr>
+            </a:lvl4pPr>
+            <a:lvl5pPr>
+              <a:tabLst>
+                <a:tab pos="428625" algn="l"/>
+                <a:tab pos="885825" algn="l"/>
+                <a:tab pos="1343025" algn="l"/>
+                <a:tab pos="1800225" algn="l"/>
+                <a:tab pos="2257425" algn="l"/>
+                <a:tab pos="2714625" algn="l"/>
+                <a:tab pos="3171825" algn="l"/>
+                <a:tab pos="3629025" algn="l"/>
+                <a:tab pos="4086225" algn="l"/>
+                <a:tab pos="4543425" algn="l"/>
+                <a:tab pos="5000625" algn="l"/>
+                <a:tab pos="5457825" algn="l"/>
+                <a:tab pos="5915025" algn="l"/>
+                <a:tab pos="6372225" algn="l"/>
+                <a:tab pos="6829425" algn="l"/>
+                <a:tab pos="7286625" algn="l"/>
+                <a:tab pos="7743825" algn="l"/>
+                <a:tab pos="8201025" algn="l"/>
+                <a:tab pos="8658225" algn="l"/>
+                <a:tab pos="9115425" algn="l"/>
+                <a:tab pos="9572625" algn="l"/>
+              </a:tabLst>
+              <a:defRPr sz="2400">
+                <a:solidFill>
+                  <a:srgbClr val="000000"/>
+                </a:solidFill>
+                <a:latin typeface="Arial" charset="0"/>
+                <a:ea typeface="ＭＳ Ｐゴシック" charset="0"/>
+                <a:cs typeface="DejaVu Sans" charset="0"/>
+              </a:defRPr>
+            </a:lvl5pPr>
+            <a:lvl6pPr marL="2514600" indent="-228600" fontAlgn="base" hangingPunct="0">
+              <a:lnSpc>
+                <a:spcPct val="96000"/>
+              </a:lnSpc>
+              <a:spcBef>
+                <a:spcPct val="0"/>
+              </a:spcBef>
+              <a:spcAft>
+                <a:spcPct val="0"/>
+              </a:spcAft>
+              <a:buClr>
+                <a:srgbClr val="000000"/>
+              </a:buClr>
+              <a:buSzPct val="100000"/>
+              <a:buFont typeface="Times New Roman" charset="0"/>
+              <a:tabLst>
+                <a:tab pos="428625" algn="l"/>
+                <a:tab pos="885825" algn="l"/>
+                <a:tab pos="1343025" algn="l"/>
+                <a:tab pos="1800225" algn="l"/>
+                <a:tab pos="2257425" algn="l"/>
+                <a:tab pos="2714625" algn="l"/>
+                <a:tab pos="3171825" algn="l"/>
+                <a:tab pos="3629025" algn="l"/>
+                <a:tab pos="4086225" algn="l"/>
+                <a:tab pos="4543425" algn="l"/>
+                <a:tab pos="5000625" algn="l"/>
+                <a:tab pos="5457825" algn="l"/>
+                <a:tab pos="5915025" algn="l"/>
+                <a:tab pos="6372225" algn="l"/>
+                <a:tab pos="6829425" algn="l"/>
+                <a:tab pos="7286625" algn="l"/>
+                <a:tab pos="7743825" algn="l"/>
+                <a:tab pos="8201025" algn="l"/>
+                <a:tab pos="8658225" algn="l"/>
+                <a:tab pos="9115425" algn="l"/>
+                <a:tab pos="9572625" algn="l"/>
+              </a:tabLst>
+              <a:defRPr sz="2400">
+                <a:solidFill>
+                  <a:srgbClr val="000000"/>
+                </a:solidFill>
+                <a:latin typeface="Arial" charset="0"/>
+                <a:ea typeface="ＭＳ Ｐゴシック" charset="0"/>
+                <a:cs typeface="DejaVu Sans" charset="0"/>
+              </a:defRPr>
+            </a:lvl6pPr>
+            <a:lvl7pPr marL="2971800" indent="-228600" fontAlgn="base" hangingPunct="0">
+              <a:lnSpc>
+                <a:spcPct val="96000"/>
+              </a:lnSpc>
+              <a:spcBef>
+                <a:spcPct val="0"/>
+              </a:spcBef>
+              <a:spcAft>
+                <a:spcPct val="0"/>
+              </a:spcAft>
+              <a:buClr>
+                <a:srgbClr val="000000"/>
+              </a:buClr>
+              <a:buSzPct val="100000"/>
+              <a:buFont typeface="Times New Roman" charset="0"/>
+              <a:tabLst>
+                <a:tab pos="428625" algn="l"/>
+                <a:tab pos="885825" algn="l"/>
+                <a:tab pos="1343025" algn="l"/>
+                <a:tab pos="1800225" algn="l"/>
+                <a:tab pos="2257425" algn="l"/>
+                <a:tab pos="2714625" algn="l"/>
+                <a:tab pos="3171825" algn="l"/>
+                <a:tab pos="3629025" algn="l"/>
+                <a:tab pos="4086225" algn="l"/>
+                <a:tab pos="4543425" algn="l"/>
+                <a:tab pos="5000625" algn="l"/>
+                <a:tab pos="5457825" algn="l"/>
+                <a:tab pos="5915025" algn="l"/>
+                <a:tab pos="6372225" algn="l"/>
+                <a:tab pos="6829425" algn="l"/>
+                <a:tab pos="7286625" algn="l"/>
+                <a:tab pos="7743825" algn="l"/>
+                <a:tab pos="8201025" algn="l"/>
+                <a:tab pos="8658225" algn="l"/>
+                <a:tab pos="9115425" algn="l"/>
+                <a:tab pos="9572625" algn="l"/>
+              </a:tabLst>
+              <a:defRPr sz="2400">
+                <a:solidFill>
+                  <a:srgbClr val="000000"/>
+                </a:solidFill>
+                <a:latin typeface="Arial" charset="0"/>
+                <a:ea typeface="ＭＳ Ｐゴシック" charset="0"/>
+                <a:cs typeface="DejaVu Sans" charset="0"/>
+              </a:defRPr>
+            </a:lvl7pPr>
+            <a:lvl8pPr marL="3429000" indent="-228600" fontAlgn="base" hangingPunct="0">
+              <a:lnSpc>
+                <a:spcPct val="96000"/>
+              </a:lnSpc>
+              <a:spcBef>
+                <a:spcPct val="0"/>
+              </a:spcBef>
+              <a:spcAft>
+                <a:spcPct val="0"/>
+              </a:spcAft>
+              <a:buClr>
+                <a:srgbClr val="000000"/>
+              </a:buClr>
+              <a:buSzPct val="100000"/>
+              <a:buFont typeface="Times New Roman" charset="0"/>
+              <a:tabLst>
+                <a:tab pos="428625" algn="l"/>
+                <a:tab pos="885825" algn="l"/>
+                <a:tab pos="1343025" algn="l"/>
+                <a:tab pos="1800225" algn="l"/>
+                <a:tab pos="2257425" algn="l"/>
+                <a:tab pos="2714625" algn="l"/>
+                <a:tab pos="3171825" algn="l"/>
+                <a:tab pos="3629025" algn="l"/>
+                <a:tab pos="4086225" algn="l"/>
+                <a:tab pos="4543425" algn="l"/>
+                <a:tab pos="5000625" algn="l"/>
+                <a:tab pos="5457825" algn="l"/>
+                <a:tab pos="5915025" algn="l"/>
+                <a:tab pos="6372225" algn="l"/>
+                <a:tab pos="6829425" algn="l"/>
+                <a:tab pos="7286625" algn="l"/>
+                <a:tab pos="7743825" algn="l"/>
+                <a:tab pos="8201025" algn="l"/>
+                <a:tab pos="8658225" algn="l"/>
+                <a:tab pos="9115425" algn="l"/>
+                <a:tab pos="9572625" algn="l"/>
+              </a:tabLst>
+              <a:defRPr sz="2400">
+                <a:solidFill>
+                  <a:srgbClr val="000000"/>
+                </a:solidFill>
+                <a:latin typeface="Arial" charset="0"/>
+                <a:ea typeface="ＭＳ Ｐゴシック" charset="0"/>
+                <a:cs typeface="DejaVu Sans" charset="0"/>
+              </a:defRPr>
+            </a:lvl8pPr>
+            <a:lvl9pPr marL="3886200" indent="-228600" fontAlgn="base" hangingPunct="0">
+              <a:lnSpc>
+                <a:spcPct val="96000"/>
+              </a:lnSpc>
+              <a:spcBef>
+                <a:spcPct val="0"/>
+              </a:spcBef>
+              <a:spcAft>
+                <a:spcPct val="0"/>
+              </a:spcAft>
+              <a:buClr>
+                <a:srgbClr val="000000"/>
+              </a:buClr>
+              <a:buSzPct val="100000"/>
+              <a:buFont typeface="Times New Roman" charset="0"/>
+              <a:tabLst>
+                <a:tab pos="428625" algn="l"/>
+                <a:tab pos="885825" algn="l"/>
+                <a:tab pos="1343025" algn="l"/>
+                <a:tab pos="1800225" algn="l"/>
+                <a:tab pos="2257425" algn="l"/>
+                <a:tab pos="2714625" algn="l"/>
+                <a:tab pos="3171825" algn="l"/>
+                <a:tab pos="3629025" algn="l"/>
+                <a:tab pos="4086225" algn="l"/>
+                <a:tab pos="4543425" algn="l"/>
+                <a:tab pos="5000625" algn="l"/>
+                <a:tab pos="5457825" algn="l"/>
+                <a:tab pos="5915025" algn="l"/>
+                <a:tab pos="6372225" algn="l"/>
+                <a:tab pos="6829425" algn="l"/>
+                <a:tab pos="7286625" algn="l"/>
+                <a:tab pos="7743825" algn="l"/>
+                <a:tab pos="8201025" algn="l"/>
+                <a:tab pos="8658225" algn="l"/>
+                <a:tab pos="9115425" algn="l"/>
+                <a:tab pos="9572625" algn="l"/>
+              </a:tabLst>
+              <a:defRPr sz="2400">
+                <a:solidFill>
+                  <a:srgbClr val="000000"/>
+                </a:solidFill>
+                <a:latin typeface="Arial" charset="0"/>
+                <a:ea typeface="ＭＳ Ｐゴシック" charset="0"/>
+                <a:cs typeface="DejaVu Sans" charset="0"/>
+              </a:defRPr>
+            </a:lvl9pPr>
+          </a:lstStyle>
+          <a:p>
+            <a:pPr>
+              <a:lnSpc>
+                <a:spcPct val="97000"/>
+              </a:lnSpc>
+              <a:spcAft>
+                <a:spcPts val="1413"/>
+              </a:spcAft>
+              <a:buClr>
+                <a:srgbClr val="FF6309"/>
+              </a:buClr>
+              <a:buSzPct val="45000"/>
+              <a:buFont typeface="Wingdings" charset="0"/>
+              <a:buChar char=""/>
+              <a:defRPr/>
+            </a:pPr>
+            <a:r>
+              <a:rPr lang="en-US" sz="2000" b="1" dirty="0">
+                <a:latin typeface="Courier" charset="0"/>
+                <a:ea typeface="Courier" charset="0"/>
+                <a:cs typeface="Courier" charset="0"/>
+              </a:rPr>
+              <a:t>l</a:t>
+            </a:r>
+            <a:r>
+              <a:rPr lang="en-US" sz="2000" b="1" dirty="0" smtClean="0">
+                <a:latin typeface="Courier" charset="0"/>
+                <a:ea typeface="Courier" charset="0"/>
+                <a:cs typeface="Courier" charset="0"/>
+              </a:rPr>
+              <a:t>imited</a:t>
+            </a:r>
+            <a:r>
+              <a:rPr lang="en-US" sz="2000" b="1" dirty="0"/>
+              <a:t>: </a:t>
+            </a:r>
+            <a:r>
+              <a:rPr lang="en-US" sz="2000" dirty="0"/>
+              <a:t>Indicates that if a client should abuse the number of packets rate control, the packets will be discarded by the sever. If the Kiss of Death packet is enabled, it will be sent back to the abusive host. The rates are configurable by an admin but the defaults are assumed here.</a:t>
+            </a:r>
+          </a:p>
+          <a:p>
+            <a:pPr>
+              <a:lnSpc>
+                <a:spcPct val="97000"/>
+              </a:lnSpc>
+              <a:spcAft>
+                <a:spcPts val="1413"/>
+              </a:spcAft>
+              <a:buClr>
+                <a:srgbClr val="FF6309"/>
+              </a:buClr>
+              <a:buSzPct val="45000"/>
+              <a:buFont typeface="Wingdings" charset="0"/>
+              <a:buChar char=""/>
+              <a:defRPr/>
+            </a:pPr>
+            <a:r>
+              <a:rPr lang="en-US" sz="2000" b="1" dirty="0" err="1" smtClean="0">
+                <a:latin typeface="Courier" charset="0"/>
+                <a:ea typeface="Courier" charset="0"/>
+                <a:cs typeface="Courier" charset="0"/>
+              </a:rPr>
+              <a:t>kod</a:t>
+            </a:r>
+            <a:r>
+              <a:rPr lang="en-US" sz="2000" b="1" dirty="0" smtClean="0"/>
+              <a:t>: </a:t>
+            </a:r>
+            <a:r>
+              <a:rPr lang="en-US" sz="2000" dirty="0"/>
+              <a:t>Kiss of Death. If a host violates the limit of packets to the server, the server will respond with s </a:t>
+            </a:r>
+            <a:r>
+              <a:rPr lang="en-US" sz="2000" dirty="0" err="1"/>
+              <a:t>KoD</a:t>
+            </a:r>
+            <a:r>
+              <a:rPr lang="en-US" sz="2000" dirty="0"/>
+              <a:t> packet to the violating host.</a:t>
+            </a:r>
+          </a:p>
+          <a:p>
+            <a:pPr>
+              <a:lnSpc>
+                <a:spcPct val="97000"/>
+              </a:lnSpc>
+              <a:spcAft>
+                <a:spcPts val="1413"/>
+              </a:spcAft>
+              <a:buClr>
+                <a:srgbClr val="FF6309"/>
+              </a:buClr>
+              <a:buSzPct val="45000"/>
+              <a:buFont typeface="Wingdings" charset="0"/>
+              <a:buChar char=""/>
+              <a:defRPr/>
+            </a:pPr>
+            <a:r>
+              <a:rPr lang="en-US" sz="2000" b="1" dirty="0" err="1" smtClean="0">
+                <a:latin typeface="Courier" charset="0"/>
+                <a:ea typeface="Courier" charset="0"/>
+                <a:cs typeface="Courier" charset="0"/>
+              </a:rPr>
+              <a:t>notrap</a:t>
+            </a:r>
+            <a:r>
+              <a:rPr lang="en-US" sz="2000" b="1" dirty="0"/>
+              <a:t>: </a:t>
+            </a:r>
+            <a:r>
+              <a:rPr lang="en-US" sz="2000" dirty="0"/>
+              <a:t>Decline mode 6 control messages. These control messages are used for remote logging programs.</a:t>
+            </a:r>
+          </a:p>
+          <a:p>
+            <a:pPr>
+              <a:lnSpc>
+                <a:spcPct val="97000"/>
+              </a:lnSpc>
+              <a:spcAft>
+                <a:spcPts val="1413"/>
+              </a:spcAft>
+              <a:buClr>
+                <a:srgbClr val="FF6309"/>
+              </a:buClr>
+              <a:buSzPct val="45000"/>
+              <a:buFont typeface="Wingdings" charset="0"/>
+              <a:buChar char=""/>
+              <a:defRPr/>
+            </a:pPr>
+            <a:r>
+              <a:rPr lang="en-US" sz="2000" b="1" dirty="0" err="1" smtClean="0">
+                <a:latin typeface="Courier" charset="0"/>
+                <a:ea typeface="Courier" charset="0"/>
+                <a:cs typeface="Courier" charset="0"/>
+              </a:rPr>
+              <a:t>nomodify</a:t>
+            </a:r>
+            <a:r>
+              <a:rPr lang="en-US" sz="2000" b="1" dirty="0"/>
+              <a:t>: </a:t>
+            </a:r>
+            <a:r>
+              <a:rPr lang="en-US" sz="2000" dirty="0"/>
+              <a:t>Prevents </a:t>
+            </a:r>
+            <a:r>
+              <a:rPr lang="en-US" sz="2000" dirty="0" err="1"/>
+              <a:t>ntpq</a:t>
+            </a:r>
+            <a:r>
+              <a:rPr lang="en-US" sz="2000" dirty="0"/>
+              <a:t> and </a:t>
+            </a:r>
+            <a:r>
+              <a:rPr lang="en-US" sz="2000" dirty="0" err="1"/>
+              <a:t>ntpdc</a:t>
+            </a:r>
+            <a:r>
+              <a:rPr lang="en-US" sz="2000" dirty="0"/>
+              <a:t> queries that would modify the server’s configuration but informational queries are still permitted.</a:t>
+            </a:r>
+          </a:p>
+          <a:p>
+            <a:pPr>
+              <a:lnSpc>
+                <a:spcPct val="97000"/>
+              </a:lnSpc>
+              <a:spcAft>
+                <a:spcPts val="1413"/>
+              </a:spcAft>
+              <a:buClr>
+                <a:srgbClr val="FF6309"/>
+              </a:buClr>
+              <a:buSzPct val="45000"/>
+              <a:buFont typeface="Wingdings" charset="0"/>
+              <a:buChar char=""/>
+              <a:defRPr/>
+            </a:pPr>
+            <a:r>
+              <a:rPr lang="en-US" sz="2000" b="1" dirty="0" err="1" smtClean="0">
+                <a:latin typeface="Courier" charset="0"/>
+                <a:ea typeface="Courier" charset="0"/>
+                <a:cs typeface="Courier" charset="0"/>
+              </a:rPr>
               <a:t>noquery</a:t>
             </a:r>
             <a:r>
@@ -20565,7 +23193,7 @@
 </p:sld>
 </file>
 
-<file path=ppt/slides/slide14.xml><?xml version="1.0" encoding="utf-8"?>
+<file path=ppt/slides/slide15.xml><?xml version="1.0" encoding="utf-8"?>
 <p:sld xmlns:a="http://schemas.openxmlformats.org/drawingml/2006/main" xmlns:r="http://schemas.openxmlformats.org/officeDocument/2006/relationships" xmlns:p="http://schemas.openxmlformats.org/presentationml/2006/main">
   <p:cSld>
     <p:bg>
@@ -22100,7 +24728,7 @@
 </p:sld>
 </file>
 
-<file path=ppt/slides/slide15.xml><?xml version="1.0" encoding="utf-8"?>
+<file path=ppt/slides/slide16.xml><?xml version="1.0" encoding="utf-8"?>
 <p:sld xmlns:a="http://schemas.openxmlformats.org/drawingml/2006/main" xmlns:r="http://schemas.openxmlformats.org/officeDocument/2006/relationships" xmlns:p="http://schemas.openxmlformats.org/presentationml/2006/main">
   <p:cSld>
     <p:bg>
@@ -22986,52 +25614,163 @@
             </a:pPr>
             <a:r>
               <a:rPr lang="en-GB" sz="3200" dirty="0" smtClean="0">
-                <a:latin typeface="Courier New" charset="0"/>
+                <a:latin typeface="Courier" charset="0"/>
+                <a:ea typeface="Courier" charset="0"/>
+                <a:cs typeface="Courier" charset="0"/>
+              </a:rPr>
+              <a:t>$ </a:t>
+            </a:r>
+            <a:r>
+              <a:rPr lang="en-GB" sz="3200" dirty="0" err="1" smtClean="0">
+                <a:latin typeface="Courier" charset="0"/>
+                <a:ea typeface="Courier" charset="0"/>
+                <a:cs typeface="Courier" charset="0"/>
+              </a:rPr>
+              <a:t>sudo</a:t>
+            </a:r>
+            <a:r>
+              <a:rPr lang="en-GB" sz="3200" dirty="0" smtClean="0">
+                <a:latin typeface="Courier" charset="0"/>
+                <a:ea typeface="Courier" charset="0"/>
+                <a:cs typeface="Courier" charset="0"/>
+              </a:rPr>
+              <a:t> /</a:t>
+            </a:r>
+            <a:r>
+              <a:rPr lang="en-GB" sz="3200" dirty="0" err="1" smtClean="0">
+                <a:latin typeface="Courier" charset="0"/>
+                <a:ea typeface="Courier" charset="0"/>
+                <a:cs typeface="Courier" charset="0"/>
+              </a:rPr>
+              <a:t>etc</a:t>
+            </a:r>
+            <a:r>
+              <a:rPr lang="en-GB" sz="3200" dirty="0" smtClean="0">
+                <a:latin typeface="Courier" charset="0"/>
+                <a:ea typeface="Courier" charset="0"/>
+                <a:cs typeface="Courier" charset="0"/>
               </a:rPr>
               <a:t>/</a:t>
             </a:r>
             <a:r>
               <a:rPr lang="en-GB" sz="3200" dirty="0" err="1" smtClean="0">
-                <a:latin typeface="Courier New" charset="0"/>
+                <a:latin typeface="Courier" charset="0"/>
+                <a:ea typeface="Courier" charset="0"/>
+                <a:cs typeface="Courier" charset="0"/>
               </a:rPr>
-              <a:t>etc</a:t>
+              <a:t>init.d</a:t>
             </a:r>
             <a:r>
               <a:rPr lang="en-GB" sz="3200" dirty="0" smtClean="0">
-                <a:latin typeface="Courier New" charset="0"/>
+                <a:latin typeface="Courier" charset="0"/>
+                <a:ea typeface="Courier" charset="0"/>
+                <a:cs typeface="Courier" charset="0"/>
               </a:rPr>
               <a:t>/</a:t>
             </a:r>
             <a:r>
               <a:rPr lang="en-GB" sz="3200" dirty="0" err="1" smtClean="0">
-                <a:latin typeface="Courier New" charset="0"/>
-              </a:rPr>
-              <a:t>init.d</a:t>
-            </a:r>
-            <a:r>
-              <a:rPr lang="en-GB" sz="3200" dirty="0" smtClean="0">
-                <a:latin typeface="Courier New" charset="0"/>
-              </a:rPr>
-              <a:t>/</a:t>
-            </a:r>
-            <a:r>
-              <a:rPr lang="en-GB" sz="3200" dirty="0" err="1" smtClean="0">
-                <a:latin typeface="Courier New" charset="0"/>
+                <a:latin typeface="Courier" charset="0"/>
+                <a:ea typeface="Courier" charset="0"/>
+                <a:cs typeface="Courier" charset="0"/>
               </a:rPr>
               <a:t>ntp</a:t>
             </a:r>
             <a:r>
               <a:rPr lang="en-GB" sz="3200" dirty="0" smtClean="0">
-                <a:latin typeface="Courier New" charset="0"/>
+                <a:latin typeface="Courier" charset="0"/>
+                <a:ea typeface="Courier" charset="0"/>
+                <a:cs typeface="Courier" charset="0"/>
               </a:rPr>
-              <a:t> </a:t>
-            </a:r>
+              <a:t> start</a:t>
+            </a:r>
+          </a:p>
+          <a:p>
+            <a:pPr>
+              <a:lnSpc>
+                <a:spcPct val="83000"/>
+              </a:lnSpc>
+              <a:spcAft>
+                <a:spcPts val="1413"/>
+              </a:spcAft>
+              <a:buClr>
+                <a:srgbClr val="FF6309"/>
+              </a:buClr>
+              <a:buSzPct val="45000"/>
+              <a:buFont typeface="Wingdings" charset="0"/>
+              <a:buChar char=""/>
+              <a:defRPr/>
+            </a:pPr>
             <a:r>
               <a:rPr lang="en-GB" sz="3200" dirty="0" smtClean="0">
-                <a:latin typeface="Courier New" charset="0"/>
+                <a:latin typeface="Courier" charset="0"/>
+                <a:ea typeface="Courier" charset="0"/>
+                <a:cs typeface="Courier" charset="0"/>
               </a:rPr>
-              <a:t>start</a:t>
-            </a:r>
+              <a:t>Or</a:t>
+            </a:r>
+          </a:p>
+          <a:p>
+            <a:pPr>
+              <a:lnSpc>
+                <a:spcPct val="83000"/>
+              </a:lnSpc>
+              <a:spcAft>
+                <a:spcPts val="1413"/>
+              </a:spcAft>
+              <a:buClr>
+                <a:srgbClr val="FF6309"/>
+              </a:buClr>
+              <a:buSzPct val="45000"/>
+              <a:buFont typeface="Wingdings" charset="0"/>
+              <a:buChar char=""/>
+              <a:defRPr/>
+            </a:pPr>
+            <a:r>
+              <a:rPr lang="en-GB" sz="3200" dirty="0" smtClean="0">
+                <a:latin typeface="Courier" charset="0"/>
+                <a:ea typeface="Courier" charset="0"/>
+                <a:cs typeface="Courier" charset="0"/>
+              </a:rPr>
+              <a:t>$ </a:t>
+            </a:r>
+            <a:r>
+              <a:rPr lang="en-GB" sz="3200" dirty="0" err="1" smtClean="0">
+                <a:latin typeface="Courier" charset="0"/>
+                <a:ea typeface="Courier" charset="0"/>
+                <a:cs typeface="Courier" charset="0"/>
+              </a:rPr>
+              <a:t>sudo</a:t>
+            </a:r>
+            <a:r>
+              <a:rPr lang="en-GB" sz="3200" dirty="0" smtClean="0">
+                <a:latin typeface="Courier" charset="0"/>
+                <a:ea typeface="Courier" charset="0"/>
+                <a:cs typeface="Courier" charset="0"/>
+              </a:rPr>
+              <a:t> service </a:t>
+            </a:r>
+            <a:r>
+              <a:rPr lang="en-GB" sz="3200" dirty="0" err="1" smtClean="0">
+                <a:latin typeface="Courier" charset="0"/>
+                <a:ea typeface="Courier" charset="0"/>
+                <a:cs typeface="Courier" charset="0"/>
+              </a:rPr>
+              <a:t>ntp</a:t>
+            </a:r>
+            <a:r>
+              <a:rPr lang="en-GB" sz="3200" dirty="0" smtClean="0">
+                <a:latin typeface="Courier" charset="0"/>
+                <a:ea typeface="Courier" charset="0"/>
+                <a:cs typeface="Courier" charset="0"/>
+              </a:rPr>
+              <a:t> start</a:t>
+            </a:r>
+            <a:endParaRPr lang="en-GB" sz="3200" dirty="0" smtClean="0">
+              <a:latin typeface="Courier" charset="0"/>
+              <a:ea typeface="Courier" charset="0"/>
+              <a:cs typeface="Courier" charset="0"/>
+            </a:endParaRPr>
           </a:p>
           <a:p>
             <a:pPr>
@@ -23095,6 +25834,76 @@
               <a:latin typeface="Trebuchet MS" charset="0"/>
             </a:endParaRPr>
           </a:p>
+          <a:p>
+            <a:pPr>
+              <a:lnSpc>
+                <a:spcPct val="97000"/>
+              </a:lnSpc>
+              <a:spcAft>
+                <a:spcPts val="1413"/>
+              </a:spcAft>
+              <a:buClr>
+                <a:srgbClr val="FF6309"/>
+              </a:buClr>
+              <a:buSzPct val="45000"/>
+              <a:buFont typeface="Wingdings" charset="0"/>
+              <a:buChar char=""/>
+              <a:defRPr/>
+            </a:pPr>
+            <a:r>
+              <a:rPr lang="en-GB" sz="3200" dirty="0" smtClean="0">
+                <a:latin typeface="Courier" charset="0"/>
+                <a:ea typeface="Courier" charset="0"/>
+                <a:cs typeface="Courier" charset="0"/>
+              </a:rPr>
+              <a:t>$ </a:t>
+            </a:r>
+            <a:r>
+              <a:rPr lang="en-GB" sz="3200" dirty="0" err="1" smtClean="0">
+                <a:latin typeface="Courier" charset="0"/>
+                <a:ea typeface="Courier" charset="0"/>
+                <a:cs typeface="Courier" charset="0"/>
+              </a:rPr>
+              <a:t>sudo</a:t>
+            </a:r>
+            <a:r>
+              <a:rPr lang="en-GB" sz="3200" dirty="0" smtClean="0">
+                <a:latin typeface="Courier" charset="0"/>
+                <a:ea typeface="Courier" charset="0"/>
+                <a:cs typeface="Courier" charset="0"/>
+              </a:rPr>
+              <a:t> </a:t>
+            </a:r>
+            <a:r>
+              <a:rPr lang="en-GB" sz="3200" dirty="0" err="1" smtClean="0">
+                <a:latin typeface="Courier" charset="0"/>
+                <a:ea typeface="Courier" charset="0"/>
+                <a:cs typeface="Courier" charset="0"/>
+              </a:rPr>
+              <a:t>ntpq</a:t>
+            </a:r>
+            <a:r>
+              <a:rPr lang="en-GB" sz="3200" dirty="0" smtClean="0">
+                <a:latin typeface="Courier" charset="0"/>
+                <a:ea typeface="Courier" charset="0"/>
+                <a:cs typeface="Courier" charset="0"/>
+              </a:rPr>
+              <a:t> -</a:t>
+            </a:r>
+            <a:r>
+              <a:rPr lang="en-GB" sz="3200" dirty="0" err="1" smtClean="0">
+                <a:latin typeface="Courier" charset="0"/>
+                <a:ea typeface="Courier" charset="0"/>
+                <a:cs typeface="Courier" charset="0"/>
+              </a:rPr>
+              <a:t>pn</a:t>
+            </a:r>
+            <a:endParaRPr lang="en-GB" sz="3200" dirty="0">
+              <a:latin typeface="Courier" charset="0"/>
+              <a:ea typeface="Courier" charset="0"/>
+              <a:cs typeface="Courier" charset="0"/>
+            </a:endParaRPr>
+          </a:p>
         </p:txBody>
       </p:sp>
       <p:sp>
@@ -23105,8 +25914,8 @@
         </p:nvSpPr>
         <p:spPr>
           <a:xfrm>
-            <a:off x="632617" y="3551237"/>
-            <a:ext cx="8973345" cy="2751522"/>
+            <a:off x="1" y="5227637"/>
+            <a:ext cx="10080624" cy="1983107"/>
           </a:xfrm>
           <a:prstGeom prst="rect">
             <a:avLst/>
@@ -23122,49 +25931,89 @@
           <a:lstStyle/>
           <a:p>
             <a:r>
-              <a:rPr lang="is-IS" sz="2000" dirty="0"/>
-              <a:t>ntpq -p</a:t>
+              <a:rPr lang="is-IS" sz="1600" smtClean="0">
+                <a:latin typeface="Courier" charset="0"/>
+                <a:ea typeface="Courier" charset="0"/>
+                <a:cs typeface="Courier" charset="0"/>
+              </a:rPr>
+              <a:t>$ sudo ntpq </a:t>
+            </a:r>
+            <a:r>
+              <a:rPr lang="is-IS" sz="1600" dirty="0">
+                <a:latin typeface="Courier" charset="0"/>
+                <a:ea typeface="Courier" charset="0"/>
+                <a:cs typeface="Courier" charset="0"/>
+              </a:rPr>
+              <a:t>-p</a:t>
             </a:r>
           </a:p>
           <a:p>
             <a:r>
-              <a:rPr lang="is-IS" sz="2000" dirty="0"/>
+              <a:rPr lang="is-IS" sz="1600" dirty="0">
+                <a:latin typeface="Courier" charset="0"/>
+                <a:ea typeface="Courier" charset="0"/>
+                <a:cs typeface="Courier" charset="0"/>
+              </a:rPr>
               <a:t>     remote           refid      st t when poll reach   delay   offset  jitter</a:t>
             </a:r>
           </a:p>
           <a:p>
             <a:r>
-              <a:rPr lang="is-IS" sz="2000" dirty="0"/>
+              <a:rPr lang="is-IS" sz="1600" dirty="0">
+                <a:latin typeface="Courier" charset="0"/>
+                <a:ea typeface="Courier" charset="0"/>
+                <a:cs typeface="Courier" charset="0"/>
+              </a:rPr>
               <a:t>==============================================================================</a:t>
             </a:r>
           </a:p>
           <a:p>
             <a:r>
-              <a:rPr lang="is-IS" sz="2000" dirty="0"/>
+              <a:rPr lang="is-IS" sz="1600" dirty="0">
+                <a:latin typeface="Courier" charset="0"/>
+                <a:ea typeface="Courier" charset="0"/>
+                <a:cs typeface="Courier" charset="0"/>
+              </a:rPr>
               <a:t>*riditt.de       131.188.3.221    2 u   27   64    1  183.792    0.439   0.079</a:t>
             </a:r>
           </a:p>
           <a:p>
             <a:r>
-              <a:rPr lang="is-IS" sz="2000" dirty="0"/>
+              <a:rPr lang="is-IS" sz="1600" dirty="0">
+                <a:latin typeface="Courier" charset="0"/>
+                <a:ea typeface="Courier" charset="0"/>
+                <a:cs typeface="Courier" charset="0"/>
+              </a:rPr>
               <a:t> lofn.fancube.co .INIT.          16 u    -   64    0    0.000    0.000   0.000</a:t>
             </a:r>
           </a:p>
           <a:p>
             <a:r>
-              <a:rPr lang="is-IS" sz="2000" dirty="0"/>
+              <a:rPr lang="is-IS" sz="1600" dirty="0">
+                <a:latin typeface="Courier" charset="0"/>
+                <a:ea typeface="Courier" charset="0"/>
+                <a:cs typeface="Courier" charset="0"/>
+              </a:rPr>
               <a:t> service1-eth3.d 228.143.95.23    2 u   28   64    1  200.457   -1.965   0.035</a:t>
             </a:r>
           </a:p>
           <a:p>
             <a:r>
-              <a:rPr lang="is-IS" sz="2000" dirty="0"/>
+              <a:rPr lang="is-IS" sz="1600" dirty="0">
+                <a:latin typeface="Courier" charset="0"/>
+                <a:ea typeface="Courier" charset="0"/>
+                <a:cs typeface="Courier" charset="0"/>
+              </a:rPr>
               <a:t> makaki.miuku.ne 218.186.3.36     2 u   28   64    1  377.207   -7.893   0.169</a:t>
             </a:r>
           </a:p>
           <a:p>
             <a:r>
-              <a:rPr lang="is-IS" sz="2000" dirty="0"/>
+              <a:rPr lang="is-IS" sz="1600" dirty="0">
+                <a:latin typeface="Courier" charset="0"/>
+                <a:ea typeface="Courier" charset="0"/>
+                <a:cs typeface="Courier" charset="0"/>
+              </a:rPr>
               <a:t> noc.mtg.afnog.o 45.222.43.250    3 u   27   64    1    0.284    1.810   0.040</a:t>
             </a:r>
           </a:p>
@@ -23206,7 +26055,7 @@
 </p:sld>
 </file>
 
-<file path=ppt/slides/slide16.xml><?xml version="1.0" encoding="utf-8"?>
+<file path=ppt/slides/slide17.xml><?xml version="1.0" encoding="utf-8"?>
 <p:sld xmlns:a="http://schemas.openxmlformats.org/drawingml/2006/main" xmlns:r="http://schemas.openxmlformats.org/officeDocument/2006/relationships" xmlns:p="http://schemas.openxmlformats.org/presentationml/2006/main">
   <p:cSld>
     <p:bg>
@@ -35589,15 +38438,27 @@
                 <a:ea typeface="Arial" charset="0"/>
                 <a:cs typeface="Arial" charset="0"/>
               </a:rPr>
-              <a:t>The configuration file for NTP is stored at ‘/</a:t>
+              <a:t>The configuration file for NTP is stored at </a:t>
+            </a:r>
+            <a:r>
+              <a:rPr lang="en-US" altLang="x-none" sz="2800" dirty="0" smtClean="0">
+                <a:solidFill>
+                  <a:srgbClr val="000000"/>
+                </a:solidFill>
+                <a:latin typeface="Courier" charset="0"/>
+                <a:ea typeface="Courier" charset="0"/>
+                <a:cs typeface="Courier" charset="0"/>
+              </a:rPr>
+              <a:t>‘/</a:t>
             </a:r>
             <a:r>
               <a:rPr lang="en-US" altLang="x-none" sz="2800" dirty="0" err="1" smtClean="0">
                 <a:solidFill>
                   <a:srgbClr val="000000"/>
                 </a:solidFill>
-                <a:ea typeface="Arial" charset="0"/>
-                <a:cs typeface="Arial" charset="0"/>
+                <a:latin typeface="Courier" charset="0"/>
+                <a:ea typeface="Courier" charset="0"/>
+                <a:cs typeface="Courier" charset="0"/>
               </a:rPr>
               <a:t>etc</a:t>
             </a:r>
@@ -35606,8 +38467,9 @@
                 <a:solidFill>
                   <a:srgbClr val="000000"/>
                 </a:solidFill>
-                <a:ea typeface="Arial" charset="0"/>
-                <a:cs typeface="Arial" charset="0"/>
+                <a:latin typeface="Courier" charset="0"/>
+                <a:ea typeface="Courier" charset="0"/>
+                <a:cs typeface="Courier" charset="0"/>
               </a:rPr>
               <a:t>/</a:t>
             </a:r>
@@ -35616,8 +38478,9 @@
                 <a:solidFill>
                   <a:srgbClr val="000000"/>
                 </a:solidFill>
-                <a:ea typeface="Arial" charset="0"/>
-                <a:cs typeface="Arial" charset="0"/>
+                <a:latin typeface="Courier" charset="0"/>
+                <a:ea typeface="Courier" charset="0"/>
+                <a:cs typeface="Courier" charset="0"/>
               </a:rPr>
               <a:t>ntp.conf</a:t>
             </a:r>

</xml_diff>

<commit_message>
NTP Session Update #1
</commit_message>
<xml_diff>
--- a/ntp/ntp-service.pptx
+++ b/ntp/ntp-service.pptx
@@ -5,7 +5,7 @@
     <p:sldMasterId id="2147483648" r:id="rId1"/>
   </p:sldMasterIdLst>
   <p:notesMasterIdLst>
-    <p:notesMasterId r:id="rId22"/>
+    <p:notesMasterId r:id="rId27"/>
   </p:notesMasterIdLst>
   <p:sldIdLst>
     <p:sldId id="256" r:id="rId2"/>
@@ -27,7 +27,12 @@
     <p:sldId id="280" r:id="rId18"/>
     <p:sldId id="262" r:id="rId19"/>
     <p:sldId id="270" r:id="rId20"/>
-    <p:sldId id="272" r:id="rId21"/>
+    <p:sldId id="286" r:id="rId21"/>
+    <p:sldId id="285" r:id="rId22"/>
+    <p:sldId id="289" r:id="rId23"/>
+    <p:sldId id="287" r:id="rId24"/>
+    <p:sldId id="288" r:id="rId25"/>
+    <p:sldId id="272" r:id="rId26"/>
   </p:sldIdLst>
   <p:sldSz cx="10080625" cy="7559675"/>
   <p:notesSz cx="7772400" cy="10058400"/>
@@ -281,7 +286,7 @@
           <a:effectLst/>
           <a:extLst>
             <a:ext uri="{91240B29-F687-4f45-9708-019B960494DF}">
-              <a14:hiddenLine xmlns:a14="http://schemas.microsoft.com/office/drawing/2010/main" xmlns="" w="9360" cap="sq">
+              <a14:hiddenLine xmlns="" xmlns:a14="http://schemas.microsoft.com/office/drawing/2010/main" w="9360" cap="sq">
                 <a:solidFill>
                   <a:srgbClr val="000000"/>
                 </a:solidFill>
@@ -291,7 +296,7 @@
               </a14:hiddenLine>
             </a:ext>
             <a:ext uri="{AF507438-7753-43e0-B8FC-AC1667EBCBE1}">
-              <a14:hiddenEffects xmlns:a14="http://schemas.microsoft.com/office/drawing/2010/main" xmlns="">
+              <a14:hiddenEffects xmlns="" xmlns:a14="http://schemas.microsoft.com/office/drawing/2010/main">
                 <a:effectLst>
                   <a:outerShdw blurRad="63500" dist="38099" dir="2700000" algn="ctr" rotWithShape="0">
                     <a:srgbClr val="000000">
@@ -344,7 +349,7 @@
           <a:effectLst/>
           <a:extLst>
             <a:ext uri="{91240B29-F687-4f45-9708-019B960494DF}">
-              <a14:hiddenLine xmlns:a14="http://schemas.microsoft.com/office/drawing/2010/main" xmlns="" w="9525" cap="flat">
+              <a14:hiddenLine xmlns="" xmlns:a14="http://schemas.microsoft.com/office/drawing/2010/main" w="9525" cap="flat">
                 <a:solidFill>
                   <a:srgbClr val="3465A4"/>
                 </a:solidFill>
@@ -354,7 +359,7 @@
               </a14:hiddenLine>
             </a:ext>
             <a:ext uri="{AF507438-7753-43e0-B8FC-AC1667EBCBE1}">
-              <a14:hiddenEffects xmlns:a14="http://schemas.microsoft.com/office/drawing/2010/main" xmlns="">
+              <a14:hiddenEffects xmlns="" xmlns:a14="http://schemas.microsoft.com/office/drawing/2010/main">
                 <a:effectLst>
                   <a:outerShdw blurRad="63500" dist="38099" dir="2700000" algn="ctr" rotWithShape="0">
                     <a:srgbClr val="000000">
@@ -405,17 +410,17 @@
           <a:effectLst/>
           <a:extLst>
             <a:ext uri="{FAA26D3D-D897-4be2-8F04-BA451C77F1D7}">
-              <ma14:placeholderFlag xmlns:ma14="http://schemas.microsoft.com/office/mac/drawingml/2011/main" xmlns="" val="1"/>
+              <ma14:placeholderFlag xmlns="" xmlns:ma14="http://schemas.microsoft.com/office/mac/drawingml/2011/main" val="1"/>
             </a:ext>
             <a:ext uri="{909E8E84-426E-40dd-AFC4-6F175D3DCCD1}">
-              <a14:hiddenFill xmlns:a14="http://schemas.microsoft.com/office/drawing/2010/main" xmlns="">
+              <a14:hiddenFill xmlns="" xmlns:a14="http://schemas.microsoft.com/office/drawing/2010/main">
                 <a:solidFill>
                   <a:srgbClr val="FFFFFF"/>
                 </a:solidFill>
               </a14:hiddenFill>
             </a:ext>
             <a:ext uri="{91240B29-F687-4f45-9708-019B960494DF}">
-              <a14:hiddenLine xmlns:a14="http://schemas.microsoft.com/office/drawing/2010/main" xmlns="" w="9525" cap="flat">
+              <a14:hiddenLine xmlns="" xmlns:a14="http://schemas.microsoft.com/office/drawing/2010/main" w="9525" cap="flat">
                 <a:solidFill>
                   <a:srgbClr val="3465A4"/>
                 </a:solidFill>
@@ -425,7 +430,7 @@
               </a14:hiddenLine>
             </a:ext>
             <a:ext uri="{AF507438-7753-43e0-B8FC-AC1667EBCBE1}">
-              <a14:hiddenEffects xmlns:a14="http://schemas.microsoft.com/office/drawing/2010/main" xmlns="">
+              <a14:hiddenEffects xmlns="" xmlns:a14="http://schemas.microsoft.com/office/drawing/2010/main">
                 <a:effectLst>
                   <a:outerShdw blurRad="63500" dist="38099" dir="2700000" algn="ctr" rotWithShape="0">
                     <a:schemeClr val="bg2">
@@ -463,17 +468,17 @@
           <a:effectLst/>
           <a:extLst>
             <a:ext uri="{FAA26D3D-D897-4be2-8F04-BA451C77F1D7}">
-              <ma14:placeholderFlag xmlns:ma14="http://schemas.microsoft.com/office/mac/drawingml/2011/main" xmlns="" val="1"/>
+              <ma14:placeholderFlag xmlns="" xmlns:ma14="http://schemas.microsoft.com/office/mac/drawingml/2011/main" val="1"/>
             </a:ext>
             <a:ext uri="{909E8E84-426E-40dd-AFC4-6F175D3DCCD1}">
-              <a14:hiddenFill xmlns:a14="http://schemas.microsoft.com/office/drawing/2010/main" xmlns="">
+              <a14:hiddenFill xmlns="" xmlns:a14="http://schemas.microsoft.com/office/drawing/2010/main">
                 <a:solidFill>
                   <a:srgbClr val="FFFFFF"/>
                 </a:solidFill>
               </a14:hiddenFill>
             </a:ext>
             <a:ext uri="{91240B29-F687-4f45-9708-019B960494DF}">
-              <a14:hiddenLine xmlns:a14="http://schemas.microsoft.com/office/drawing/2010/main" xmlns="" w="9525" cap="flat">
+              <a14:hiddenLine xmlns="" xmlns:a14="http://schemas.microsoft.com/office/drawing/2010/main" w="9525" cap="flat">
                 <a:solidFill>
                   <a:srgbClr val="3465A4"/>
                 </a:solidFill>
@@ -483,7 +488,7 @@
               </a14:hiddenLine>
             </a:ext>
             <a:ext uri="{AF507438-7753-43e0-B8FC-AC1667EBCBE1}">
-              <a14:hiddenEffects xmlns:a14="http://schemas.microsoft.com/office/drawing/2010/main" xmlns="">
+              <a14:hiddenEffects xmlns="" xmlns:a14="http://schemas.microsoft.com/office/drawing/2010/main">
                 <a:effectLst>
                   <a:outerShdw blurRad="63500" dist="38099" dir="2700000" algn="ctr" rotWithShape="0">
                     <a:schemeClr val="bg2">
@@ -531,14 +536,14 @@
           <a:effectLst/>
           <a:extLst>
             <a:ext uri="{909E8E84-426E-40dd-AFC4-6F175D3DCCD1}">
-              <a14:hiddenFill xmlns:a14="http://schemas.microsoft.com/office/drawing/2010/main" xmlns="">
+              <a14:hiddenFill xmlns="" xmlns:a14="http://schemas.microsoft.com/office/drawing/2010/main">
                 <a:solidFill>
                   <a:srgbClr val="FFFFFF"/>
                 </a:solidFill>
               </a14:hiddenFill>
             </a:ext>
             <a:ext uri="{91240B29-F687-4f45-9708-019B960494DF}">
-              <a14:hiddenLine xmlns:a14="http://schemas.microsoft.com/office/drawing/2010/main" xmlns="" w="9525" cap="flat">
+              <a14:hiddenLine xmlns="" xmlns:a14="http://schemas.microsoft.com/office/drawing/2010/main" w="9525" cap="flat">
                 <a:solidFill>
                   <a:srgbClr val="3465A4"/>
                 </a:solidFill>
@@ -548,7 +553,7 @@
               </a14:hiddenLine>
             </a:ext>
             <a:ext uri="{AF507438-7753-43e0-B8FC-AC1667EBCBE1}">
-              <a14:hiddenEffects xmlns:a14="http://schemas.microsoft.com/office/drawing/2010/main" xmlns="">
+              <a14:hiddenEffects xmlns="" xmlns:a14="http://schemas.microsoft.com/office/drawing/2010/main">
                 <a:effectLst>
                   <a:outerShdw blurRad="63500" dist="38099" dir="2700000" algn="ctr" rotWithShape="0">
                     <a:srgbClr val="000000">
@@ -597,14 +602,14 @@
           <a:effectLst/>
           <a:extLst>
             <a:ext uri="{909E8E84-426E-40dd-AFC4-6F175D3DCCD1}">
-              <a14:hiddenFill xmlns:a14="http://schemas.microsoft.com/office/drawing/2010/main" xmlns="">
+              <a14:hiddenFill xmlns="" xmlns:a14="http://schemas.microsoft.com/office/drawing/2010/main">
                 <a:solidFill>
                   <a:srgbClr val="FFFFFF"/>
                 </a:solidFill>
               </a14:hiddenFill>
             </a:ext>
             <a:ext uri="{91240B29-F687-4f45-9708-019B960494DF}">
-              <a14:hiddenLine xmlns:a14="http://schemas.microsoft.com/office/drawing/2010/main" xmlns="" w="9525" cap="flat">
+              <a14:hiddenLine xmlns="" xmlns:a14="http://schemas.microsoft.com/office/drawing/2010/main" w="9525" cap="flat">
                 <a:solidFill>
                   <a:srgbClr val="3465A4"/>
                 </a:solidFill>
@@ -614,7 +619,7 @@
               </a14:hiddenLine>
             </a:ext>
             <a:ext uri="{AF507438-7753-43e0-B8FC-AC1667EBCBE1}">
-              <a14:hiddenEffects xmlns:a14="http://schemas.microsoft.com/office/drawing/2010/main" xmlns="">
+              <a14:hiddenEffects xmlns="" xmlns:a14="http://schemas.microsoft.com/office/drawing/2010/main">
                 <a:effectLst>
                   <a:outerShdw blurRad="63500" dist="38099" dir="2700000" algn="ctr" rotWithShape="0">
                     <a:srgbClr val="000000">
@@ -663,14 +668,14 @@
           <a:effectLst/>
           <a:extLst>
             <a:ext uri="{909E8E84-426E-40dd-AFC4-6F175D3DCCD1}">
-              <a14:hiddenFill xmlns:a14="http://schemas.microsoft.com/office/drawing/2010/main" xmlns="">
+              <a14:hiddenFill xmlns="" xmlns:a14="http://schemas.microsoft.com/office/drawing/2010/main">
                 <a:solidFill>
                   <a:srgbClr val="FFFFFF"/>
                 </a:solidFill>
               </a14:hiddenFill>
             </a:ext>
             <a:ext uri="{91240B29-F687-4f45-9708-019B960494DF}">
-              <a14:hiddenLine xmlns:a14="http://schemas.microsoft.com/office/drawing/2010/main" xmlns="" w="9525" cap="flat">
+              <a14:hiddenLine xmlns="" xmlns:a14="http://schemas.microsoft.com/office/drawing/2010/main" w="9525" cap="flat">
                 <a:solidFill>
                   <a:srgbClr val="3465A4"/>
                 </a:solidFill>
@@ -680,7 +685,7 @@
               </a14:hiddenLine>
             </a:ext>
             <a:ext uri="{AF507438-7753-43e0-B8FC-AC1667EBCBE1}">
-              <a14:hiddenEffects xmlns:a14="http://schemas.microsoft.com/office/drawing/2010/main" xmlns="">
+              <a14:hiddenEffects xmlns="" xmlns:a14="http://schemas.microsoft.com/office/drawing/2010/main">
                 <a:effectLst>
                   <a:outerShdw blurRad="63500" dist="38099" dir="2700000" algn="ctr" rotWithShape="0">
                     <a:srgbClr val="000000">
@@ -731,17 +736,17 @@
           <a:effectLst/>
           <a:extLst>
             <a:ext uri="{FAA26D3D-D897-4be2-8F04-BA451C77F1D7}">
-              <ma14:placeholderFlag xmlns:ma14="http://schemas.microsoft.com/office/mac/drawingml/2011/main" xmlns="" val="1"/>
+              <ma14:placeholderFlag xmlns="" xmlns:ma14="http://schemas.microsoft.com/office/mac/drawingml/2011/main" val="1"/>
             </a:ext>
             <a:ext uri="{909E8E84-426E-40dd-AFC4-6F175D3DCCD1}">
-              <a14:hiddenFill xmlns:a14="http://schemas.microsoft.com/office/drawing/2010/main" xmlns="">
+              <a14:hiddenFill xmlns="" xmlns:a14="http://schemas.microsoft.com/office/drawing/2010/main">
                 <a:solidFill>
                   <a:srgbClr val="FFFFFF"/>
                 </a:solidFill>
               </a14:hiddenFill>
             </a:ext>
             <a:ext uri="{91240B29-F687-4f45-9708-019B960494DF}">
-              <a14:hiddenLine xmlns:a14="http://schemas.microsoft.com/office/drawing/2010/main" xmlns="" w="9525" cap="flat">
+              <a14:hiddenLine xmlns="" xmlns:a14="http://schemas.microsoft.com/office/drawing/2010/main" w="9525" cap="flat">
                 <a:solidFill>
                   <a:srgbClr val="3465A4"/>
                 </a:solidFill>
@@ -751,7 +756,7 @@
               </a14:hiddenLine>
             </a:ext>
             <a:ext uri="{AF507438-7753-43e0-B8FC-AC1667EBCBE1}">
-              <a14:hiddenEffects xmlns:a14="http://schemas.microsoft.com/office/drawing/2010/main" xmlns="">
+              <a14:hiddenEffects xmlns="" xmlns:a14="http://schemas.microsoft.com/office/drawing/2010/main">
                 <a:effectLst>
                   <a:outerShdw blurRad="63500" dist="38099" dir="2700000" algn="ctr" rotWithShape="0">
                     <a:schemeClr val="bg2">
@@ -1007,14 +1012,14 @@
         <p:spPr>
           <a:extLst>
             <a:ext uri="{909E8E84-426E-40dd-AFC4-6F175D3DCCD1}">
-              <a14:hiddenFill xmlns:a14="http://schemas.microsoft.com/office/drawing/2010/main" xmlns="">
+              <a14:hiddenFill xmlns="" xmlns:a14="http://schemas.microsoft.com/office/drawing/2010/main">
                 <a:solidFill>
                   <a:srgbClr val="FFFFFF"/>
                 </a:solidFill>
               </a14:hiddenFill>
             </a:ext>
             <a:ext uri="{91240B29-F687-4f45-9708-019B960494DF}">
-              <a14:hiddenLine xmlns:a14="http://schemas.microsoft.com/office/drawing/2010/main" xmlns="" w="9525" cap="flat">
+              <a14:hiddenLine xmlns="" xmlns:a14="http://schemas.microsoft.com/office/drawing/2010/main" w="9525" cap="flat">
                 <a:solidFill>
                   <a:srgbClr val="3465A4"/>
                 </a:solidFill>
@@ -1024,7 +1029,7 @@
               </a14:hiddenLine>
             </a:ext>
             <a:ext uri="{AF507438-7753-43e0-B8FC-AC1667EBCBE1}">
-              <a14:hiddenEffects xmlns:a14="http://schemas.microsoft.com/office/drawing/2010/main" xmlns="">
+              <a14:hiddenEffects xmlns="" xmlns:a14="http://schemas.microsoft.com/office/drawing/2010/main">
                 <a:effectLst>
                   <a:outerShdw blurRad="63500" dist="38099" dir="2700000" algn="ctr" rotWithShape="0">
                     <a:schemeClr val="bg2">
@@ -1428,14 +1433,14 @@
           <a:effectLst/>
           <a:extLst>
             <a:ext uri="{909E8E84-426E-40dd-AFC4-6F175D3DCCD1}">
-              <a14:hiddenFill xmlns:a14="http://schemas.microsoft.com/office/drawing/2010/main" xmlns="">
+              <a14:hiddenFill xmlns="" xmlns:a14="http://schemas.microsoft.com/office/drawing/2010/main">
                 <a:solidFill>
                   <a:srgbClr val="FFFFFF"/>
                 </a:solidFill>
               </a14:hiddenFill>
             </a:ext>
             <a:ext uri="{91240B29-F687-4f45-9708-019B960494DF}">
-              <a14:hiddenLine xmlns:a14="http://schemas.microsoft.com/office/drawing/2010/main" xmlns="" w="9525" cap="flat">
+              <a14:hiddenLine xmlns="" xmlns:a14="http://schemas.microsoft.com/office/drawing/2010/main" w="9525" cap="flat">
                 <a:solidFill>
                   <a:srgbClr val="3465A4"/>
                 </a:solidFill>
@@ -1445,7 +1450,7 @@
               </a14:hiddenLine>
             </a:ext>
             <a:ext uri="{AF507438-7753-43e0-B8FC-AC1667EBCBE1}">
-              <a14:hiddenEffects xmlns:a14="http://schemas.microsoft.com/office/drawing/2010/main" xmlns="">
+              <a14:hiddenEffects xmlns="" xmlns:a14="http://schemas.microsoft.com/office/drawing/2010/main">
                 <a:effectLst>
                   <a:outerShdw blurRad="63500" dist="38099" dir="2700000" algn="ctr" rotWithShape="0">
                     <a:srgbClr val="000000">
@@ -1864,7 +1869,7 @@
           </a:ln>
           <a:extLst>
             <a:ext uri="{AF507438-7753-43e0-B8FC-AC1667EBCBE1}">
-              <a14:hiddenEffects xmlns:a14="http://schemas.microsoft.com/office/drawing/2010/main" xmlns="">
+              <a14:hiddenEffects xmlns="" xmlns:a14="http://schemas.microsoft.com/office/drawing/2010/main">
                 <a:effectLst>
                   <a:outerShdw blurRad="63500" dist="38099" dir="2700000" algn="ctr" rotWithShape="0">
                     <a:srgbClr val="000000">
@@ -1900,14 +1905,14 @@
           <a:effectLst/>
           <a:extLst>
             <a:ext uri="{909E8E84-426E-40dd-AFC4-6F175D3DCCD1}">
-              <a14:hiddenFill xmlns:a14="http://schemas.microsoft.com/office/drawing/2010/main" xmlns="">
+              <a14:hiddenFill xmlns="" xmlns:a14="http://schemas.microsoft.com/office/drawing/2010/main">
                 <a:solidFill>
                   <a:srgbClr val="FFFFFF"/>
                 </a:solidFill>
               </a14:hiddenFill>
             </a:ext>
             <a:ext uri="{91240B29-F687-4f45-9708-019B960494DF}">
-              <a14:hiddenLine xmlns:a14="http://schemas.microsoft.com/office/drawing/2010/main" xmlns="" w="9525" cap="flat">
+              <a14:hiddenLine xmlns="" xmlns:a14="http://schemas.microsoft.com/office/drawing/2010/main" w="9525" cap="flat">
                 <a:solidFill>
                   <a:srgbClr val="3465A4"/>
                 </a:solidFill>
@@ -1917,7 +1922,7 @@
               </a14:hiddenLine>
             </a:ext>
             <a:ext uri="{AF507438-7753-43e0-B8FC-AC1667EBCBE1}">
-              <a14:hiddenEffects xmlns:a14="http://schemas.microsoft.com/office/drawing/2010/main" xmlns="">
+              <a14:hiddenEffects xmlns="" xmlns:a14="http://schemas.microsoft.com/office/drawing/2010/main">
                 <a:effectLst>
                   <a:outerShdw blurRad="63500" dist="38099" dir="2700000" algn="ctr" rotWithShape="0">
                     <a:srgbClr val="000000">
@@ -1989,14 +1994,14 @@
         <p:spPr>
           <a:extLst>
             <a:ext uri="{909E8E84-426E-40dd-AFC4-6F175D3DCCD1}">
-              <a14:hiddenFill xmlns:a14="http://schemas.microsoft.com/office/drawing/2010/main" xmlns="">
+              <a14:hiddenFill xmlns="" xmlns:a14="http://schemas.microsoft.com/office/drawing/2010/main">
                 <a:solidFill>
                   <a:srgbClr val="FFFFFF"/>
                 </a:solidFill>
               </a14:hiddenFill>
             </a:ext>
             <a:ext uri="{91240B29-F687-4f45-9708-019B960494DF}">
-              <a14:hiddenLine xmlns:a14="http://schemas.microsoft.com/office/drawing/2010/main" xmlns="" w="9525" cap="flat">
+              <a14:hiddenLine xmlns="" xmlns:a14="http://schemas.microsoft.com/office/drawing/2010/main" w="9525" cap="flat">
                 <a:solidFill>
                   <a:srgbClr val="3465A4"/>
                 </a:solidFill>
@@ -2006,7 +2011,7 @@
               </a14:hiddenLine>
             </a:ext>
             <a:ext uri="{AF507438-7753-43e0-B8FC-AC1667EBCBE1}">
-              <a14:hiddenEffects xmlns:a14="http://schemas.microsoft.com/office/drawing/2010/main" xmlns="">
+              <a14:hiddenEffects xmlns="" xmlns:a14="http://schemas.microsoft.com/office/drawing/2010/main">
                 <a:effectLst>
                   <a:outerShdw blurRad="63500" dist="38099" dir="2700000" algn="ctr" rotWithShape="0">
                     <a:schemeClr val="bg2">
@@ -2415,7 +2420,7 @@
           </a:ln>
           <a:extLst>
             <a:ext uri="{AF507438-7753-43e0-B8FC-AC1667EBCBE1}">
-              <a14:hiddenEffects xmlns:a14="http://schemas.microsoft.com/office/drawing/2010/main" xmlns="">
+              <a14:hiddenEffects xmlns="" xmlns:a14="http://schemas.microsoft.com/office/drawing/2010/main">
                 <a:effectLst>
                   <a:outerShdw blurRad="63500" dist="38099" dir="2700000" algn="ctr" rotWithShape="0">
                     <a:srgbClr val="000000">
@@ -2451,14 +2456,14 @@
           <a:effectLst/>
           <a:extLst>
             <a:ext uri="{909E8E84-426E-40dd-AFC4-6F175D3DCCD1}">
-              <a14:hiddenFill xmlns:a14="http://schemas.microsoft.com/office/drawing/2010/main" xmlns="">
+              <a14:hiddenFill xmlns="" xmlns:a14="http://schemas.microsoft.com/office/drawing/2010/main">
                 <a:solidFill>
                   <a:srgbClr val="FFFFFF"/>
                 </a:solidFill>
               </a14:hiddenFill>
             </a:ext>
             <a:ext uri="{91240B29-F687-4f45-9708-019B960494DF}">
-              <a14:hiddenLine xmlns:a14="http://schemas.microsoft.com/office/drawing/2010/main" xmlns="" w="9525" cap="flat">
+              <a14:hiddenLine xmlns="" xmlns:a14="http://schemas.microsoft.com/office/drawing/2010/main" w="9525" cap="flat">
                 <a:solidFill>
                   <a:srgbClr val="3465A4"/>
                 </a:solidFill>
@@ -2468,7 +2473,7 @@
               </a14:hiddenLine>
             </a:ext>
             <a:ext uri="{AF507438-7753-43e0-B8FC-AC1667EBCBE1}">
-              <a14:hiddenEffects xmlns:a14="http://schemas.microsoft.com/office/drawing/2010/main" xmlns="">
+              <a14:hiddenEffects xmlns="" xmlns:a14="http://schemas.microsoft.com/office/drawing/2010/main">
                 <a:effectLst>
                   <a:outerShdw blurRad="63500" dist="38099" dir="2700000" algn="ctr" rotWithShape="0">
                     <a:srgbClr val="000000">
@@ -2545,14 +2550,14 @@
         <p:spPr>
           <a:extLst>
             <a:ext uri="{909E8E84-426E-40dd-AFC4-6F175D3DCCD1}">
-              <a14:hiddenFill xmlns:a14="http://schemas.microsoft.com/office/drawing/2010/main" xmlns="">
+              <a14:hiddenFill xmlns="" xmlns:a14="http://schemas.microsoft.com/office/drawing/2010/main">
                 <a:solidFill>
                   <a:srgbClr val="FFFFFF"/>
                 </a:solidFill>
               </a14:hiddenFill>
             </a:ext>
             <a:ext uri="{91240B29-F687-4f45-9708-019B960494DF}">
-              <a14:hiddenLine xmlns:a14="http://schemas.microsoft.com/office/drawing/2010/main" xmlns="" w="9525" cap="flat">
+              <a14:hiddenLine xmlns="" xmlns:a14="http://schemas.microsoft.com/office/drawing/2010/main" w="9525" cap="flat">
                 <a:solidFill>
                   <a:srgbClr val="3465A4"/>
                 </a:solidFill>
@@ -2562,7 +2567,7 @@
               </a14:hiddenLine>
             </a:ext>
             <a:ext uri="{AF507438-7753-43e0-B8FC-AC1667EBCBE1}">
-              <a14:hiddenEffects xmlns:a14="http://schemas.microsoft.com/office/drawing/2010/main" xmlns="">
+              <a14:hiddenEffects xmlns="" xmlns:a14="http://schemas.microsoft.com/office/drawing/2010/main">
                 <a:effectLst>
                   <a:outerShdw blurRad="63500" dist="38099" dir="2700000" algn="ctr" rotWithShape="0">
                     <a:schemeClr val="bg2">
@@ -2971,7 +2976,7 @@
           </a:ln>
           <a:extLst>
             <a:ext uri="{AF507438-7753-43e0-B8FC-AC1667EBCBE1}">
-              <a14:hiddenEffects xmlns:a14="http://schemas.microsoft.com/office/drawing/2010/main" xmlns="">
+              <a14:hiddenEffects xmlns="" xmlns:a14="http://schemas.microsoft.com/office/drawing/2010/main">
                 <a:effectLst>
                   <a:outerShdw blurRad="63500" dist="38099" dir="2700000" algn="ctr" rotWithShape="0">
                     <a:srgbClr val="000000">
@@ -3007,14 +3012,14 @@
           <a:effectLst/>
           <a:extLst>
             <a:ext uri="{909E8E84-426E-40dd-AFC4-6F175D3DCCD1}">
-              <a14:hiddenFill xmlns:a14="http://schemas.microsoft.com/office/drawing/2010/main" xmlns="">
+              <a14:hiddenFill xmlns="" xmlns:a14="http://schemas.microsoft.com/office/drawing/2010/main">
                 <a:solidFill>
                   <a:srgbClr val="FFFFFF"/>
                 </a:solidFill>
               </a14:hiddenFill>
             </a:ext>
             <a:ext uri="{91240B29-F687-4f45-9708-019B960494DF}">
-              <a14:hiddenLine xmlns:a14="http://schemas.microsoft.com/office/drawing/2010/main" xmlns="" w="9525" cap="flat">
+              <a14:hiddenLine xmlns="" xmlns:a14="http://schemas.microsoft.com/office/drawing/2010/main" w="9525" cap="flat">
                 <a:solidFill>
                   <a:srgbClr val="3465A4"/>
                 </a:solidFill>
@@ -3024,7 +3029,7 @@
               </a14:hiddenLine>
             </a:ext>
             <a:ext uri="{AF507438-7753-43e0-B8FC-AC1667EBCBE1}">
-              <a14:hiddenEffects xmlns:a14="http://schemas.microsoft.com/office/drawing/2010/main" xmlns="">
+              <a14:hiddenEffects xmlns="" xmlns:a14="http://schemas.microsoft.com/office/drawing/2010/main">
                 <a:effectLst>
                   <a:outerShdw blurRad="63500" dist="38099" dir="2700000" algn="ctr" rotWithShape="0">
                     <a:srgbClr val="000000">
@@ -3096,14 +3101,14 @@
         <p:spPr>
           <a:extLst>
             <a:ext uri="{909E8E84-426E-40dd-AFC4-6F175D3DCCD1}">
-              <a14:hiddenFill xmlns:a14="http://schemas.microsoft.com/office/drawing/2010/main" xmlns="">
+              <a14:hiddenFill xmlns="" xmlns:a14="http://schemas.microsoft.com/office/drawing/2010/main">
                 <a:solidFill>
                   <a:srgbClr val="FFFFFF"/>
                 </a:solidFill>
               </a14:hiddenFill>
             </a:ext>
             <a:ext uri="{91240B29-F687-4f45-9708-019B960494DF}">
-              <a14:hiddenLine xmlns:a14="http://schemas.microsoft.com/office/drawing/2010/main" xmlns="" w="9525" cap="flat">
+              <a14:hiddenLine xmlns="" xmlns:a14="http://schemas.microsoft.com/office/drawing/2010/main" w="9525" cap="flat">
                 <a:solidFill>
                   <a:srgbClr val="3465A4"/>
                 </a:solidFill>
@@ -3113,7 +3118,7 @@
               </a14:hiddenLine>
             </a:ext>
             <a:ext uri="{AF507438-7753-43e0-B8FC-AC1667EBCBE1}">
-              <a14:hiddenEffects xmlns:a14="http://schemas.microsoft.com/office/drawing/2010/main" xmlns="">
+              <a14:hiddenEffects xmlns="" xmlns:a14="http://schemas.microsoft.com/office/drawing/2010/main">
                 <a:effectLst>
                   <a:outerShdw blurRad="63500" dist="38099" dir="2700000" algn="ctr" rotWithShape="0">
                     <a:schemeClr val="bg2">
@@ -3522,7 +3527,7 @@
           </a:ln>
           <a:extLst>
             <a:ext uri="{AF507438-7753-43e0-B8FC-AC1667EBCBE1}">
-              <a14:hiddenEffects xmlns:a14="http://schemas.microsoft.com/office/drawing/2010/main" xmlns="">
+              <a14:hiddenEffects xmlns="" xmlns:a14="http://schemas.microsoft.com/office/drawing/2010/main">
                 <a:effectLst>
                   <a:outerShdw blurRad="63500" dist="38099" dir="2700000" algn="ctr" rotWithShape="0">
                     <a:srgbClr val="000000">
@@ -3558,14 +3563,14 @@
           <a:effectLst/>
           <a:extLst>
             <a:ext uri="{909E8E84-426E-40dd-AFC4-6F175D3DCCD1}">
-              <a14:hiddenFill xmlns:a14="http://schemas.microsoft.com/office/drawing/2010/main" xmlns="">
+              <a14:hiddenFill xmlns="" xmlns:a14="http://schemas.microsoft.com/office/drawing/2010/main">
                 <a:solidFill>
                   <a:srgbClr val="FFFFFF"/>
                 </a:solidFill>
               </a14:hiddenFill>
             </a:ext>
             <a:ext uri="{91240B29-F687-4f45-9708-019B960494DF}">
-              <a14:hiddenLine xmlns:a14="http://schemas.microsoft.com/office/drawing/2010/main" xmlns="" w="9525" cap="flat">
+              <a14:hiddenLine xmlns="" xmlns:a14="http://schemas.microsoft.com/office/drawing/2010/main" w="9525" cap="flat">
                 <a:solidFill>
                   <a:srgbClr val="3465A4"/>
                 </a:solidFill>
@@ -3575,7 +3580,7 @@
               </a14:hiddenLine>
             </a:ext>
             <a:ext uri="{AF507438-7753-43e0-B8FC-AC1667EBCBE1}">
-              <a14:hiddenEffects xmlns:a14="http://schemas.microsoft.com/office/drawing/2010/main" xmlns="">
+              <a14:hiddenEffects xmlns="" xmlns:a14="http://schemas.microsoft.com/office/drawing/2010/main">
                 <a:effectLst>
                   <a:outerShdw blurRad="63500" dist="38099" dir="2700000" algn="ctr" rotWithShape="0">
                     <a:srgbClr val="000000">
@@ -3652,14 +3657,14 @@
         <p:spPr>
           <a:extLst>
             <a:ext uri="{909E8E84-426E-40dd-AFC4-6F175D3DCCD1}">
-              <a14:hiddenFill xmlns:a14="http://schemas.microsoft.com/office/drawing/2010/main" xmlns="">
+              <a14:hiddenFill xmlns="" xmlns:a14="http://schemas.microsoft.com/office/drawing/2010/main">
                 <a:solidFill>
                   <a:srgbClr val="FFFFFF"/>
                 </a:solidFill>
               </a14:hiddenFill>
             </a:ext>
             <a:ext uri="{91240B29-F687-4f45-9708-019B960494DF}">
-              <a14:hiddenLine xmlns:a14="http://schemas.microsoft.com/office/drawing/2010/main" xmlns="" w="9525" cap="flat">
+              <a14:hiddenLine xmlns="" xmlns:a14="http://schemas.microsoft.com/office/drawing/2010/main" w="9525" cap="flat">
                 <a:solidFill>
                   <a:srgbClr val="3465A4"/>
                 </a:solidFill>
@@ -3669,7 +3674,7 @@
               </a14:hiddenLine>
             </a:ext>
             <a:ext uri="{AF507438-7753-43e0-B8FC-AC1667EBCBE1}">
-              <a14:hiddenEffects xmlns:a14="http://schemas.microsoft.com/office/drawing/2010/main" xmlns="">
+              <a14:hiddenEffects xmlns="" xmlns:a14="http://schemas.microsoft.com/office/drawing/2010/main">
                 <a:effectLst>
                   <a:outerShdw blurRad="63500" dist="38099" dir="2700000" algn="ctr" rotWithShape="0">
                     <a:schemeClr val="bg2">
@@ -4078,7 +4083,7 @@
           </a:ln>
           <a:extLst>
             <a:ext uri="{AF507438-7753-43e0-B8FC-AC1667EBCBE1}">
-              <a14:hiddenEffects xmlns:a14="http://schemas.microsoft.com/office/drawing/2010/main" xmlns="">
+              <a14:hiddenEffects xmlns="" xmlns:a14="http://schemas.microsoft.com/office/drawing/2010/main">
                 <a:effectLst>
                   <a:outerShdw blurRad="63500" dist="38099" dir="2700000" algn="ctr" rotWithShape="0">
                     <a:srgbClr val="000000">
@@ -4114,14 +4119,14 @@
           <a:effectLst/>
           <a:extLst>
             <a:ext uri="{909E8E84-426E-40dd-AFC4-6F175D3DCCD1}">
-              <a14:hiddenFill xmlns:a14="http://schemas.microsoft.com/office/drawing/2010/main" xmlns="">
+              <a14:hiddenFill xmlns="" xmlns:a14="http://schemas.microsoft.com/office/drawing/2010/main">
                 <a:solidFill>
                   <a:srgbClr val="FFFFFF"/>
                 </a:solidFill>
               </a14:hiddenFill>
             </a:ext>
             <a:ext uri="{91240B29-F687-4f45-9708-019B960494DF}">
-              <a14:hiddenLine xmlns:a14="http://schemas.microsoft.com/office/drawing/2010/main" xmlns="" w="9525" cap="flat">
+              <a14:hiddenLine xmlns="" xmlns:a14="http://schemas.microsoft.com/office/drawing/2010/main" w="9525" cap="flat">
                 <a:solidFill>
                   <a:srgbClr val="3465A4"/>
                 </a:solidFill>
@@ -4131,7 +4136,7 @@
               </a14:hiddenLine>
             </a:ext>
             <a:ext uri="{AF507438-7753-43e0-B8FC-AC1667EBCBE1}">
-              <a14:hiddenEffects xmlns:a14="http://schemas.microsoft.com/office/drawing/2010/main" xmlns="">
+              <a14:hiddenEffects xmlns="" xmlns:a14="http://schemas.microsoft.com/office/drawing/2010/main">
                 <a:effectLst>
                   <a:outerShdw blurRad="63500" dist="38099" dir="2700000" algn="ctr" rotWithShape="0">
                     <a:srgbClr val="000000">
@@ -4208,14 +4213,14 @@
         <p:spPr>
           <a:extLst>
             <a:ext uri="{909E8E84-426E-40dd-AFC4-6F175D3DCCD1}">
-              <a14:hiddenFill xmlns:a14="http://schemas.microsoft.com/office/drawing/2010/main" xmlns="">
+              <a14:hiddenFill xmlns="" xmlns:a14="http://schemas.microsoft.com/office/drawing/2010/main">
                 <a:solidFill>
                   <a:srgbClr val="FFFFFF"/>
                 </a:solidFill>
               </a14:hiddenFill>
             </a:ext>
             <a:ext uri="{91240B29-F687-4f45-9708-019B960494DF}">
-              <a14:hiddenLine xmlns:a14="http://schemas.microsoft.com/office/drawing/2010/main" xmlns="" w="9525" cap="flat">
+              <a14:hiddenLine xmlns="" xmlns:a14="http://schemas.microsoft.com/office/drawing/2010/main" w="9525" cap="flat">
                 <a:solidFill>
                   <a:srgbClr val="3465A4"/>
                 </a:solidFill>
@@ -4225,7 +4230,7 @@
               </a14:hiddenLine>
             </a:ext>
             <a:ext uri="{AF507438-7753-43e0-B8FC-AC1667EBCBE1}">
-              <a14:hiddenEffects xmlns:a14="http://schemas.microsoft.com/office/drawing/2010/main" xmlns="">
+              <a14:hiddenEffects xmlns="" xmlns:a14="http://schemas.microsoft.com/office/drawing/2010/main">
                 <a:effectLst>
                   <a:outerShdw blurRad="63500" dist="38099" dir="2700000" algn="ctr" rotWithShape="0">
                     <a:schemeClr val="bg2">
@@ -4634,7 +4639,7 @@
           </a:ln>
           <a:extLst>
             <a:ext uri="{AF507438-7753-43e0-B8FC-AC1667EBCBE1}">
-              <a14:hiddenEffects xmlns:a14="http://schemas.microsoft.com/office/drawing/2010/main" xmlns="">
+              <a14:hiddenEffects xmlns="" xmlns:a14="http://schemas.microsoft.com/office/drawing/2010/main">
                 <a:effectLst>
                   <a:outerShdw blurRad="63500" dist="38099" dir="2700000" algn="ctr" rotWithShape="0">
                     <a:srgbClr val="000000">
@@ -4670,14 +4675,14 @@
           <a:effectLst/>
           <a:extLst>
             <a:ext uri="{909E8E84-426E-40dd-AFC4-6F175D3DCCD1}">
-              <a14:hiddenFill xmlns:a14="http://schemas.microsoft.com/office/drawing/2010/main" xmlns="">
+              <a14:hiddenFill xmlns="" xmlns:a14="http://schemas.microsoft.com/office/drawing/2010/main">
                 <a:solidFill>
                   <a:srgbClr val="FFFFFF"/>
                 </a:solidFill>
               </a14:hiddenFill>
             </a:ext>
             <a:ext uri="{91240B29-F687-4f45-9708-019B960494DF}">
-              <a14:hiddenLine xmlns:a14="http://schemas.microsoft.com/office/drawing/2010/main" xmlns="" w="9525" cap="flat">
+              <a14:hiddenLine xmlns="" xmlns:a14="http://schemas.microsoft.com/office/drawing/2010/main" w="9525" cap="flat">
                 <a:solidFill>
                   <a:srgbClr val="3465A4"/>
                 </a:solidFill>
@@ -4687,7 +4692,7 @@
               </a14:hiddenLine>
             </a:ext>
             <a:ext uri="{AF507438-7753-43e0-B8FC-AC1667EBCBE1}">
-              <a14:hiddenEffects xmlns:a14="http://schemas.microsoft.com/office/drawing/2010/main" xmlns="">
+              <a14:hiddenEffects xmlns="" xmlns:a14="http://schemas.microsoft.com/office/drawing/2010/main">
                 <a:effectLst>
                   <a:outerShdw blurRad="63500" dist="38099" dir="2700000" algn="ctr" rotWithShape="0">
                     <a:srgbClr val="000000">
@@ -4764,14 +4769,14 @@
         <p:spPr>
           <a:extLst>
             <a:ext uri="{909E8E84-426E-40dd-AFC4-6F175D3DCCD1}">
-              <a14:hiddenFill xmlns:a14="http://schemas.microsoft.com/office/drawing/2010/main" xmlns="">
+              <a14:hiddenFill xmlns="" xmlns:a14="http://schemas.microsoft.com/office/drawing/2010/main">
                 <a:solidFill>
                   <a:srgbClr val="FFFFFF"/>
                 </a:solidFill>
               </a14:hiddenFill>
             </a:ext>
             <a:ext uri="{91240B29-F687-4f45-9708-019B960494DF}">
-              <a14:hiddenLine xmlns:a14="http://schemas.microsoft.com/office/drawing/2010/main" xmlns="" w="9525" cap="flat">
+              <a14:hiddenLine xmlns="" xmlns:a14="http://schemas.microsoft.com/office/drawing/2010/main" w="9525" cap="flat">
                 <a:solidFill>
                   <a:srgbClr val="3465A4"/>
                 </a:solidFill>
@@ -4781,7 +4786,7 @@
               </a14:hiddenLine>
             </a:ext>
             <a:ext uri="{AF507438-7753-43e0-B8FC-AC1667EBCBE1}">
-              <a14:hiddenEffects xmlns:a14="http://schemas.microsoft.com/office/drawing/2010/main" xmlns="">
+              <a14:hiddenEffects xmlns="" xmlns:a14="http://schemas.microsoft.com/office/drawing/2010/main">
                 <a:effectLst>
                   <a:outerShdw blurRad="63500" dist="38099" dir="2700000" algn="ctr" rotWithShape="0">
                     <a:schemeClr val="bg2">
@@ -5185,14 +5190,14 @@
           <a:effectLst/>
           <a:extLst>
             <a:ext uri="{909E8E84-426E-40dd-AFC4-6F175D3DCCD1}">
-              <a14:hiddenFill xmlns:a14="http://schemas.microsoft.com/office/drawing/2010/main" xmlns="">
+              <a14:hiddenFill xmlns="" xmlns:a14="http://schemas.microsoft.com/office/drawing/2010/main">
                 <a:solidFill>
                   <a:srgbClr val="FFFFFF"/>
                 </a:solidFill>
               </a14:hiddenFill>
             </a:ext>
             <a:ext uri="{91240B29-F687-4f45-9708-019B960494DF}">
-              <a14:hiddenLine xmlns:a14="http://schemas.microsoft.com/office/drawing/2010/main" xmlns="" w="9525" cap="flat">
+              <a14:hiddenLine xmlns="" xmlns:a14="http://schemas.microsoft.com/office/drawing/2010/main" w="9525" cap="flat">
                 <a:solidFill>
                   <a:srgbClr val="3465A4"/>
                 </a:solidFill>
@@ -5202,7 +5207,7 @@
               </a14:hiddenLine>
             </a:ext>
             <a:ext uri="{AF507438-7753-43e0-B8FC-AC1667EBCBE1}">
-              <a14:hiddenEffects xmlns:a14="http://schemas.microsoft.com/office/drawing/2010/main" xmlns="">
+              <a14:hiddenEffects xmlns="" xmlns:a14="http://schemas.microsoft.com/office/drawing/2010/main">
                 <a:effectLst>
                   <a:outerShdw blurRad="63500" dist="38099" dir="2700000" algn="ctr" rotWithShape="0">
                     <a:srgbClr val="000000">
@@ -5621,7 +5626,7 @@
           </a:ln>
           <a:extLst>
             <a:ext uri="{AF507438-7753-43e0-B8FC-AC1667EBCBE1}">
-              <a14:hiddenEffects xmlns:a14="http://schemas.microsoft.com/office/drawing/2010/main" xmlns="">
+              <a14:hiddenEffects xmlns="" xmlns:a14="http://schemas.microsoft.com/office/drawing/2010/main">
                 <a:effectLst>
                   <a:outerShdw blurRad="63500" dist="38099" dir="2700000" algn="ctr" rotWithShape="0">
                     <a:srgbClr val="000000">
@@ -5657,14 +5662,14 @@
           <a:effectLst/>
           <a:extLst>
             <a:ext uri="{909E8E84-426E-40dd-AFC4-6F175D3DCCD1}">
-              <a14:hiddenFill xmlns:a14="http://schemas.microsoft.com/office/drawing/2010/main" xmlns="">
+              <a14:hiddenFill xmlns="" xmlns:a14="http://schemas.microsoft.com/office/drawing/2010/main">
                 <a:solidFill>
                   <a:srgbClr val="FFFFFF"/>
                 </a:solidFill>
               </a14:hiddenFill>
             </a:ext>
             <a:ext uri="{91240B29-F687-4f45-9708-019B960494DF}">
-              <a14:hiddenLine xmlns:a14="http://schemas.microsoft.com/office/drawing/2010/main" xmlns="" w="9525" cap="flat">
+              <a14:hiddenLine xmlns="" xmlns:a14="http://schemas.microsoft.com/office/drawing/2010/main" w="9525" cap="flat">
                 <a:solidFill>
                   <a:srgbClr val="3465A4"/>
                 </a:solidFill>
@@ -5674,7 +5679,7 @@
               </a14:hiddenLine>
             </a:ext>
             <a:ext uri="{AF507438-7753-43e0-B8FC-AC1667EBCBE1}">
-              <a14:hiddenEffects xmlns:a14="http://schemas.microsoft.com/office/drawing/2010/main" xmlns="">
+              <a14:hiddenEffects xmlns="" xmlns:a14="http://schemas.microsoft.com/office/drawing/2010/main">
                 <a:effectLst>
                   <a:outerShdw blurRad="63500" dist="38099" dir="2700000" algn="ctr" rotWithShape="0">
                     <a:srgbClr val="000000">
@@ -5746,14 +5751,14 @@
         <p:spPr>
           <a:extLst>
             <a:ext uri="{909E8E84-426E-40dd-AFC4-6F175D3DCCD1}">
-              <a14:hiddenFill xmlns:a14="http://schemas.microsoft.com/office/drawing/2010/main" xmlns="">
+              <a14:hiddenFill xmlns="" xmlns:a14="http://schemas.microsoft.com/office/drawing/2010/main">
                 <a:solidFill>
                   <a:srgbClr val="FFFFFF"/>
                 </a:solidFill>
               </a14:hiddenFill>
             </a:ext>
             <a:ext uri="{91240B29-F687-4f45-9708-019B960494DF}">
-              <a14:hiddenLine xmlns:a14="http://schemas.microsoft.com/office/drawing/2010/main" xmlns="" w="9525" cap="flat">
+              <a14:hiddenLine xmlns="" xmlns:a14="http://schemas.microsoft.com/office/drawing/2010/main" w="9525" cap="flat">
                 <a:solidFill>
                   <a:srgbClr val="3465A4"/>
                 </a:solidFill>
@@ -5763,7 +5768,7 @@
               </a14:hiddenLine>
             </a:ext>
             <a:ext uri="{AF507438-7753-43e0-B8FC-AC1667EBCBE1}">
-              <a14:hiddenEffects xmlns:a14="http://schemas.microsoft.com/office/drawing/2010/main" xmlns="">
+              <a14:hiddenEffects xmlns="" xmlns:a14="http://schemas.microsoft.com/office/drawing/2010/main">
                 <a:effectLst>
                   <a:outerShdw blurRad="63500" dist="38099" dir="2700000" algn="ctr" rotWithShape="0">
                     <a:schemeClr val="bg2">
@@ -6167,14 +6172,14 @@
           <a:effectLst/>
           <a:extLst>
             <a:ext uri="{909E8E84-426E-40dd-AFC4-6F175D3DCCD1}">
-              <a14:hiddenFill xmlns:a14="http://schemas.microsoft.com/office/drawing/2010/main" xmlns="">
+              <a14:hiddenFill xmlns="" xmlns:a14="http://schemas.microsoft.com/office/drawing/2010/main">
                 <a:solidFill>
                   <a:srgbClr val="FFFFFF"/>
                 </a:solidFill>
               </a14:hiddenFill>
             </a:ext>
             <a:ext uri="{91240B29-F687-4f45-9708-019B960494DF}">
-              <a14:hiddenLine xmlns:a14="http://schemas.microsoft.com/office/drawing/2010/main" xmlns="" w="9525" cap="flat">
+              <a14:hiddenLine xmlns="" xmlns:a14="http://schemas.microsoft.com/office/drawing/2010/main" w="9525" cap="flat">
                 <a:solidFill>
                   <a:srgbClr val="3465A4"/>
                 </a:solidFill>
@@ -6184,7 +6189,7 @@
               </a14:hiddenLine>
             </a:ext>
             <a:ext uri="{AF507438-7753-43e0-B8FC-AC1667EBCBE1}">
-              <a14:hiddenEffects xmlns:a14="http://schemas.microsoft.com/office/drawing/2010/main" xmlns="">
+              <a14:hiddenEffects xmlns="" xmlns:a14="http://schemas.microsoft.com/office/drawing/2010/main">
                 <a:effectLst>
                   <a:outerShdw blurRad="63500" dist="38099" dir="2700000" algn="ctr" rotWithShape="0">
                     <a:srgbClr val="000000">
@@ -6603,7 +6608,7 @@
           </a:ln>
           <a:extLst>
             <a:ext uri="{AF507438-7753-43e0-B8FC-AC1667EBCBE1}">
-              <a14:hiddenEffects xmlns:a14="http://schemas.microsoft.com/office/drawing/2010/main" xmlns="">
+              <a14:hiddenEffects xmlns="" xmlns:a14="http://schemas.microsoft.com/office/drawing/2010/main">
                 <a:effectLst>
                   <a:outerShdw blurRad="63500" dist="38099" dir="2700000" algn="ctr" rotWithShape="0">
                     <a:srgbClr val="000000">
@@ -6639,14 +6644,14 @@
           <a:effectLst/>
           <a:extLst>
             <a:ext uri="{909E8E84-426E-40dd-AFC4-6F175D3DCCD1}">
-              <a14:hiddenFill xmlns:a14="http://schemas.microsoft.com/office/drawing/2010/main" xmlns="">
+              <a14:hiddenFill xmlns="" xmlns:a14="http://schemas.microsoft.com/office/drawing/2010/main">
                 <a:solidFill>
                   <a:srgbClr val="FFFFFF"/>
                 </a:solidFill>
               </a14:hiddenFill>
             </a:ext>
             <a:ext uri="{91240B29-F687-4f45-9708-019B960494DF}">
-              <a14:hiddenLine xmlns:a14="http://schemas.microsoft.com/office/drawing/2010/main" xmlns="" w="9525" cap="flat">
+              <a14:hiddenLine xmlns="" xmlns:a14="http://schemas.microsoft.com/office/drawing/2010/main" w="9525" cap="flat">
                 <a:solidFill>
                   <a:srgbClr val="3465A4"/>
                 </a:solidFill>
@@ -6656,7 +6661,7 @@
               </a14:hiddenLine>
             </a:ext>
             <a:ext uri="{AF507438-7753-43e0-B8FC-AC1667EBCBE1}">
-              <a14:hiddenEffects xmlns:a14="http://schemas.microsoft.com/office/drawing/2010/main" xmlns="">
+              <a14:hiddenEffects xmlns="" xmlns:a14="http://schemas.microsoft.com/office/drawing/2010/main">
                 <a:effectLst>
                   <a:outerShdw blurRad="63500" dist="38099" dir="2700000" algn="ctr" rotWithShape="0">
                     <a:srgbClr val="000000">
@@ -6728,14 +6733,14 @@
         <p:spPr>
           <a:extLst>
             <a:ext uri="{909E8E84-426E-40dd-AFC4-6F175D3DCCD1}">
-              <a14:hiddenFill xmlns:a14="http://schemas.microsoft.com/office/drawing/2010/main" xmlns="">
+              <a14:hiddenFill xmlns="" xmlns:a14="http://schemas.microsoft.com/office/drawing/2010/main">
                 <a:solidFill>
                   <a:srgbClr val="FFFFFF"/>
                 </a:solidFill>
               </a14:hiddenFill>
             </a:ext>
             <a:ext uri="{91240B29-F687-4f45-9708-019B960494DF}">
-              <a14:hiddenLine xmlns:a14="http://schemas.microsoft.com/office/drawing/2010/main" xmlns="" w="9525" cap="flat">
+              <a14:hiddenLine xmlns="" xmlns:a14="http://schemas.microsoft.com/office/drawing/2010/main" w="9525" cap="flat">
                 <a:solidFill>
                   <a:srgbClr val="3465A4"/>
                 </a:solidFill>
@@ -6745,7 +6750,7 @@
               </a14:hiddenLine>
             </a:ext>
             <a:ext uri="{AF507438-7753-43e0-B8FC-AC1667EBCBE1}">
-              <a14:hiddenEffects xmlns:a14="http://schemas.microsoft.com/office/drawing/2010/main" xmlns="">
+              <a14:hiddenEffects xmlns="" xmlns:a14="http://schemas.microsoft.com/office/drawing/2010/main">
                 <a:effectLst>
                   <a:outerShdw blurRad="63500" dist="38099" dir="2700000" algn="ctr" rotWithShape="0">
                     <a:schemeClr val="bg2">
@@ -7115,7 +7120,7 @@
                 <a:latin typeface="Times New Roman" charset="0"/>
               </a:rPr>
               <a:pPr eaLnBrk="1"/>
-              <a:t>20</a:t>
+              <a:t>25</a:t>
             </a:fld>
             <a:endParaRPr lang="en-GB" altLang="x-none" sz="1400">
               <a:solidFill>
@@ -7154,7 +7159,7 @@
           </a:ln>
           <a:extLst>
             <a:ext uri="{AF507438-7753-43e0-B8FC-AC1667EBCBE1}">
-              <a14:hiddenEffects xmlns:a14="http://schemas.microsoft.com/office/drawing/2010/main" xmlns="">
+              <a14:hiddenEffects xmlns="" xmlns:a14="http://schemas.microsoft.com/office/drawing/2010/main">
                 <a:effectLst>
                   <a:outerShdw blurRad="63500" dist="38099" dir="2700000" algn="ctr" rotWithShape="0">
                     <a:srgbClr val="000000">
@@ -7190,14 +7195,14 @@
           <a:effectLst/>
           <a:extLst>
             <a:ext uri="{909E8E84-426E-40dd-AFC4-6F175D3DCCD1}">
-              <a14:hiddenFill xmlns:a14="http://schemas.microsoft.com/office/drawing/2010/main" xmlns="">
+              <a14:hiddenFill xmlns="" xmlns:a14="http://schemas.microsoft.com/office/drawing/2010/main">
                 <a:solidFill>
                   <a:srgbClr val="FFFFFF"/>
                 </a:solidFill>
               </a14:hiddenFill>
             </a:ext>
             <a:ext uri="{91240B29-F687-4f45-9708-019B960494DF}">
-              <a14:hiddenLine xmlns:a14="http://schemas.microsoft.com/office/drawing/2010/main" xmlns="" w="9525" cap="flat">
+              <a14:hiddenLine xmlns="" xmlns:a14="http://schemas.microsoft.com/office/drawing/2010/main" w="9525" cap="flat">
                 <a:solidFill>
                   <a:srgbClr val="3465A4"/>
                 </a:solidFill>
@@ -7207,7 +7212,7 @@
               </a14:hiddenLine>
             </a:ext>
             <a:ext uri="{AF507438-7753-43e0-B8FC-AC1667EBCBE1}">
-              <a14:hiddenEffects xmlns:a14="http://schemas.microsoft.com/office/drawing/2010/main" xmlns="">
+              <a14:hiddenEffects xmlns="" xmlns:a14="http://schemas.microsoft.com/office/drawing/2010/main">
                 <a:effectLst>
                   <a:outerShdw blurRad="63500" dist="38099" dir="2700000" algn="ctr" rotWithShape="0">
                     <a:srgbClr val="000000">
@@ -7279,14 +7284,14 @@
         <p:spPr>
           <a:extLst>
             <a:ext uri="{909E8E84-426E-40dd-AFC4-6F175D3DCCD1}">
-              <a14:hiddenFill xmlns:a14="http://schemas.microsoft.com/office/drawing/2010/main" xmlns="">
+              <a14:hiddenFill xmlns="" xmlns:a14="http://schemas.microsoft.com/office/drawing/2010/main">
                 <a:solidFill>
                   <a:srgbClr val="FFFFFF"/>
                 </a:solidFill>
               </a14:hiddenFill>
             </a:ext>
             <a:ext uri="{91240B29-F687-4f45-9708-019B960494DF}">
-              <a14:hiddenLine xmlns:a14="http://schemas.microsoft.com/office/drawing/2010/main" xmlns="" w="9525" cap="flat">
+              <a14:hiddenLine xmlns="" xmlns:a14="http://schemas.microsoft.com/office/drawing/2010/main" w="9525" cap="flat">
                 <a:solidFill>
                   <a:srgbClr val="3465A4"/>
                 </a:solidFill>
@@ -7296,7 +7301,7 @@
               </a14:hiddenLine>
             </a:ext>
             <a:ext uri="{AF507438-7753-43e0-B8FC-AC1667EBCBE1}">
-              <a14:hiddenEffects xmlns:a14="http://schemas.microsoft.com/office/drawing/2010/main" xmlns="">
+              <a14:hiddenEffects xmlns="" xmlns:a14="http://schemas.microsoft.com/office/drawing/2010/main">
                 <a:effectLst>
                   <a:outerShdw blurRad="63500" dist="38099" dir="2700000" algn="ctr" rotWithShape="0">
                     <a:schemeClr val="bg2">
@@ -7700,14 +7705,14 @@
           <a:effectLst/>
           <a:extLst>
             <a:ext uri="{909E8E84-426E-40dd-AFC4-6F175D3DCCD1}">
-              <a14:hiddenFill xmlns:a14="http://schemas.microsoft.com/office/drawing/2010/main" xmlns="">
+              <a14:hiddenFill xmlns="" xmlns:a14="http://schemas.microsoft.com/office/drawing/2010/main">
                 <a:solidFill>
                   <a:srgbClr val="FFFFFF"/>
                 </a:solidFill>
               </a14:hiddenFill>
             </a:ext>
             <a:ext uri="{91240B29-F687-4f45-9708-019B960494DF}">
-              <a14:hiddenLine xmlns:a14="http://schemas.microsoft.com/office/drawing/2010/main" xmlns="" w="9525" cap="flat">
+              <a14:hiddenLine xmlns="" xmlns:a14="http://schemas.microsoft.com/office/drawing/2010/main" w="9525" cap="flat">
                 <a:solidFill>
                   <a:srgbClr val="3465A4"/>
                 </a:solidFill>
@@ -7717,7 +7722,7 @@
               </a14:hiddenLine>
             </a:ext>
             <a:ext uri="{AF507438-7753-43e0-B8FC-AC1667EBCBE1}">
-              <a14:hiddenEffects xmlns:a14="http://schemas.microsoft.com/office/drawing/2010/main" xmlns="">
+              <a14:hiddenEffects xmlns="" xmlns:a14="http://schemas.microsoft.com/office/drawing/2010/main">
                 <a:effectLst>
                   <a:outerShdw blurRad="63500" dist="38099" dir="2700000" algn="ctr" rotWithShape="0">
                     <a:srgbClr val="000000">
@@ -8136,7 +8141,7 @@
           </a:ln>
           <a:extLst>
             <a:ext uri="{AF507438-7753-43e0-B8FC-AC1667EBCBE1}">
-              <a14:hiddenEffects xmlns:a14="http://schemas.microsoft.com/office/drawing/2010/main" xmlns="">
+              <a14:hiddenEffects xmlns="" xmlns:a14="http://schemas.microsoft.com/office/drawing/2010/main">
                 <a:effectLst>
                   <a:outerShdw blurRad="63500" dist="38099" dir="2700000" algn="ctr" rotWithShape="0">
                     <a:srgbClr val="000000">
@@ -8172,14 +8177,14 @@
           <a:effectLst/>
           <a:extLst>
             <a:ext uri="{909E8E84-426E-40dd-AFC4-6F175D3DCCD1}">
-              <a14:hiddenFill xmlns:a14="http://schemas.microsoft.com/office/drawing/2010/main" xmlns="">
+              <a14:hiddenFill xmlns="" xmlns:a14="http://schemas.microsoft.com/office/drawing/2010/main">
                 <a:solidFill>
                   <a:srgbClr val="FFFFFF"/>
                 </a:solidFill>
               </a14:hiddenFill>
             </a:ext>
             <a:ext uri="{91240B29-F687-4f45-9708-019B960494DF}">
-              <a14:hiddenLine xmlns:a14="http://schemas.microsoft.com/office/drawing/2010/main" xmlns="" w="9525" cap="flat">
+              <a14:hiddenLine xmlns="" xmlns:a14="http://schemas.microsoft.com/office/drawing/2010/main" w="9525" cap="flat">
                 <a:solidFill>
                   <a:srgbClr val="3465A4"/>
                 </a:solidFill>
@@ -8189,7 +8194,7 @@
               </a14:hiddenLine>
             </a:ext>
             <a:ext uri="{AF507438-7753-43e0-B8FC-AC1667EBCBE1}">
-              <a14:hiddenEffects xmlns:a14="http://schemas.microsoft.com/office/drawing/2010/main" xmlns="">
+              <a14:hiddenEffects xmlns="" xmlns:a14="http://schemas.microsoft.com/office/drawing/2010/main">
                 <a:effectLst>
                   <a:outerShdw blurRad="63500" dist="38099" dir="2700000" algn="ctr" rotWithShape="0">
                     <a:srgbClr val="000000">
@@ -8261,14 +8266,14 @@
         <p:spPr>
           <a:extLst>
             <a:ext uri="{909E8E84-426E-40dd-AFC4-6F175D3DCCD1}">
-              <a14:hiddenFill xmlns:a14="http://schemas.microsoft.com/office/drawing/2010/main" xmlns="">
+              <a14:hiddenFill xmlns="" xmlns:a14="http://schemas.microsoft.com/office/drawing/2010/main">
                 <a:solidFill>
                   <a:srgbClr val="FFFFFF"/>
                 </a:solidFill>
               </a14:hiddenFill>
             </a:ext>
             <a:ext uri="{91240B29-F687-4f45-9708-019B960494DF}">
-              <a14:hiddenLine xmlns:a14="http://schemas.microsoft.com/office/drawing/2010/main" xmlns="" w="9525" cap="flat">
+              <a14:hiddenLine xmlns="" xmlns:a14="http://schemas.microsoft.com/office/drawing/2010/main" w="9525" cap="flat">
                 <a:solidFill>
                   <a:srgbClr val="3465A4"/>
                 </a:solidFill>
@@ -8278,7 +8283,7 @@
               </a14:hiddenLine>
             </a:ext>
             <a:ext uri="{AF507438-7753-43e0-B8FC-AC1667EBCBE1}">
-              <a14:hiddenEffects xmlns:a14="http://schemas.microsoft.com/office/drawing/2010/main" xmlns="">
+              <a14:hiddenEffects xmlns="" xmlns:a14="http://schemas.microsoft.com/office/drawing/2010/main">
                 <a:effectLst>
                   <a:outerShdw blurRad="63500" dist="38099" dir="2700000" algn="ctr" rotWithShape="0">
                     <a:schemeClr val="bg2">
@@ -8682,14 +8687,14 @@
           <a:effectLst/>
           <a:extLst>
             <a:ext uri="{909E8E84-426E-40dd-AFC4-6F175D3DCCD1}">
-              <a14:hiddenFill xmlns:a14="http://schemas.microsoft.com/office/drawing/2010/main" xmlns="">
+              <a14:hiddenFill xmlns="" xmlns:a14="http://schemas.microsoft.com/office/drawing/2010/main">
                 <a:solidFill>
                   <a:srgbClr val="FFFFFF"/>
                 </a:solidFill>
               </a14:hiddenFill>
             </a:ext>
             <a:ext uri="{91240B29-F687-4f45-9708-019B960494DF}">
-              <a14:hiddenLine xmlns:a14="http://schemas.microsoft.com/office/drawing/2010/main" xmlns="" w="9525" cap="flat">
+              <a14:hiddenLine xmlns="" xmlns:a14="http://schemas.microsoft.com/office/drawing/2010/main" w="9525" cap="flat">
                 <a:solidFill>
                   <a:srgbClr val="3465A4"/>
                 </a:solidFill>
@@ -8699,7 +8704,7 @@
               </a14:hiddenLine>
             </a:ext>
             <a:ext uri="{AF507438-7753-43e0-B8FC-AC1667EBCBE1}">
-              <a14:hiddenEffects xmlns:a14="http://schemas.microsoft.com/office/drawing/2010/main" xmlns="">
+              <a14:hiddenEffects xmlns="" xmlns:a14="http://schemas.microsoft.com/office/drawing/2010/main">
                 <a:effectLst>
                   <a:outerShdw blurRad="63500" dist="38099" dir="2700000" algn="ctr" rotWithShape="0">
                     <a:srgbClr val="000000">
@@ -9118,7 +9123,7 @@
           </a:ln>
           <a:extLst>
             <a:ext uri="{AF507438-7753-43e0-B8FC-AC1667EBCBE1}">
-              <a14:hiddenEffects xmlns:a14="http://schemas.microsoft.com/office/drawing/2010/main" xmlns="">
+              <a14:hiddenEffects xmlns="" xmlns:a14="http://schemas.microsoft.com/office/drawing/2010/main">
                 <a:effectLst>
                   <a:outerShdw blurRad="63500" dist="38099" dir="2700000" algn="ctr" rotWithShape="0">
                     <a:srgbClr val="000000">
@@ -9154,14 +9159,14 @@
           <a:effectLst/>
           <a:extLst>
             <a:ext uri="{909E8E84-426E-40dd-AFC4-6F175D3DCCD1}">
-              <a14:hiddenFill xmlns:a14="http://schemas.microsoft.com/office/drawing/2010/main" xmlns="">
+              <a14:hiddenFill xmlns="" xmlns:a14="http://schemas.microsoft.com/office/drawing/2010/main">
                 <a:solidFill>
                   <a:srgbClr val="FFFFFF"/>
                 </a:solidFill>
               </a14:hiddenFill>
             </a:ext>
             <a:ext uri="{91240B29-F687-4f45-9708-019B960494DF}">
-              <a14:hiddenLine xmlns:a14="http://schemas.microsoft.com/office/drawing/2010/main" xmlns="" w="9525" cap="flat">
+              <a14:hiddenLine xmlns="" xmlns:a14="http://schemas.microsoft.com/office/drawing/2010/main" w="9525" cap="flat">
                 <a:solidFill>
                   <a:srgbClr val="3465A4"/>
                 </a:solidFill>
@@ -9171,7 +9176,7 @@
               </a14:hiddenLine>
             </a:ext>
             <a:ext uri="{AF507438-7753-43e0-B8FC-AC1667EBCBE1}">
-              <a14:hiddenEffects xmlns:a14="http://schemas.microsoft.com/office/drawing/2010/main" xmlns="">
+              <a14:hiddenEffects xmlns="" xmlns:a14="http://schemas.microsoft.com/office/drawing/2010/main">
                 <a:effectLst>
                   <a:outerShdw blurRad="63500" dist="38099" dir="2700000" algn="ctr" rotWithShape="0">
                     <a:srgbClr val="000000">
@@ -9248,14 +9253,14 @@
         <p:spPr>
           <a:extLst>
             <a:ext uri="{909E8E84-426E-40dd-AFC4-6F175D3DCCD1}">
-              <a14:hiddenFill xmlns:a14="http://schemas.microsoft.com/office/drawing/2010/main" xmlns="">
+              <a14:hiddenFill xmlns="" xmlns:a14="http://schemas.microsoft.com/office/drawing/2010/main">
                 <a:solidFill>
                   <a:srgbClr val="FFFFFF"/>
                 </a:solidFill>
               </a14:hiddenFill>
             </a:ext>
             <a:ext uri="{91240B29-F687-4f45-9708-019B960494DF}">
-              <a14:hiddenLine xmlns:a14="http://schemas.microsoft.com/office/drawing/2010/main" xmlns="" w="9525" cap="flat">
+              <a14:hiddenLine xmlns="" xmlns:a14="http://schemas.microsoft.com/office/drawing/2010/main" w="9525" cap="flat">
                 <a:solidFill>
                   <a:srgbClr val="3465A4"/>
                 </a:solidFill>
@@ -9265,7 +9270,7 @@
               </a14:hiddenLine>
             </a:ext>
             <a:ext uri="{AF507438-7753-43e0-B8FC-AC1667EBCBE1}">
-              <a14:hiddenEffects xmlns:a14="http://schemas.microsoft.com/office/drawing/2010/main" xmlns="">
+              <a14:hiddenEffects xmlns="" xmlns:a14="http://schemas.microsoft.com/office/drawing/2010/main">
                 <a:effectLst>
                   <a:outerShdw blurRad="63500" dist="38099" dir="2700000" algn="ctr" rotWithShape="0">
                     <a:schemeClr val="bg2">
@@ -9674,7 +9679,7 @@
           </a:ln>
           <a:extLst>
             <a:ext uri="{AF507438-7753-43e0-B8FC-AC1667EBCBE1}">
-              <a14:hiddenEffects xmlns:a14="http://schemas.microsoft.com/office/drawing/2010/main" xmlns="">
+              <a14:hiddenEffects xmlns="" xmlns:a14="http://schemas.microsoft.com/office/drawing/2010/main">
                 <a:effectLst>
                   <a:outerShdw blurRad="63500" dist="38099" dir="2700000" algn="ctr" rotWithShape="0">
                     <a:srgbClr val="000000">
@@ -9710,14 +9715,14 @@
           <a:effectLst/>
           <a:extLst>
             <a:ext uri="{909E8E84-426E-40dd-AFC4-6F175D3DCCD1}">
-              <a14:hiddenFill xmlns:a14="http://schemas.microsoft.com/office/drawing/2010/main" xmlns="">
+              <a14:hiddenFill xmlns="" xmlns:a14="http://schemas.microsoft.com/office/drawing/2010/main">
                 <a:solidFill>
                   <a:srgbClr val="FFFFFF"/>
                 </a:solidFill>
               </a14:hiddenFill>
             </a:ext>
             <a:ext uri="{91240B29-F687-4f45-9708-019B960494DF}">
-              <a14:hiddenLine xmlns:a14="http://schemas.microsoft.com/office/drawing/2010/main" xmlns="" w="9525" cap="flat">
+              <a14:hiddenLine xmlns="" xmlns:a14="http://schemas.microsoft.com/office/drawing/2010/main" w="9525" cap="flat">
                 <a:solidFill>
                   <a:srgbClr val="3465A4"/>
                 </a:solidFill>
@@ -9727,7 +9732,7 @@
               </a14:hiddenLine>
             </a:ext>
             <a:ext uri="{AF507438-7753-43e0-B8FC-AC1667EBCBE1}">
-              <a14:hiddenEffects xmlns:a14="http://schemas.microsoft.com/office/drawing/2010/main" xmlns="">
+              <a14:hiddenEffects xmlns="" xmlns:a14="http://schemas.microsoft.com/office/drawing/2010/main">
                 <a:effectLst>
                   <a:outerShdw blurRad="63500" dist="38099" dir="2700000" algn="ctr" rotWithShape="0">
                     <a:srgbClr val="000000">
@@ -9799,14 +9804,14 @@
         <p:spPr>
           <a:extLst>
             <a:ext uri="{909E8E84-426E-40dd-AFC4-6F175D3DCCD1}">
-              <a14:hiddenFill xmlns:a14="http://schemas.microsoft.com/office/drawing/2010/main" xmlns="">
+              <a14:hiddenFill xmlns="" xmlns:a14="http://schemas.microsoft.com/office/drawing/2010/main">
                 <a:solidFill>
                   <a:srgbClr val="FFFFFF"/>
                 </a:solidFill>
               </a14:hiddenFill>
             </a:ext>
             <a:ext uri="{91240B29-F687-4f45-9708-019B960494DF}">
-              <a14:hiddenLine xmlns:a14="http://schemas.microsoft.com/office/drawing/2010/main" xmlns="" w="9525" cap="flat">
+              <a14:hiddenLine xmlns="" xmlns:a14="http://schemas.microsoft.com/office/drawing/2010/main" w="9525" cap="flat">
                 <a:solidFill>
                   <a:srgbClr val="3465A4"/>
                 </a:solidFill>
@@ -9816,7 +9821,7 @@
               </a14:hiddenLine>
             </a:ext>
             <a:ext uri="{AF507438-7753-43e0-B8FC-AC1667EBCBE1}">
-              <a14:hiddenEffects xmlns:a14="http://schemas.microsoft.com/office/drawing/2010/main" xmlns="">
+              <a14:hiddenEffects xmlns="" xmlns:a14="http://schemas.microsoft.com/office/drawing/2010/main">
                 <a:effectLst>
                   <a:outerShdw blurRad="63500" dist="38099" dir="2700000" algn="ctr" rotWithShape="0">
                     <a:schemeClr val="bg2">
@@ -10225,7 +10230,7 @@
           </a:ln>
           <a:extLst>
             <a:ext uri="{AF507438-7753-43e0-B8FC-AC1667EBCBE1}">
-              <a14:hiddenEffects xmlns:a14="http://schemas.microsoft.com/office/drawing/2010/main" xmlns="">
+              <a14:hiddenEffects xmlns="" xmlns:a14="http://schemas.microsoft.com/office/drawing/2010/main">
                 <a:effectLst>
                   <a:outerShdw blurRad="63500" dist="38099" dir="2700000" algn="ctr" rotWithShape="0">
                     <a:srgbClr val="000000">
@@ -10261,14 +10266,14 @@
           <a:effectLst/>
           <a:extLst>
             <a:ext uri="{909E8E84-426E-40dd-AFC4-6F175D3DCCD1}">
-              <a14:hiddenFill xmlns:a14="http://schemas.microsoft.com/office/drawing/2010/main" xmlns="">
+              <a14:hiddenFill xmlns="" xmlns:a14="http://schemas.microsoft.com/office/drawing/2010/main">
                 <a:solidFill>
                   <a:srgbClr val="FFFFFF"/>
                 </a:solidFill>
               </a14:hiddenFill>
             </a:ext>
             <a:ext uri="{91240B29-F687-4f45-9708-019B960494DF}">
-              <a14:hiddenLine xmlns:a14="http://schemas.microsoft.com/office/drawing/2010/main" xmlns="" w="9525" cap="flat">
+              <a14:hiddenLine xmlns="" xmlns:a14="http://schemas.microsoft.com/office/drawing/2010/main" w="9525" cap="flat">
                 <a:solidFill>
                   <a:srgbClr val="3465A4"/>
                 </a:solidFill>
@@ -10278,7 +10283,7 @@
               </a14:hiddenLine>
             </a:ext>
             <a:ext uri="{AF507438-7753-43e0-B8FC-AC1667EBCBE1}">
-              <a14:hiddenEffects xmlns:a14="http://schemas.microsoft.com/office/drawing/2010/main" xmlns="">
+              <a14:hiddenEffects xmlns="" xmlns:a14="http://schemas.microsoft.com/office/drawing/2010/main">
                 <a:effectLst>
                   <a:outerShdw blurRad="63500" dist="38099" dir="2700000" algn="ctr" rotWithShape="0">
                     <a:srgbClr val="000000">
@@ -10350,14 +10355,14 @@
         <p:spPr>
           <a:extLst>
             <a:ext uri="{909E8E84-426E-40dd-AFC4-6F175D3DCCD1}">
-              <a14:hiddenFill xmlns:a14="http://schemas.microsoft.com/office/drawing/2010/main" xmlns="">
+              <a14:hiddenFill xmlns="" xmlns:a14="http://schemas.microsoft.com/office/drawing/2010/main">
                 <a:solidFill>
                   <a:srgbClr val="FFFFFF"/>
                 </a:solidFill>
               </a14:hiddenFill>
             </a:ext>
             <a:ext uri="{91240B29-F687-4f45-9708-019B960494DF}">
-              <a14:hiddenLine xmlns:a14="http://schemas.microsoft.com/office/drawing/2010/main" xmlns="" w="9525" cap="flat">
+              <a14:hiddenLine xmlns="" xmlns:a14="http://schemas.microsoft.com/office/drawing/2010/main" w="9525" cap="flat">
                 <a:solidFill>
                   <a:srgbClr val="3465A4"/>
                 </a:solidFill>
@@ -10367,7 +10372,7 @@
               </a14:hiddenLine>
             </a:ext>
             <a:ext uri="{AF507438-7753-43e0-B8FC-AC1667EBCBE1}">
-              <a14:hiddenEffects xmlns:a14="http://schemas.microsoft.com/office/drawing/2010/main" xmlns="">
+              <a14:hiddenEffects xmlns="" xmlns:a14="http://schemas.microsoft.com/office/drawing/2010/main">
                 <a:effectLst>
                   <a:outerShdw blurRad="63500" dist="38099" dir="2700000" algn="ctr" rotWithShape="0">
                     <a:schemeClr val="bg2">
@@ -10776,7 +10781,7 @@
           </a:ln>
           <a:extLst>
             <a:ext uri="{AF507438-7753-43e0-B8FC-AC1667EBCBE1}">
-              <a14:hiddenEffects xmlns:a14="http://schemas.microsoft.com/office/drawing/2010/main" xmlns="">
+              <a14:hiddenEffects xmlns="" xmlns:a14="http://schemas.microsoft.com/office/drawing/2010/main">
                 <a:effectLst>
                   <a:outerShdw blurRad="63500" dist="38099" dir="2700000" algn="ctr" rotWithShape="0">
                     <a:srgbClr val="000000">
@@ -10812,14 +10817,14 @@
           <a:effectLst/>
           <a:extLst>
             <a:ext uri="{909E8E84-426E-40dd-AFC4-6F175D3DCCD1}">
-              <a14:hiddenFill xmlns:a14="http://schemas.microsoft.com/office/drawing/2010/main" xmlns="">
+              <a14:hiddenFill xmlns="" xmlns:a14="http://schemas.microsoft.com/office/drawing/2010/main">
                 <a:solidFill>
                   <a:srgbClr val="FFFFFF"/>
                 </a:solidFill>
               </a14:hiddenFill>
             </a:ext>
             <a:ext uri="{91240B29-F687-4f45-9708-019B960494DF}">
-              <a14:hiddenLine xmlns:a14="http://schemas.microsoft.com/office/drawing/2010/main" xmlns="" w="9525" cap="flat">
+              <a14:hiddenLine xmlns="" xmlns:a14="http://schemas.microsoft.com/office/drawing/2010/main" w="9525" cap="flat">
                 <a:solidFill>
                   <a:srgbClr val="3465A4"/>
                 </a:solidFill>
@@ -10829,7 +10834,7 @@
               </a14:hiddenLine>
             </a:ext>
             <a:ext uri="{AF507438-7753-43e0-B8FC-AC1667EBCBE1}">
-              <a14:hiddenEffects xmlns:a14="http://schemas.microsoft.com/office/drawing/2010/main" xmlns="">
+              <a14:hiddenEffects xmlns="" xmlns:a14="http://schemas.microsoft.com/office/drawing/2010/main">
                 <a:effectLst>
                   <a:outerShdw blurRad="63500" dist="38099" dir="2700000" algn="ctr" rotWithShape="0">
                     <a:srgbClr val="000000">
@@ -10906,14 +10911,14 @@
         <p:spPr>
           <a:extLst>
             <a:ext uri="{909E8E84-426E-40dd-AFC4-6F175D3DCCD1}">
-              <a14:hiddenFill xmlns:a14="http://schemas.microsoft.com/office/drawing/2010/main" xmlns="">
+              <a14:hiddenFill xmlns="" xmlns:a14="http://schemas.microsoft.com/office/drawing/2010/main">
                 <a:solidFill>
                   <a:srgbClr val="FFFFFF"/>
                 </a:solidFill>
               </a14:hiddenFill>
             </a:ext>
             <a:ext uri="{91240B29-F687-4f45-9708-019B960494DF}">
-              <a14:hiddenLine xmlns:a14="http://schemas.microsoft.com/office/drawing/2010/main" xmlns="" w="9525" cap="flat">
+              <a14:hiddenLine xmlns="" xmlns:a14="http://schemas.microsoft.com/office/drawing/2010/main" w="9525" cap="flat">
                 <a:solidFill>
                   <a:srgbClr val="3465A4"/>
                 </a:solidFill>
@@ -10923,7 +10928,7 @@
               </a14:hiddenLine>
             </a:ext>
             <a:ext uri="{AF507438-7753-43e0-B8FC-AC1667EBCBE1}">
-              <a14:hiddenEffects xmlns:a14="http://schemas.microsoft.com/office/drawing/2010/main" xmlns="">
+              <a14:hiddenEffects xmlns="" xmlns:a14="http://schemas.microsoft.com/office/drawing/2010/main">
                 <a:effectLst>
                   <a:outerShdw blurRad="63500" dist="38099" dir="2700000" algn="ctr" rotWithShape="0">
                     <a:schemeClr val="bg2">
@@ -11332,7 +11337,7 @@
           </a:ln>
           <a:extLst>
             <a:ext uri="{AF507438-7753-43e0-B8FC-AC1667EBCBE1}">
-              <a14:hiddenEffects xmlns:a14="http://schemas.microsoft.com/office/drawing/2010/main" xmlns="">
+              <a14:hiddenEffects xmlns="" xmlns:a14="http://schemas.microsoft.com/office/drawing/2010/main">
                 <a:effectLst>
                   <a:outerShdw blurRad="63500" dist="38099" dir="2700000" algn="ctr" rotWithShape="0">
                     <a:srgbClr val="000000">
@@ -11368,14 +11373,14 @@
           <a:effectLst/>
           <a:extLst>
             <a:ext uri="{909E8E84-426E-40dd-AFC4-6F175D3DCCD1}">
-              <a14:hiddenFill xmlns:a14="http://schemas.microsoft.com/office/drawing/2010/main" xmlns="">
+              <a14:hiddenFill xmlns="" xmlns:a14="http://schemas.microsoft.com/office/drawing/2010/main">
                 <a:solidFill>
                   <a:srgbClr val="FFFFFF"/>
                 </a:solidFill>
               </a14:hiddenFill>
             </a:ext>
             <a:ext uri="{91240B29-F687-4f45-9708-019B960494DF}">
-              <a14:hiddenLine xmlns:a14="http://schemas.microsoft.com/office/drawing/2010/main" xmlns="" w="9525" cap="flat">
+              <a14:hiddenLine xmlns="" xmlns:a14="http://schemas.microsoft.com/office/drawing/2010/main" w="9525" cap="flat">
                 <a:solidFill>
                   <a:srgbClr val="3465A4"/>
                 </a:solidFill>
@@ -11385,7 +11390,7 @@
               </a14:hiddenLine>
             </a:ext>
             <a:ext uri="{AF507438-7753-43e0-B8FC-AC1667EBCBE1}">
-              <a14:hiddenEffects xmlns:a14="http://schemas.microsoft.com/office/drawing/2010/main" xmlns="">
+              <a14:hiddenEffects xmlns="" xmlns:a14="http://schemas.microsoft.com/office/drawing/2010/main">
                 <a:effectLst>
                   <a:outerShdw blurRad="63500" dist="38099" dir="2700000" algn="ctr" rotWithShape="0">
                     <a:srgbClr val="000000">
@@ -11457,14 +11462,14 @@
         <p:spPr>
           <a:extLst>
             <a:ext uri="{909E8E84-426E-40dd-AFC4-6F175D3DCCD1}">
-              <a14:hiddenFill xmlns:a14="http://schemas.microsoft.com/office/drawing/2010/main" xmlns="">
+              <a14:hiddenFill xmlns="" xmlns:a14="http://schemas.microsoft.com/office/drawing/2010/main">
                 <a:solidFill>
                   <a:srgbClr val="FFFFFF"/>
                 </a:solidFill>
               </a14:hiddenFill>
             </a:ext>
             <a:ext uri="{91240B29-F687-4f45-9708-019B960494DF}">
-              <a14:hiddenLine xmlns:a14="http://schemas.microsoft.com/office/drawing/2010/main" xmlns="" w="9525" cap="flat">
+              <a14:hiddenLine xmlns="" xmlns:a14="http://schemas.microsoft.com/office/drawing/2010/main" w="9525" cap="flat">
                 <a:solidFill>
                   <a:srgbClr val="3465A4"/>
                 </a:solidFill>
@@ -11474,7 +11479,7 @@
               </a14:hiddenLine>
             </a:ext>
             <a:ext uri="{AF507438-7753-43e0-B8FC-AC1667EBCBE1}">
-              <a14:hiddenEffects xmlns:a14="http://schemas.microsoft.com/office/drawing/2010/main" xmlns="">
+              <a14:hiddenEffects xmlns="" xmlns:a14="http://schemas.microsoft.com/office/drawing/2010/main">
                 <a:effectLst>
                   <a:outerShdw blurRad="63500" dist="38099" dir="2700000" algn="ctr" rotWithShape="0">
                     <a:schemeClr val="bg2">
@@ -11883,7 +11888,7 @@
           </a:ln>
           <a:extLst>
             <a:ext uri="{AF507438-7753-43e0-B8FC-AC1667EBCBE1}">
-              <a14:hiddenEffects xmlns:a14="http://schemas.microsoft.com/office/drawing/2010/main" xmlns="">
+              <a14:hiddenEffects xmlns="" xmlns:a14="http://schemas.microsoft.com/office/drawing/2010/main">
                 <a:effectLst>
                   <a:outerShdw blurRad="63500" dist="38099" dir="2700000" algn="ctr" rotWithShape="0">
                     <a:srgbClr val="000000">
@@ -11919,14 +11924,14 @@
           <a:effectLst/>
           <a:extLst>
             <a:ext uri="{909E8E84-426E-40dd-AFC4-6F175D3DCCD1}">
-              <a14:hiddenFill xmlns:a14="http://schemas.microsoft.com/office/drawing/2010/main" xmlns="">
+              <a14:hiddenFill xmlns="" xmlns:a14="http://schemas.microsoft.com/office/drawing/2010/main">
                 <a:solidFill>
                   <a:srgbClr val="FFFFFF"/>
                 </a:solidFill>
               </a14:hiddenFill>
             </a:ext>
             <a:ext uri="{91240B29-F687-4f45-9708-019B960494DF}">
-              <a14:hiddenLine xmlns:a14="http://schemas.microsoft.com/office/drawing/2010/main" xmlns="" w="9525" cap="flat">
+              <a14:hiddenLine xmlns="" xmlns:a14="http://schemas.microsoft.com/office/drawing/2010/main" w="9525" cap="flat">
                 <a:solidFill>
                   <a:srgbClr val="3465A4"/>
                 </a:solidFill>
@@ -11936,7 +11941,7 @@
               </a14:hiddenLine>
             </a:ext>
             <a:ext uri="{AF507438-7753-43e0-B8FC-AC1667EBCBE1}">
-              <a14:hiddenEffects xmlns:a14="http://schemas.microsoft.com/office/drawing/2010/main" xmlns="">
+              <a14:hiddenEffects xmlns="" xmlns:a14="http://schemas.microsoft.com/office/drawing/2010/main">
                 <a:effectLst>
                   <a:outerShdw blurRad="63500" dist="38099" dir="2700000" algn="ctr" rotWithShape="0">
                     <a:srgbClr val="000000">
@@ -12008,14 +12013,14 @@
         <p:spPr>
           <a:extLst>
             <a:ext uri="{909E8E84-426E-40dd-AFC4-6F175D3DCCD1}">
-              <a14:hiddenFill xmlns:a14="http://schemas.microsoft.com/office/drawing/2010/main" xmlns="">
+              <a14:hiddenFill xmlns="" xmlns:a14="http://schemas.microsoft.com/office/drawing/2010/main">
                 <a:solidFill>
                   <a:srgbClr val="FFFFFF"/>
                 </a:solidFill>
               </a14:hiddenFill>
             </a:ext>
             <a:ext uri="{91240B29-F687-4f45-9708-019B960494DF}">
-              <a14:hiddenLine xmlns:a14="http://schemas.microsoft.com/office/drawing/2010/main" xmlns="" w="9525" cap="flat">
+              <a14:hiddenLine xmlns="" xmlns:a14="http://schemas.microsoft.com/office/drawing/2010/main" w="9525" cap="flat">
                 <a:solidFill>
                   <a:srgbClr val="3465A4"/>
                 </a:solidFill>
@@ -12025,7 +12030,7 @@
               </a14:hiddenLine>
             </a:ext>
             <a:ext uri="{AF507438-7753-43e0-B8FC-AC1667EBCBE1}">
-              <a14:hiddenEffects xmlns:a14="http://schemas.microsoft.com/office/drawing/2010/main" xmlns="">
+              <a14:hiddenEffects xmlns="" xmlns:a14="http://schemas.microsoft.com/office/drawing/2010/main">
                 <a:effectLst>
                   <a:outerShdw blurRad="63500" dist="38099" dir="2700000" algn="ctr" rotWithShape="0">
                     <a:schemeClr val="bg2">
@@ -12434,7 +12439,7 @@
           </a:ln>
           <a:extLst>
             <a:ext uri="{AF507438-7753-43e0-B8FC-AC1667EBCBE1}">
-              <a14:hiddenEffects xmlns:a14="http://schemas.microsoft.com/office/drawing/2010/main" xmlns="">
+              <a14:hiddenEffects xmlns="" xmlns:a14="http://schemas.microsoft.com/office/drawing/2010/main">
                 <a:effectLst>
                   <a:outerShdw blurRad="63500" dist="38099" dir="2700000" algn="ctr" rotWithShape="0">
                     <a:srgbClr val="000000">
@@ -12470,14 +12475,14 @@
           <a:effectLst/>
           <a:extLst>
             <a:ext uri="{909E8E84-426E-40dd-AFC4-6F175D3DCCD1}">
-              <a14:hiddenFill xmlns:a14="http://schemas.microsoft.com/office/drawing/2010/main" xmlns="">
+              <a14:hiddenFill xmlns="" xmlns:a14="http://schemas.microsoft.com/office/drawing/2010/main">
                 <a:solidFill>
                   <a:srgbClr val="FFFFFF"/>
                 </a:solidFill>
               </a14:hiddenFill>
             </a:ext>
             <a:ext uri="{91240B29-F687-4f45-9708-019B960494DF}">
-              <a14:hiddenLine xmlns:a14="http://schemas.microsoft.com/office/drawing/2010/main" xmlns="" w="9525" cap="flat">
+              <a14:hiddenLine xmlns="" xmlns:a14="http://schemas.microsoft.com/office/drawing/2010/main" w="9525" cap="flat">
                 <a:solidFill>
                   <a:srgbClr val="3465A4"/>
                 </a:solidFill>
@@ -12487,7 +12492,7 @@
               </a14:hiddenLine>
             </a:ext>
             <a:ext uri="{AF507438-7753-43e0-B8FC-AC1667EBCBE1}">
-              <a14:hiddenEffects xmlns:a14="http://schemas.microsoft.com/office/drawing/2010/main" xmlns="">
+              <a14:hiddenEffects xmlns="" xmlns:a14="http://schemas.microsoft.com/office/drawing/2010/main">
                 <a:effectLst>
                   <a:outerShdw blurRad="63500" dist="38099" dir="2700000" algn="ctr" rotWithShape="0">
                     <a:srgbClr val="000000">
@@ -14620,7 +14625,7 @@
           <a:effectLst/>
           <a:extLst>
             <a:ext uri="{AF507438-7753-43e0-B8FC-AC1667EBCBE1}">
-              <a14:hiddenEffects xmlns:a14="http://schemas.microsoft.com/office/drawing/2010/main" xmlns="">
+              <a14:hiddenEffects xmlns="" xmlns:a14="http://schemas.microsoft.com/office/drawing/2010/main">
                 <a:effectLst>
                   <a:outerShdw blurRad="63500" dist="38099" dir="2700000" algn="ctr" rotWithShape="0">
                     <a:srgbClr val="000000">
@@ -14670,17 +14675,17 @@
           <a:effectLst/>
           <a:extLst>
             <a:ext uri="{FAA26D3D-D897-4be2-8F04-BA451C77F1D7}">
-              <ma14:placeholderFlag xmlns:ma14="http://schemas.microsoft.com/office/mac/drawingml/2011/main" xmlns="" val="1"/>
+              <ma14:placeholderFlag xmlns="" xmlns:ma14="http://schemas.microsoft.com/office/mac/drawingml/2011/main" val="1"/>
             </a:ext>
             <a:ext uri="{909E8E84-426E-40dd-AFC4-6F175D3DCCD1}">
-              <a14:hiddenFill xmlns:a14="http://schemas.microsoft.com/office/drawing/2010/main" xmlns="">
+              <a14:hiddenFill xmlns="" xmlns:a14="http://schemas.microsoft.com/office/drawing/2010/main">
                 <a:solidFill>
                   <a:srgbClr val="FFFFFF"/>
                 </a:solidFill>
               </a14:hiddenFill>
             </a:ext>
             <a:ext uri="{91240B29-F687-4f45-9708-019B960494DF}">
-              <a14:hiddenLine xmlns:a14="http://schemas.microsoft.com/office/drawing/2010/main" xmlns="" w="9525" cap="flat">
+              <a14:hiddenLine xmlns="" xmlns:a14="http://schemas.microsoft.com/office/drawing/2010/main" w="9525" cap="flat">
                 <a:solidFill>
                   <a:srgbClr val="3465A4"/>
                 </a:solidFill>
@@ -14690,7 +14695,7 @@
               </a14:hiddenLine>
             </a:ext>
             <a:ext uri="{AF507438-7753-43e0-B8FC-AC1667EBCBE1}">
-              <a14:hiddenEffects xmlns:a14="http://schemas.microsoft.com/office/drawing/2010/main" xmlns="">
+              <a14:hiddenEffects xmlns="" xmlns:a14="http://schemas.microsoft.com/office/drawing/2010/main">
                 <a:effectLst>
                   <a:outerShdw blurRad="63500" dist="38099" dir="2700000" algn="ctr" rotWithShape="0">
                     <a:schemeClr val="bg2">
@@ -14743,17 +14748,17 @@
           <a:effectLst/>
           <a:extLst>
             <a:ext uri="{FAA26D3D-D897-4be2-8F04-BA451C77F1D7}">
-              <ma14:placeholderFlag xmlns:ma14="http://schemas.microsoft.com/office/mac/drawingml/2011/main" xmlns="" val="1"/>
+              <ma14:placeholderFlag xmlns="" xmlns:ma14="http://schemas.microsoft.com/office/mac/drawingml/2011/main" val="1"/>
             </a:ext>
             <a:ext uri="{909E8E84-426E-40dd-AFC4-6F175D3DCCD1}">
-              <a14:hiddenFill xmlns:a14="http://schemas.microsoft.com/office/drawing/2010/main" xmlns="">
+              <a14:hiddenFill xmlns="" xmlns:a14="http://schemas.microsoft.com/office/drawing/2010/main">
                 <a:solidFill>
                   <a:srgbClr val="FFFFFF"/>
                 </a:solidFill>
               </a14:hiddenFill>
             </a:ext>
             <a:ext uri="{91240B29-F687-4f45-9708-019B960494DF}">
-              <a14:hiddenLine xmlns:a14="http://schemas.microsoft.com/office/drawing/2010/main" xmlns="" w="9525" cap="flat">
+              <a14:hiddenLine xmlns="" xmlns:a14="http://schemas.microsoft.com/office/drawing/2010/main" w="9525" cap="flat">
                 <a:solidFill>
                   <a:srgbClr val="3465A4"/>
                 </a:solidFill>
@@ -14763,7 +14768,7 @@
               </a14:hiddenLine>
             </a:ext>
             <a:ext uri="{AF507438-7753-43e0-B8FC-AC1667EBCBE1}">
-              <a14:hiddenEffects xmlns:a14="http://schemas.microsoft.com/office/drawing/2010/main" xmlns="">
+              <a14:hiddenEffects xmlns="" xmlns:a14="http://schemas.microsoft.com/office/drawing/2010/main">
                 <a:effectLst>
                   <a:outerShdw blurRad="63500" dist="38099" dir="2700000" algn="ctr" rotWithShape="0">
                     <a:schemeClr val="bg2">
@@ -14856,14 +14861,14 @@
           <a:effectLst/>
           <a:extLst>
             <a:ext uri="{909E8E84-426E-40dd-AFC4-6F175D3DCCD1}">
-              <a14:hiddenFill xmlns:a14="http://schemas.microsoft.com/office/drawing/2010/main" xmlns="">
+              <a14:hiddenFill xmlns="" xmlns:a14="http://schemas.microsoft.com/office/drawing/2010/main">
                 <a:solidFill>
                   <a:srgbClr val="FFFFFF"/>
                 </a:solidFill>
               </a14:hiddenFill>
             </a:ext>
             <a:ext uri="{91240B29-F687-4f45-9708-019B960494DF}">
-              <a14:hiddenLine xmlns:a14="http://schemas.microsoft.com/office/drawing/2010/main" xmlns="" w="9525" cap="flat">
+              <a14:hiddenLine xmlns="" xmlns:a14="http://schemas.microsoft.com/office/drawing/2010/main" w="9525" cap="flat">
                 <a:solidFill>
                   <a:srgbClr val="3465A4"/>
                 </a:solidFill>
@@ -14873,7 +14878,7 @@
               </a14:hiddenLine>
             </a:ext>
             <a:ext uri="{AF507438-7753-43e0-B8FC-AC1667EBCBE1}">
-              <a14:hiddenEffects xmlns:a14="http://schemas.microsoft.com/office/drawing/2010/main" xmlns="">
+              <a14:hiddenEffects xmlns="" xmlns:a14="http://schemas.microsoft.com/office/drawing/2010/main">
                 <a:effectLst>
                   <a:outerShdw blurRad="63500" dist="38099" dir="2700000" algn="ctr" rotWithShape="0">
                     <a:srgbClr val="000000">
@@ -14923,17 +14928,17 @@
           <a:effectLst/>
           <a:extLst>
             <a:ext uri="{FAA26D3D-D897-4be2-8F04-BA451C77F1D7}">
-              <ma14:placeholderFlag xmlns:ma14="http://schemas.microsoft.com/office/mac/drawingml/2011/main" xmlns="" val="1"/>
+              <ma14:placeholderFlag xmlns="" xmlns:ma14="http://schemas.microsoft.com/office/mac/drawingml/2011/main" val="1"/>
             </a:ext>
             <a:ext uri="{909E8E84-426E-40dd-AFC4-6F175D3DCCD1}">
-              <a14:hiddenFill xmlns:a14="http://schemas.microsoft.com/office/drawing/2010/main" xmlns="">
+              <a14:hiddenFill xmlns="" xmlns:a14="http://schemas.microsoft.com/office/drawing/2010/main">
                 <a:solidFill>
                   <a:srgbClr val="FFFFFF"/>
                 </a:solidFill>
               </a14:hiddenFill>
             </a:ext>
             <a:ext uri="{91240B29-F687-4f45-9708-019B960494DF}">
-              <a14:hiddenLine xmlns:a14="http://schemas.microsoft.com/office/drawing/2010/main" xmlns="" w="9525" cap="flat">
+              <a14:hiddenLine xmlns="" xmlns:a14="http://schemas.microsoft.com/office/drawing/2010/main" w="9525" cap="flat">
                 <a:solidFill>
                   <a:srgbClr val="3465A4"/>
                 </a:solidFill>
@@ -14943,7 +14948,7 @@
               </a14:hiddenLine>
             </a:ext>
             <a:ext uri="{AF507438-7753-43e0-B8FC-AC1667EBCBE1}">
-              <a14:hiddenEffects xmlns:a14="http://schemas.microsoft.com/office/drawing/2010/main" xmlns="">
+              <a14:hiddenEffects xmlns="" xmlns:a14="http://schemas.microsoft.com/office/drawing/2010/main">
                 <a:effectLst>
                   <a:outerShdw blurRad="63500" dist="38099" dir="2700000" algn="ctr" rotWithShape="0">
                     <a:schemeClr val="bg2">
@@ -15042,7 +15047,7 @@
           <a:effectLst/>
           <a:extLst>
             <a:ext uri="{909E8E84-426E-40dd-AFC4-6F175D3DCCD1}">
-              <a14:hiddenFill xmlns:a14="http://schemas.microsoft.com/office/drawing/2010/main" xmlns="">
+              <a14:hiddenFill xmlns="" xmlns:a14="http://schemas.microsoft.com/office/drawing/2010/main">
                 <a:blipFill dpi="0" rotWithShape="0">
                   <a:blip xmlns:r="http://schemas.openxmlformats.org/officeDocument/2006/relationships"/>
                   <a:srcRect/>
@@ -15053,7 +15058,7 @@
               </a14:hiddenFill>
             </a:ext>
             <a:ext uri="{91240B29-F687-4f45-9708-019B960494DF}">
-              <a14:hiddenLine xmlns:a14="http://schemas.microsoft.com/office/drawing/2010/main" xmlns="" w="9525" cap="flat">
+              <a14:hiddenLine xmlns="" xmlns:a14="http://schemas.microsoft.com/office/drawing/2010/main" w="9525" cap="flat">
                 <a:solidFill>
                   <a:srgbClr val="3465A4"/>
                 </a:solidFill>
@@ -15063,7 +15068,7 @@
               </a14:hiddenLine>
             </a:ext>
             <a:ext uri="{AF507438-7753-43e0-B8FC-AC1667EBCBE1}">
-              <a14:hiddenEffects xmlns:a14="http://schemas.microsoft.com/office/drawing/2010/main" xmlns="">
+              <a14:hiddenEffects xmlns="" xmlns:a14="http://schemas.microsoft.com/office/drawing/2010/main">
                 <a:effectLst>
                   <a:outerShdw blurRad="63500" dist="38099" dir="2700000" algn="ctr" rotWithShape="0">
                     <a:srgbClr val="000000">
@@ -15099,14 +15104,14 @@
           <a:effectLst/>
           <a:extLst>
             <a:ext uri="{909E8E84-426E-40dd-AFC4-6F175D3DCCD1}">
-              <a14:hiddenFill xmlns:a14="http://schemas.microsoft.com/office/drawing/2010/main" xmlns="">
+              <a14:hiddenFill xmlns="" xmlns:a14="http://schemas.microsoft.com/office/drawing/2010/main">
                 <a:solidFill>
                   <a:srgbClr val="FFFFFF"/>
                 </a:solidFill>
               </a14:hiddenFill>
             </a:ext>
             <a:ext uri="{91240B29-F687-4f45-9708-019B960494DF}">
-              <a14:hiddenLine xmlns:a14="http://schemas.microsoft.com/office/drawing/2010/main" xmlns="" w="9525" cap="flat">
+              <a14:hiddenLine xmlns="" xmlns:a14="http://schemas.microsoft.com/office/drawing/2010/main" w="9525" cap="flat">
                 <a:solidFill>
                   <a:srgbClr val="3465A4"/>
                 </a:solidFill>
@@ -15116,7 +15121,7 @@
               </a14:hiddenLine>
             </a:ext>
             <a:ext uri="{AF507438-7753-43e0-B8FC-AC1667EBCBE1}">
-              <a14:hiddenEffects xmlns:a14="http://schemas.microsoft.com/office/drawing/2010/main" xmlns="">
+              <a14:hiddenEffects xmlns="" xmlns:a14="http://schemas.microsoft.com/office/drawing/2010/main">
                 <a:effectLst>
                   <a:outerShdw blurRad="63500" dist="38099" dir="2700000" algn="ctr" rotWithShape="0">
                     <a:srgbClr val="000000">
@@ -15947,7 +15952,7 @@
             </a:r>
             <a:r>
               <a:rPr lang="en-GB" altLang="x-none" dirty="0"/>
-              <a:t> 2018</a:t>
+              <a:t> 2019</a:t>
             </a:r>
           </a:p>
           <a:p>
@@ -16310,14 +16315,14 @@
           <a:effectLst/>
           <a:extLst>
             <a:ext uri="{909E8E84-426E-40dd-AFC4-6F175D3DCCD1}">
-              <a14:hiddenFill xmlns:a14="http://schemas.microsoft.com/office/drawing/2010/main" xmlns="">
+              <a14:hiddenFill xmlns="" xmlns:a14="http://schemas.microsoft.com/office/drawing/2010/main">
                 <a:solidFill>
                   <a:srgbClr val="FFFFFF"/>
                 </a:solidFill>
               </a14:hiddenFill>
             </a:ext>
             <a:ext uri="{91240B29-F687-4f45-9708-019B960494DF}">
-              <a14:hiddenLine xmlns:a14="http://schemas.microsoft.com/office/drawing/2010/main" xmlns="" w="9525" cap="flat">
+              <a14:hiddenLine xmlns="" xmlns:a14="http://schemas.microsoft.com/office/drawing/2010/main" w="9525" cap="flat">
                 <a:solidFill>
                   <a:srgbClr val="3465A4"/>
                 </a:solidFill>
@@ -16327,7 +16332,7 @@
               </a14:hiddenLine>
             </a:ext>
             <a:ext uri="{AF507438-7753-43e0-B8FC-AC1667EBCBE1}">
-              <a14:hiddenEffects xmlns:a14="http://schemas.microsoft.com/office/drawing/2010/main" xmlns="">
+              <a14:hiddenEffects xmlns="" xmlns:a14="http://schemas.microsoft.com/office/drawing/2010/main">
                 <a:effectLst>
                   <a:outerShdw blurRad="63500" dist="38099" dir="2700000" algn="ctr" rotWithShape="0">
                     <a:srgbClr val="000000">
@@ -16739,14 +16744,14 @@
           <a:effectLst/>
           <a:extLst>
             <a:ext uri="{909E8E84-426E-40dd-AFC4-6F175D3DCCD1}">
-              <a14:hiddenFill xmlns:a14="http://schemas.microsoft.com/office/drawing/2010/main" xmlns="">
+              <a14:hiddenFill xmlns="" xmlns:a14="http://schemas.microsoft.com/office/drawing/2010/main">
                 <a:solidFill>
                   <a:srgbClr val="FFFFFF"/>
                 </a:solidFill>
               </a14:hiddenFill>
             </a:ext>
             <a:ext uri="{91240B29-F687-4f45-9708-019B960494DF}">
-              <a14:hiddenLine xmlns:a14="http://schemas.microsoft.com/office/drawing/2010/main" xmlns="" w="9525" cap="flat">
+              <a14:hiddenLine xmlns="" xmlns:a14="http://schemas.microsoft.com/office/drawing/2010/main" w="9525" cap="flat">
                 <a:solidFill>
                   <a:srgbClr val="3465A4"/>
                 </a:solidFill>
@@ -16756,7 +16761,7 @@
               </a14:hiddenLine>
             </a:ext>
             <a:ext uri="{AF507438-7753-43e0-B8FC-AC1667EBCBE1}">
-              <a14:hiddenEffects xmlns:a14="http://schemas.microsoft.com/office/drawing/2010/main" xmlns="">
+              <a14:hiddenEffects xmlns="" xmlns:a14="http://schemas.microsoft.com/office/drawing/2010/main">
                 <a:effectLst>
                   <a:outerShdw blurRad="63500" dist="38099" dir="2700000" algn="ctr" rotWithShape="0">
                     <a:srgbClr val="000000">
@@ -17236,30 +17241,6 @@
               <a:cs typeface="Arial" charset="0"/>
             </a:endParaRPr>
           </a:p>
-          <a:p>
-            <a:pPr>
-              <a:lnSpc>
-                <a:spcPct val="97000"/>
-              </a:lnSpc>
-              <a:spcAft>
-                <a:spcPts val="1413"/>
-              </a:spcAft>
-              <a:buClr>
-                <a:srgbClr val="FF6309"/>
-              </a:buClr>
-              <a:buSzPct val="45000"/>
-              <a:buFont typeface="Wingdings" charset="0"/>
-              <a:buChar char=""/>
-              <a:defRPr/>
-            </a:pPr>
-            <a:r>
-              <a:rPr lang="en-US" sz="2800" dirty="0">
-                <a:ea typeface="Arial" charset="0"/>
-                <a:cs typeface="Arial" charset="0"/>
-              </a:rPr>
-              <a:t>Update your system clock</a:t>
-            </a:r>
-          </a:p>
         </p:txBody>
       </p:sp>
       <p:sp>
@@ -17562,88 +17543,6 @@
               <a:ea typeface="Courier" charset="0"/>
               <a:cs typeface="Courier" charset="0"/>
             </a:endParaRPr>
-          </a:p>
-        </p:txBody>
-      </p:sp>
-      <p:sp>
-        <p:nvSpPr>
-          <p:cNvPr id="7" name="TextBox 6"/>
-          <p:cNvSpPr txBox="1"/>
-          <p:nvPr/>
-        </p:nvSpPr>
-        <p:spPr>
-          <a:xfrm>
-            <a:off x="925512" y="5643977"/>
-            <a:ext cx="8613776" cy="446917"/>
-          </a:xfrm>
-          <a:prstGeom prst="rect">
-            <a:avLst/>
-          </a:prstGeom>
-          <a:solidFill>
-            <a:schemeClr val="bg2"/>
-          </a:solidFill>
-        </p:spPr>
-        <p:txBody>
-          <a:bodyPr wrap="square" rtlCol="0">
-            <a:spAutoFit/>
-          </a:bodyPr>
-          <a:lstStyle/>
-          <a:p>
-            <a:r>
-              <a:rPr lang="en-US" dirty="0">
-                <a:solidFill>
-                  <a:schemeClr val="tx1"/>
-                </a:solidFill>
-                <a:latin typeface="Courier" charset="0"/>
-                <a:ea typeface="Courier" charset="0"/>
-                <a:cs typeface="Courier" charset="0"/>
-              </a:rPr>
-              <a:t>$ </a:t>
-            </a:r>
-            <a:r>
-              <a:rPr lang="en-US" dirty="0" err="1">
-                <a:solidFill>
-                  <a:schemeClr val="tx1"/>
-                </a:solidFill>
-                <a:latin typeface="Courier" charset="0"/>
-                <a:ea typeface="Courier" charset="0"/>
-                <a:cs typeface="Courier" charset="0"/>
-              </a:rPr>
-              <a:t>sudo</a:t>
-            </a:r>
-            <a:r>
-              <a:rPr lang="en-US" dirty="0">
-                <a:solidFill>
-                  <a:schemeClr val="tx1"/>
-                </a:solidFill>
-                <a:latin typeface="Courier" charset="0"/>
-                <a:ea typeface="Courier" charset="0"/>
-                <a:cs typeface="Courier" charset="0"/>
-              </a:rPr>
-              <a:t> </a:t>
-            </a:r>
-            <a:r>
-              <a:rPr lang="en-US" dirty="0" err="1">
-                <a:solidFill>
-                  <a:schemeClr val="tx1"/>
-                </a:solidFill>
-                <a:latin typeface="Courier" charset="0"/>
-                <a:ea typeface="Courier" charset="0"/>
-                <a:cs typeface="Courier" charset="0"/>
-              </a:rPr>
-              <a:t>ntpdate</a:t>
-            </a:r>
-            <a:r>
-              <a:rPr lang="en-US" dirty="0">
-                <a:solidFill>
-                  <a:schemeClr val="tx1"/>
-                </a:solidFill>
-                <a:latin typeface="Courier" charset="0"/>
-                <a:ea typeface="Courier" charset="0"/>
-                <a:cs typeface="Courier" charset="0"/>
-              </a:rPr>
-              <a:t> –u 0.pool.ntp.org</a:t>
-            </a:r>
           </a:p>
         </p:txBody>
       </p:sp>
@@ -17733,14 +17632,14 @@
           <a:effectLst/>
           <a:extLst>
             <a:ext uri="{909E8E84-426E-40dd-AFC4-6F175D3DCCD1}">
-              <a14:hiddenFill xmlns:a14="http://schemas.microsoft.com/office/drawing/2010/main" xmlns="">
+              <a14:hiddenFill xmlns="" xmlns:a14="http://schemas.microsoft.com/office/drawing/2010/main">
                 <a:solidFill>
                   <a:srgbClr val="FFFFFF"/>
                 </a:solidFill>
               </a14:hiddenFill>
             </a:ext>
             <a:ext uri="{91240B29-F687-4f45-9708-019B960494DF}">
-              <a14:hiddenLine xmlns:a14="http://schemas.microsoft.com/office/drawing/2010/main" xmlns="" w="9525" cap="flat">
+              <a14:hiddenLine xmlns="" xmlns:a14="http://schemas.microsoft.com/office/drawing/2010/main" w="9525" cap="flat">
                 <a:solidFill>
                   <a:srgbClr val="3465A4"/>
                 </a:solidFill>
@@ -17750,7 +17649,7 @@
               </a14:hiddenLine>
             </a:ext>
             <a:ext uri="{AF507438-7753-43e0-B8FC-AC1667EBCBE1}">
-              <a14:hiddenEffects xmlns:a14="http://schemas.microsoft.com/office/drawing/2010/main" xmlns="">
+              <a14:hiddenEffects xmlns="" xmlns:a14="http://schemas.microsoft.com/office/drawing/2010/main">
                 <a:effectLst>
                   <a:outerShdw blurRad="63500" dist="38099" dir="2700000" algn="ctr" rotWithShape="0">
                     <a:srgbClr val="000000">
@@ -18162,14 +18061,14 @@
           <a:effectLst/>
           <a:extLst>
             <a:ext uri="{909E8E84-426E-40dd-AFC4-6F175D3DCCD1}">
-              <a14:hiddenFill xmlns:a14="http://schemas.microsoft.com/office/drawing/2010/main" xmlns="">
+              <a14:hiddenFill xmlns="" xmlns:a14="http://schemas.microsoft.com/office/drawing/2010/main">
                 <a:solidFill>
                   <a:srgbClr val="FFFFFF"/>
                 </a:solidFill>
               </a14:hiddenFill>
             </a:ext>
             <a:ext uri="{91240B29-F687-4f45-9708-019B960494DF}">
-              <a14:hiddenLine xmlns:a14="http://schemas.microsoft.com/office/drawing/2010/main" xmlns="" w="9525" cap="flat">
+              <a14:hiddenLine xmlns="" xmlns:a14="http://schemas.microsoft.com/office/drawing/2010/main" w="9525" cap="flat">
                 <a:solidFill>
                   <a:srgbClr val="3465A4"/>
                 </a:solidFill>
@@ -18179,7 +18078,7 @@
               </a14:hiddenLine>
             </a:ext>
             <a:ext uri="{AF507438-7753-43e0-B8FC-AC1667EBCBE1}">
-              <a14:hiddenEffects xmlns:a14="http://schemas.microsoft.com/office/drawing/2010/main" xmlns="">
+              <a14:hiddenEffects xmlns="" xmlns:a14="http://schemas.microsoft.com/office/drawing/2010/main">
                 <a:effectLst>
                   <a:outerShdw blurRad="63500" dist="38099" dir="2700000" algn="ctr" rotWithShape="0">
                     <a:srgbClr val="000000">
@@ -18883,14 +18782,14 @@
           <a:effectLst/>
           <a:extLst>
             <a:ext uri="{909E8E84-426E-40dd-AFC4-6F175D3DCCD1}">
-              <a14:hiddenFill xmlns:a14="http://schemas.microsoft.com/office/drawing/2010/main" xmlns="">
+              <a14:hiddenFill xmlns="" xmlns:a14="http://schemas.microsoft.com/office/drawing/2010/main">
                 <a:solidFill>
                   <a:srgbClr val="FFFFFF"/>
                 </a:solidFill>
               </a14:hiddenFill>
             </a:ext>
             <a:ext uri="{91240B29-F687-4f45-9708-019B960494DF}">
-              <a14:hiddenLine xmlns:a14="http://schemas.microsoft.com/office/drawing/2010/main" xmlns="" w="9525" cap="flat">
+              <a14:hiddenLine xmlns="" xmlns:a14="http://schemas.microsoft.com/office/drawing/2010/main" w="9525" cap="flat">
                 <a:solidFill>
                   <a:srgbClr val="3465A4"/>
                 </a:solidFill>
@@ -18900,7 +18799,7 @@
               </a14:hiddenLine>
             </a:ext>
             <a:ext uri="{AF507438-7753-43e0-B8FC-AC1667EBCBE1}">
-              <a14:hiddenEffects xmlns:a14="http://schemas.microsoft.com/office/drawing/2010/main" xmlns="">
+              <a14:hiddenEffects xmlns="" xmlns:a14="http://schemas.microsoft.com/office/drawing/2010/main">
                 <a:effectLst>
                   <a:outerShdw blurRad="63500" dist="38099" dir="2700000" algn="ctr" rotWithShape="0">
                     <a:srgbClr val="000000">
@@ -19312,14 +19211,14 @@
           <a:effectLst/>
           <a:extLst>
             <a:ext uri="{909E8E84-426E-40dd-AFC4-6F175D3DCCD1}">
-              <a14:hiddenFill xmlns:a14="http://schemas.microsoft.com/office/drawing/2010/main" xmlns="">
+              <a14:hiddenFill xmlns="" xmlns:a14="http://schemas.microsoft.com/office/drawing/2010/main">
                 <a:solidFill>
                   <a:srgbClr val="FFFFFF"/>
                 </a:solidFill>
               </a14:hiddenFill>
             </a:ext>
             <a:ext uri="{91240B29-F687-4f45-9708-019B960494DF}">
-              <a14:hiddenLine xmlns:a14="http://schemas.microsoft.com/office/drawing/2010/main" xmlns="" w="9525" cap="flat">
+              <a14:hiddenLine xmlns="" xmlns:a14="http://schemas.microsoft.com/office/drawing/2010/main" w="9525" cap="flat">
                 <a:solidFill>
                   <a:srgbClr val="3465A4"/>
                 </a:solidFill>
@@ -19329,7 +19228,7 @@
               </a14:hiddenLine>
             </a:ext>
             <a:ext uri="{AF507438-7753-43e0-B8FC-AC1667EBCBE1}">
-              <a14:hiddenEffects xmlns:a14="http://schemas.microsoft.com/office/drawing/2010/main" xmlns="">
+              <a14:hiddenEffects xmlns="" xmlns:a14="http://schemas.microsoft.com/office/drawing/2010/main">
                 <a:effectLst>
                   <a:outerShdw blurRad="63500" dist="38099" dir="2700000" algn="ctr" rotWithShape="0">
                     <a:srgbClr val="000000">
@@ -20405,14 +20304,14 @@
           <a:effectLst/>
           <a:extLst>
             <a:ext uri="{909E8E84-426E-40dd-AFC4-6F175D3DCCD1}">
-              <a14:hiddenFill xmlns:a14="http://schemas.microsoft.com/office/drawing/2010/main" xmlns="">
+              <a14:hiddenFill xmlns="" xmlns:a14="http://schemas.microsoft.com/office/drawing/2010/main">
                 <a:solidFill>
                   <a:srgbClr val="FFFFFF"/>
                 </a:solidFill>
               </a14:hiddenFill>
             </a:ext>
             <a:ext uri="{91240B29-F687-4f45-9708-019B960494DF}">
-              <a14:hiddenLine xmlns:a14="http://schemas.microsoft.com/office/drawing/2010/main" xmlns="" w="9525" cap="flat">
+              <a14:hiddenLine xmlns="" xmlns:a14="http://schemas.microsoft.com/office/drawing/2010/main" w="9525" cap="flat">
                 <a:solidFill>
                   <a:srgbClr val="3465A4"/>
                 </a:solidFill>
@@ -20422,7 +20321,7 @@
               </a14:hiddenLine>
             </a:ext>
             <a:ext uri="{AF507438-7753-43e0-B8FC-AC1667EBCBE1}">
-              <a14:hiddenEffects xmlns:a14="http://schemas.microsoft.com/office/drawing/2010/main" xmlns="">
+              <a14:hiddenEffects xmlns="" xmlns:a14="http://schemas.microsoft.com/office/drawing/2010/main">
                 <a:effectLst>
                   <a:outerShdw blurRad="63500" dist="38099" dir="2700000" algn="ctr" rotWithShape="0">
                     <a:srgbClr val="000000">
@@ -20834,14 +20733,14 @@
           <a:effectLst/>
           <a:extLst>
             <a:ext uri="{909E8E84-426E-40dd-AFC4-6F175D3DCCD1}">
-              <a14:hiddenFill xmlns:a14="http://schemas.microsoft.com/office/drawing/2010/main" xmlns="">
+              <a14:hiddenFill xmlns="" xmlns:a14="http://schemas.microsoft.com/office/drawing/2010/main">
                 <a:solidFill>
                   <a:srgbClr val="FFFFFF"/>
                 </a:solidFill>
               </a14:hiddenFill>
             </a:ext>
             <a:ext uri="{91240B29-F687-4f45-9708-019B960494DF}">
-              <a14:hiddenLine xmlns:a14="http://schemas.microsoft.com/office/drawing/2010/main" xmlns="" w="9525" cap="flat">
+              <a14:hiddenLine xmlns="" xmlns:a14="http://schemas.microsoft.com/office/drawing/2010/main" w="9525" cap="flat">
                 <a:solidFill>
                   <a:srgbClr val="3465A4"/>
                 </a:solidFill>
@@ -20851,7 +20750,7 @@
               </a14:hiddenLine>
             </a:ext>
             <a:ext uri="{AF507438-7753-43e0-B8FC-AC1667EBCBE1}">
-              <a14:hiddenEffects xmlns:a14="http://schemas.microsoft.com/office/drawing/2010/main" xmlns="">
+              <a14:hiddenEffects xmlns="" xmlns:a14="http://schemas.microsoft.com/office/drawing/2010/main">
                 <a:effectLst>
                   <a:outerShdw blurRad="63500" dist="38099" dir="2700000" algn="ctr" rotWithShape="0">
                     <a:srgbClr val="000000">
@@ -21710,14 +21609,14 @@
           <a:effectLst/>
           <a:extLst>
             <a:ext uri="{909E8E84-426E-40dd-AFC4-6F175D3DCCD1}">
-              <a14:hiddenFill xmlns:a14="http://schemas.microsoft.com/office/drawing/2010/main" xmlns="">
+              <a14:hiddenFill xmlns="" xmlns:a14="http://schemas.microsoft.com/office/drawing/2010/main">
                 <a:solidFill>
                   <a:srgbClr val="FFFFFF"/>
                 </a:solidFill>
               </a14:hiddenFill>
             </a:ext>
             <a:ext uri="{91240B29-F687-4f45-9708-019B960494DF}">
-              <a14:hiddenLine xmlns:a14="http://schemas.microsoft.com/office/drawing/2010/main" xmlns="" w="9525" cap="flat">
+              <a14:hiddenLine xmlns="" xmlns:a14="http://schemas.microsoft.com/office/drawing/2010/main" w="9525" cap="flat">
                 <a:solidFill>
                   <a:srgbClr val="3465A4"/>
                 </a:solidFill>
@@ -21727,7 +21626,7 @@
               </a14:hiddenLine>
             </a:ext>
             <a:ext uri="{AF507438-7753-43e0-B8FC-AC1667EBCBE1}">
-              <a14:hiddenEffects xmlns:a14="http://schemas.microsoft.com/office/drawing/2010/main" xmlns="">
+              <a14:hiddenEffects xmlns="" xmlns:a14="http://schemas.microsoft.com/office/drawing/2010/main">
                 <a:effectLst>
                   <a:outerShdw blurRad="63500" dist="38099" dir="2700000" algn="ctr" rotWithShape="0">
                     <a:srgbClr val="000000">
@@ -22139,14 +22038,14 @@
           <a:effectLst/>
           <a:extLst>
             <a:ext uri="{909E8E84-426E-40dd-AFC4-6F175D3DCCD1}">
-              <a14:hiddenFill xmlns:a14="http://schemas.microsoft.com/office/drawing/2010/main" xmlns="">
+              <a14:hiddenFill xmlns="" xmlns:a14="http://schemas.microsoft.com/office/drawing/2010/main">
                 <a:solidFill>
                   <a:srgbClr val="FFFFFF"/>
                 </a:solidFill>
               </a14:hiddenFill>
             </a:ext>
             <a:ext uri="{91240B29-F687-4f45-9708-019B960494DF}">
-              <a14:hiddenLine xmlns:a14="http://schemas.microsoft.com/office/drawing/2010/main" xmlns="" w="9525" cap="flat">
+              <a14:hiddenLine xmlns="" xmlns:a14="http://schemas.microsoft.com/office/drawing/2010/main" w="9525" cap="flat">
                 <a:solidFill>
                   <a:srgbClr val="3465A4"/>
                 </a:solidFill>
@@ -22156,7 +22055,7 @@
               </a14:hiddenLine>
             </a:ext>
             <a:ext uri="{AF507438-7753-43e0-B8FC-AC1667EBCBE1}">
-              <a14:hiddenEffects xmlns:a14="http://schemas.microsoft.com/office/drawing/2010/main" xmlns="">
+              <a14:hiddenEffects xmlns="" xmlns:a14="http://schemas.microsoft.com/office/drawing/2010/main">
                 <a:effectLst>
                   <a:outerShdw blurRad="63500" dist="38099" dir="2700000" algn="ctr" rotWithShape="0">
                     <a:srgbClr val="000000">
@@ -23146,14 +23045,14 @@
           <a:effectLst/>
           <a:extLst>
             <a:ext uri="{909E8E84-426E-40dd-AFC4-6F175D3DCCD1}">
-              <a14:hiddenFill xmlns:a14="http://schemas.microsoft.com/office/drawing/2010/main" xmlns="">
+              <a14:hiddenFill xmlns="" xmlns:a14="http://schemas.microsoft.com/office/drawing/2010/main">
                 <a:solidFill>
                   <a:srgbClr val="FFFFFF"/>
                 </a:solidFill>
               </a14:hiddenFill>
             </a:ext>
             <a:ext uri="{91240B29-F687-4f45-9708-019B960494DF}">
-              <a14:hiddenLine xmlns:a14="http://schemas.microsoft.com/office/drawing/2010/main" xmlns="" w="9525" cap="flat">
+              <a14:hiddenLine xmlns="" xmlns:a14="http://schemas.microsoft.com/office/drawing/2010/main" w="9525" cap="flat">
                 <a:solidFill>
                   <a:srgbClr val="3465A4"/>
                 </a:solidFill>
@@ -23163,7 +23062,7 @@
               </a14:hiddenLine>
             </a:ext>
             <a:ext uri="{AF507438-7753-43e0-B8FC-AC1667EBCBE1}">
-              <a14:hiddenEffects xmlns:a14="http://schemas.microsoft.com/office/drawing/2010/main" xmlns="">
+              <a14:hiddenEffects xmlns="" xmlns:a14="http://schemas.microsoft.com/office/drawing/2010/main">
                 <a:effectLst>
                   <a:outerShdw blurRad="63500" dist="38099" dir="2700000" algn="ctr" rotWithShape="0">
                     <a:srgbClr val="000000">
@@ -23575,14 +23474,14 @@
           <a:effectLst/>
           <a:extLst>
             <a:ext uri="{909E8E84-426E-40dd-AFC4-6F175D3DCCD1}">
-              <a14:hiddenFill xmlns:a14="http://schemas.microsoft.com/office/drawing/2010/main" xmlns="">
+              <a14:hiddenFill xmlns="" xmlns:a14="http://schemas.microsoft.com/office/drawing/2010/main">
                 <a:solidFill>
                   <a:srgbClr val="FFFFFF"/>
                 </a:solidFill>
               </a14:hiddenFill>
             </a:ext>
             <a:ext uri="{91240B29-F687-4f45-9708-019B960494DF}">
-              <a14:hiddenLine xmlns:a14="http://schemas.microsoft.com/office/drawing/2010/main" xmlns="" w="9525" cap="flat">
+              <a14:hiddenLine xmlns="" xmlns:a14="http://schemas.microsoft.com/office/drawing/2010/main" w="9525" cap="flat">
                 <a:solidFill>
                   <a:srgbClr val="3465A4"/>
                 </a:solidFill>
@@ -23592,7 +23491,7 @@
               </a14:hiddenLine>
             </a:ext>
             <a:ext uri="{AF507438-7753-43e0-B8FC-AC1667EBCBE1}">
-              <a14:hiddenEffects xmlns:a14="http://schemas.microsoft.com/office/drawing/2010/main" xmlns="">
+              <a14:hiddenEffects xmlns="" xmlns:a14="http://schemas.microsoft.com/office/drawing/2010/main">
                 <a:effectLst>
                   <a:outerShdw blurRad="63500" dist="38099" dir="2700000" algn="ctr" rotWithShape="0">
                     <a:srgbClr val="000000">
@@ -24582,14 +24481,14 @@
           <a:effectLst/>
           <a:extLst>
             <a:ext uri="{909E8E84-426E-40dd-AFC4-6F175D3DCCD1}">
-              <a14:hiddenFill xmlns:a14="http://schemas.microsoft.com/office/drawing/2010/main" xmlns="">
+              <a14:hiddenFill xmlns="" xmlns:a14="http://schemas.microsoft.com/office/drawing/2010/main">
                 <a:solidFill>
                   <a:srgbClr val="FFFFFF"/>
                 </a:solidFill>
               </a14:hiddenFill>
             </a:ext>
             <a:ext uri="{91240B29-F687-4f45-9708-019B960494DF}">
-              <a14:hiddenLine xmlns:a14="http://schemas.microsoft.com/office/drawing/2010/main" xmlns="" w="9525" cap="flat">
+              <a14:hiddenLine xmlns="" xmlns:a14="http://schemas.microsoft.com/office/drawing/2010/main" w="9525" cap="flat">
                 <a:solidFill>
                   <a:srgbClr val="3465A4"/>
                 </a:solidFill>
@@ -24599,7 +24498,7 @@
               </a14:hiddenLine>
             </a:ext>
             <a:ext uri="{AF507438-7753-43e0-B8FC-AC1667EBCBE1}">
-              <a14:hiddenEffects xmlns:a14="http://schemas.microsoft.com/office/drawing/2010/main" xmlns="">
+              <a14:hiddenEffects xmlns="" xmlns:a14="http://schemas.microsoft.com/office/drawing/2010/main">
                 <a:effectLst>
                   <a:outerShdw blurRad="63500" dist="38099" dir="2700000" algn="ctr" rotWithShape="0">
                     <a:srgbClr val="000000">
@@ -25011,14 +24910,14 @@
           <a:effectLst/>
           <a:extLst>
             <a:ext uri="{909E8E84-426E-40dd-AFC4-6F175D3DCCD1}">
-              <a14:hiddenFill xmlns:a14="http://schemas.microsoft.com/office/drawing/2010/main" xmlns="">
+              <a14:hiddenFill xmlns="" xmlns:a14="http://schemas.microsoft.com/office/drawing/2010/main">
                 <a:solidFill>
                   <a:srgbClr val="FFFFFF"/>
                 </a:solidFill>
               </a14:hiddenFill>
             </a:ext>
             <a:ext uri="{91240B29-F687-4f45-9708-019B960494DF}">
-              <a14:hiddenLine xmlns:a14="http://schemas.microsoft.com/office/drawing/2010/main" xmlns="" w="9525" cap="flat">
+              <a14:hiddenLine xmlns="" xmlns:a14="http://schemas.microsoft.com/office/drawing/2010/main" w="9525" cap="flat">
                 <a:solidFill>
                   <a:srgbClr val="3465A4"/>
                 </a:solidFill>
@@ -25028,7 +24927,7 @@
               </a14:hiddenLine>
             </a:ext>
             <a:ext uri="{AF507438-7753-43e0-B8FC-AC1667EBCBE1}">
-              <a14:hiddenEffects xmlns:a14="http://schemas.microsoft.com/office/drawing/2010/main" xmlns="">
+              <a14:hiddenEffects xmlns="" xmlns:a14="http://schemas.microsoft.com/office/drawing/2010/main">
                 <a:effectLst>
                   <a:outerShdw blurRad="63500" dist="38099" dir="2700000" algn="ctr" rotWithShape="0">
                     <a:srgbClr val="000000">
@@ -25733,14 +25632,14 @@
           <a:effectLst/>
           <a:extLst>
             <a:ext uri="{909E8E84-426E-40dd-AFC4-6F175D3DCCD1}">
-              <a14:hiddenFill xmlns:a14="http://schemas.microsoft.com/office/drawing/2010/main" xmlns="">
+              <a14:hiddenFill xmlns="" xmlns:a14="http://schemas.microsoft.com/office/drawing/2010/main">
                 <a:solidFill>
                   <a:srgbClr val="FFFFFF"/>
                 </a:solidFill>
               </a14:hiddenFill>
             </a:ext>
             <a:ext uri="{91240B29-F687-4f45-9708-019B960494DF}">
-              <a14:hiddenLine xmlns:a14="http://schemas.microsoft.com/office/drawing/2010/main" xmlns="" w="9525" cap="flat">
+              <a14:hiddenLine xmlns="" xmlns:a14="http://schemas.microsoft.com/office/drawing/2010/main" w="9525" cap="flat">
                 <a:solidFill>
                   <a:srgbClr val="3465A4"/>
                 </a:solidFill>
@@ -25750,7 +25649,7 @@
               </a14:hiddenLine>
             </a:ext>
             <a:ext uri="{AF507438-7753-43e0-B8FC-AC1667EBCBE1}">
-              <a14:hiddenEffects xmlns:a14="http://schemas.microsoft.com/office/drawing/2010/main" xmlns="">
+              <a14:hiddenEffects xmlns="" xmlns:a14="http://schemas.microsoft.com/office/drawing/2010/main">
                 <a:effectLst>
                   <a:outerShdw blurRad="63500" dist="38099" dir="2700000" algn="ctr" rotWithShape="0">
                     <a:srgbClr val="000000">
@@ -26162,14 +26061,14 @@
           <a:effectLst/>
           <a:extLst>
             <a:ext uri="{909E8E84-426E-40dd-AFC4-6F175D3DCCD1}">
-              <a14:hiddenFill xmlns:a14="http://schemas.microsoft.com/office/drawing/2010/main" xmlns="">
+              <a14:hiddenFill xmlns="" xmlns:a14="http://schemas.microsoft.com/office/drawing/2010/main">
                 <a:solidFill>
                   <a:srgbClr val="FFFFFF"/>
                 </a:solidFill>
               </a14:hiddenFill>
             </a:ext>
             <a:ext uri="{91240B29-F687-4f45-9708-019B960494DF}">
-              <a14:hiddenLine xmlns:a14="http://schemas.microsoft.com/office/drawing/2010/main" xmlns="" w="9525" cap="flat">
+              <a14:hiddenLine xmlns="" xmlns:a14="http://schemas.microsoft.com/office/drawing/2010/main" w="9525" cap="flat">
                 <a:solidFill>
                   <a:srgbClr val="3465A4"/>
                 </a:solidFill>
@@ -26179,7 +26078,7 @@
               </a14:hiddenLine>
             </a:ext>
             <a:ext uri="{AF507438-7753-43e0-B8FC-AC1667EBCBE1}">
-              <a14:hiddenEffects xmlns:a14="http://schemas.microsoft.com/office/drawing/2010/main" xmlns="">
+              <a14:hiddenEffects xmlns="" xmlns:a14="http://schemas.microsoft.com/office/drawing/2010/main">
                 <a:effectLst>
                   <a:outerShdw blurRad="63500" dist="38099" dir="2700000" algn="ctr" rotWithShape="0">
                     <a:srgbClr val="000000">
@@ -27250,14 +27149,14 @@
           <a:effectLst/>
           <a:extLst>
             <a:ext uri="{909E8E84-426E-40dd-AFC4-6F175D3DCCD1}">
-              <a14:hiddenFill xmlns:a14="http://schemas.microsoft.com/office/drawing/2010/main" xmlns="">
+              <a14:hiddenFill xmlns="" xmlns:a14="http://schemas.microsoft.com/office/drawing/2010/main">
                 <a:solidFill>
                   <a:srgbClr val="FFFFFF"/>
                 </a:solidFill>
               </a14:hiddenFill>
             </a:ext>
             <a:ext uri="{91240B29-F687-4f45-9708-019B960494DF}">
-              <a14:hiddenLine xmlns:a14="http://schemas.microsoft.com/office/drawing/2010/main" xmlns="" w="9525" cap="flat">
+              <a14:hiddenLine xmlns="" xmlns:a14="http://schemas.microsoft.com/office/drawing/2010/main" w="9525" cap="flat">
                 <a:solidFill>
                   <a:srgbClr val="3465A4"/>
                 </a:solidFill>
@@ -27267,7 +27166,7 @@
               </a14:hiddenLine>
             </a:ext>
             <a:ext uri="{AF507438-7753-43e0-B8FC-AC1667EBCBE1}">
-              <a14:hiddenEffects xmlns:a14="http://schemas.microsoft.com/office/drawing/2010/main" xmlns="">
+              <a14:hiddenEffects xmlns="" xmlns:a14="http://schemas.microsoft.com/office/drawing/2010/main">
                 <a:effectLst>
                   <a:outerShdw blurRad="63500" dist="38099" dir="2700000" algn="ctr" rotWithShape="0">
                     <a:srgbClr val="000000">
@@ -27679,14 +27578,14 @@
           <a:effectLst/>
           <a:extLst>
             <a:ext uri="{909E8E84-426E-40dd-AFC4-6F175D3DCCD1}">
-              <a14:hiddenFill xmlns:a14="http://schemas.microsoft.com/office/drawing/2010/main" xmlns="">
+              <a14:hiddenFill xmlns="" xmlns:a14="http://schemas.microsoft.com/office/drawing/2010/main">
                 <a:solidFill>
                   <a:srgbClr val="FFFFFF"/>
                 </a:solidFill>
               </a14:hiddenFill>
             </a:ext>
             <a:ext uri="{91240B29-F687-4f45-9708-019B960494DF}">
-              <a14:hiddenLine xmlns:a14="http://schemas.microsoft.com/office/drawing/2010/main" xmlns="" w="9525" cap="flat">
+              <a14:hiddenLine xmlns="" xmlns:a14="http://schemas.microsoft.com/office/drawing/2010/main" w="9525" cap="flat">
                 <a:solidFill>
                   <a:srgbClr val="3465A4"/>
                 </a:solidFill>
@@ -27696,7 +27595,7 @@
               </a14:hiddenLine>
             </a:ext>
             <a:ext uri="{AF507438-7753-43e0-B8FC-AC1667EBCBE1}">
-              <a14:hiddenEffects xmlns:a14="http://schemas.microsoft.com/office/drawing/2010/main" xmlns="">
+              <a14:hiddenEffects xmlns="" xmlns:a14="http://schemas.microsoft.com/office/drawing/2010/main">
                 <a:effectLst>
                   <a:outerShdw blurRad="63500" dist="38099" dir="2700000" algn="ctr" rotWithShape="0">
                     <a:srgbClr val="000000">
@@ -28563,14 +28462,14 @@
           <a:effectLst/>
           <a:extLst>
             <a:ext uri="{909E8E84-426E-40dd-AFC4-6F175D3DCCD1}">
-              <a14:hiddenFill xmlns:a14="http://schemas.microsoft.com/office/drawing/2010/main" xmlns="">
+              <a14:hiddenFill xmlns="" xmlns:a14="http://schemas.microsoft.com/office/drawing/2010/main">
                 <a:solidFill>
                   <a:srgbClr val="FFFFFF"/>
                 </a:solidFill>
               </a14:hiddenFill>
             </a:ext>
             <a:ext uri="{91240B29-F687-4f45-9708-019B960494DF}">
-              <a14:hiddenLine xmlns:a14="http://schemas.microsoft.com/office/drawing/2010/main" xmlns="" w="9525" cap="flat">
+              <a14:hiddenLine xmlns="" xmlns:a14="http://schemas.microsoft.com/office/drawing/2010/main" w="9525" cap="flat">
                 <a:solidFill>
                   <a:srgbClr val="3465A4"/>
                 </a:solidFill>
@@ -28580,7 +28479,7 @@
               </a14:hiddenLine>
             </a:ext>
             <a:ext uri="{AF507438-7753-43e0-B8FC-AC1667EBCBE1}">
-              <a14:hiddenEffects xmlns:a14="http://schemas.microsoft.com/office/drawing/2010/main" xmlns="">
+              <a14:hiddenEffects xmlns="" xmlns:a14="http://schemas.microsoft.com/office/drawing/2010/main">
                 <a:effectLst>
                   <a:outerShdw blurRad="63500" dist="38099" dir="2700000" algn="ctr" rotWithShape="0">
                     <a:srgbClr val="000000">
@@ -28992,14 +28891,14 @@
           <a:effectLst/>
           <a:extLst>
             <a:ext uri="{909E8E84-426E-40dd-AFC4-6F175D3DCCD1}">
-              <a14:hiddenFill xmlns:a14="http://schemas.microsoft.com/office/drawing/2010/main" xmlns="">
+              <a14:hiddenFill xmlns="" xmlns:a14="http://schemas.microsoft.com/office/drawing/2010/main">
                 <a:solidFill>
                   <a:srgbClr val="FFFFFF"/>
                 </a:solidFill>
               </a14:hiddenFill>
             </a:ext>
             <a:ext uri="{91240B29-F687-4f45-9708-019B960494DF}">
-              <a14:hiddenLine xmlns:a14="http://schemas.microsoft.com/office/drawing/2010/main" xmlns="" w="9525" cap="flat">
+              <a14:hiddenLine xmlns="" xmlns:a14="http://schemas.microsoft.com/office/drawing/2010/main" w="9525" cap="flat">
                 <a:solidFill>
                   <a:srgbClr val="3465A4"/>
                 </a:solidFill>
@@ -29009,7 +28908,7 @@
               </a14:hiddenLine>
             </a:ext>
             <a:ext uri="{AF507438-7753-43e0-B8FC-AC1667EBCBE1}">
-              <a14:hiddenEffects xmlns:a14="http://schemas.microsoft.com/office/drawing/2010/main" xmlns="">
+              <a14:hiddenEffects xmlns="" xmlns:a14="http://schemas.microsoft.com/office/drawing/2010/main">
                 <a:effectLst>
                   <a:outerShdw blurRad="63500" dist="38099" dir="2700000" algn="ctr" rotWithShape="0">
                     <a:srgbClr val="000000">
@@ -29495,6 +29394,1261 @@
 </file>
 
 <file path=ppt/slides/slide20.xml><?xml version="1.0" encoding="utf-8"?>
+<p:sld xmlns:a="http://schemas.openxmlformats.org/drawingml/2006/main" xmlns:r="http://schemas.openxmlformats.org/officeDocument/2006/relationships" xmlns:p="http://schemas.openxmlformats.org/presentationml/2006/main">
+  <p:cSld>
+    <p:spTree>
+      <p:nvGrpSpPr>
+        <p:cNvPr id="1" name=""/>
+        <p:cNvGrpSpPr/>
+        <p:nvPr/>
+      </p:nvGrpSpPr>
+      <p:grpSpPr>
+        <a:xfrm>
+          <a:off x="0" y="0"/>
+          <a:ext cx="0" cy="0"/>
+          <a:chOff x="0" y="0"/>
+          <a:chExt cx="0" cy="0"/>
+        </a:xfrm>
+      </p:grpSpPr>
+      <p:sp>
+        <p:nvSpPr>
+          <p:cNvPr id="4" name="Title 3">
+            <a:extLst>
+              <a:ext uri="{FF2B5EF4-FFF2-40B4-BE49-F238E27FC236}">
+                <a16:creationId xmlns:a16="http://schemas.microsoft.com/office/drawing/2014/main" id="{FCF35A12-02BD-6349-8D6B-4A5C24E2F4DE}"/>
+              </a:ext>
+            </a:extLst>
+          </p:cNvPr>
+          <p:cNvSpPr>
+            <a:spLocks noGrp="1"/>
+          </p:cNvSpPr>
+          <p:nvPr>
+            <p:ph type="title"/>
+          </p:nvPr>
+        </p:nvSpPr>
+        <p:spPr/>
+        <p:txBody>
+          <a:bodyPr/>
+          <a:lstStyle/>
+          <a:p>
+            <a:r>
+              <a:rPr lang="en-US" dirty="0"/>
+              <a:t>NTP Client configuration</a:t>
+            </a:r>
+          </a:p>
+        </p:txBody>
+      </p:sp>
+      <p:sp>
+        <p:nvSpPr>
+          <p:cNvPr id="5" name="Text Placeholder 4">
+            <a:extLst>
+              <a:ext uri="{FF2B5EF4-FFF2-40B4-BE49-F238E27FC236}">
+                <a16:creationId xmlns:a16="http://schemas.microsoft.com/office/drawing/2014/main" id="{C89F17BA-A7AF-CB46-BB44-E3AEACC34F74}"/>
+              </a:ext>
+            </a:extLst>
+          </p:cNvPr>
+          <p:cNvSpPr>
+            <a:spLocks noGrp="1"/>
+          </p:cNvSpPr>
+          <p:nvPr>
+            <p:ph type="body" idx="1"/>
+          </p:nvPr>
+        </p:nvSpPr>
+        <p:spPr/>
+        <p:txBody>
+          <a:bodyPr/>
+          <a:lstStyle/>
+          <a:p>
+            <a:endParaRPr lang="en-US" dirty="0"/>
+          </a:p>
+        </p:txBody>
+      </p:sp>
+    </p:spTree>
+    <p:extLst>
+      <p:ext uri="{BB962C8B-B14F-4D97-AF65-F5344CB8AC3E}">
+        <p14:creationId xmlns:p14="http://schemas.microsoft.com/office/powerpoint/2010/main" val="274767775"/>
+      </p:ext>
+    </p:extLst>
+  </p:cSld>
+  <p:clrMapOvr>
+    <a:masterClrMapping/>
+  </p:clrMapOvr>
+</p:sld>
+</file>
+
+<file path=ppt/slides/slide21.xml><?xml version="1.0" encoding="utf-8"?>
+<p:sld xmlns:a="http://schemas.openxmlformats.org/drawingml/2006/main" xmlns:r="http://schemas.openxmlformats.org/officeDocument/2006/relationships" xmlns:p="http://schemas.openxmlformats.org/presentationml/2006/main">
+  <p:cSld>
+    <p:spTree>
+      <p:nvGrpSpPr>
+        <p:cNvPr id="1" name=""/>
+        <p:cNvGrpSpPr/>
+        <p:nvPr/>
+      </p:nvGrpSpPr>
+      <p:grpSpPr>
+        <a:xfrm>
+          <a:off x="0" y="0"/>
+          <a:ext cx="0" cy="0"/>
+          <a:chOff x="0" y="0"/>
+          <a:chExt cx="0" cy="0"/>
+        </a:xfrm>
+      </p:grpSpPr>
+      <p:sp>
+        <p:nvSpPr>
+          <p:cNvPr id="2" name="Title 1">
+            <a:extLst>
+              <a:ext uri="{FF2B5EF4-FFF2-40B4-BE49-F238E27FC236}">
+                <a16:creationId xmlns:a16="http://schemas.microsoft.com/office/drawing/2014/main" id="{4A91EE99-F3D1-B048-99C1-0941B3217986}"/>
+              </a:ext>
+            </a:extLst>
+          </p:cNvPr>
+          <p:cNvSpPr>
+            <a:spLocks noGrp="1"/>
+          </p:cNvSpPr>
+          <p:nvPr>
+            <p:ph type="title"/>
+          </p:nvPr>
+        </p:nvSpPr>
+        <p:spPr/>
+        <p:txBody>
+          <a:bodyPr/>
+          <a:lstStyle/>
+          <a:p>
+            <a:r>
+              <a:rPr lang="en-US" dirty="0" err="1"/>
+              <a:t>Ntpdate</a:t>
+            </a:r>
+            <a:r>
+              <a:rPr lang="en-US" dirty="0"/>
+              <a:t> </a:t>
+            </a:r>
+          </a:p>
+        </p:txBody>
+      </p:sp>
+      <p:sp>
+        <p:nvSpPr>
+          <p:cNvPr id="3" name="Content Placeholder 2">
+            <a:extLst>
+              <a:ext uri="{FF2B5EF4-FFF2-40B4-BE49-F238E27FC236}">
+                <a16:creationId xmlns:a16="http://schemas.microsoft.com/office/drawing/2014/main" id="{FB8A5CC4-82BE-6542-9134-D8EEE20FA385}"/>
+              </a:ext>
+            </a:extLst>
+          </p:cNvPr>
+          <p:cNvSpPr>
+            <a:spLocks noGrp="1"/>
+          </p:cNvSpPr>
+          <p:nvPr>
+            <p:ph idx="1"/>
+          </p:nvPr>
+        </p:nvSpPr>
+        <p:spPr/>
+        <p:txBody>
+          <a:bodyPr/>
+          <a:lstStyle/>
+          <a:p>
+            <a:pPr marL="457200" indent="-457200">
+              <a:buFont typeface="Arial" panose="020B0604020202020204" pitchFamily="34" charset="0"/>
+              <a:buChar char="•"/>
+            </a:pPr>
+            <a:r>
+              <a:rPr lang="en-US" dirty="0"/>
+              <a:t>On many </a:t>
+            </a:r>
+            <a:r>
+              <a:rPr lang="en-US" dirty="0" err="1"/>
+              <a:t>linux</a:t>
+            </a:r>
+            <a:r>
+              <a:rPr lang="en-US" dirty="0"/>
+              <a:t>/</a:t>
+            </a:r>
+            <a:r>
+              <a:rPr lang="en-US" dirty="0" err="1"/>
+              <a:t>unix</a:t>
+            </a:r>
+            <a:r>
+              <a:rPr lang="en-US" dirty="0"/>
+              <a:t> systems </a:t>
+            </a:r>
+            <a:r>
+              <a:rPr lang="en-US" b="1" dirty="0" err="1"/>
+              <a:t>ntpdate</a:t>
+            </a:r>
+            <a:r>
+              <a:rPr lang="en-US" dirty="0"/>
+              <a:t> is the client that is used to sync time on the local host from strata servers</a:t>
+            </a:r>
+          </a:p>
+          <a:p>
+            <a:pPr marL="457200" indent="-457200">
+              <a:buFont typeface="Arial" panose="020B0604020202020204" pitchFamily="34" charset="0"/>
+              <a:buChar char="•"/>
+            </a:pPr>
+            <a:r>
+              <a:rPr lang="en-US" dirty="0" err="1"/>
+              <a:t>ntp</a:t>
+            </a:r>
+            <a:r>
+              <a:rPr lang="en-US" dirty="0"/>
+              <a:t> server daemon (</a:t>
+            </a:r>
+            <a:r>
+              <a:rPr lang="en-US" b="1" dirty="0" err="1"/>
+              <a:t>ntpd</a:t>
+            </a:r>
+            <a:r>
+              <a:rPr lang="en-US" dirty="0"/>
+              <a:t>) also an (</a:t>
+            </a:r>
+            <a:r>
+              <a:rPr lang="en-US" b="1" dirty="0"/>
+              <a:t>-q)</a:t>
+            </a:r>
+            <a:r>
+              <a:rPr lang="en-US" dirty="0"/>
+              <a:t> option that sync the time on the local host</a:t>
+            </a:r>
+          </a:p>
+          <a:p>
+            <a:pPr marL="457200" indent="-457200">
+              <a:buFont typeface="Arial" panose="020B0604020202020204" pitchFamily="34" charset="0"/>
+              <a:buChar char="•"/>
+            </a:pPr>
+            <a:r>
+              <a:rPr lang="en-US" dirty="0"/>
+              <a:t>The plan is to retire the </a:t>
+            </a:r>
+            <a:r>
+              <a:rPr lang="en-US" dirty="0" err="1"/>
+              <a:t>ntpdate</a:t>
+            </a:r>
+            <a:r>
+              <a:rPr lang="en-US" dirty="0"/>
+              <a:t> (after a sufficient mourning period) with a script using </a:t>
+            </a:r>
+            <a:r>
+              <a:rPr lang="en-US" b="1" dirty="0" err="1"/>
+              <a:t>ntpd</a:t>
+            </a:r>
+            <a:r>
+              <a:rPr lang="en-US" b="1" dirty="0"/>
+              <a:t> -q</a:t>
+            </a:r>
+            <a:r>
+              <a:rPr lang="en-US" dirty="0"/>
+              <a:t> option </a:t>
+            </a:r>
+          </a:p>
+        </p:txBody>
+      </p:sp>
+    </p:spTree>
+    <p:extLst>
+      <p:ext uri="{BB962C8B-B14F-4D97-AF65-F5344CB8AC3E}">
+        <p14:creationId xmlns:p14="http://schemas.microsoft.com/office/powerpoint/2010/main" val="4009626233"/>
+      </p:ext>
+    </p:extLst>
+  </p:cSld>
+  <p:clrMapOvr>
+    <a:masterClrMapping/>
+  </p:clrMapOvr>
+</p:sld>
+</file>
+
+<file path=ppt/slides/slide22.xml><?xml version="1.0" encoding="utf-8"?>
+<p:sld xmlns:a="http://schemas.openxmlformats.org/drawingml/2006/main" xmlns:r="http://schemas.openxmlformats.org/officeDocument/2006/relationships" xmlns:p="http://schemas.openxmlformats.org/presentationml/2006/main">
+  <p:cSld>
+    <p:spTree>
+      <p:nvGrpSpPr>
+        <p:cNvPr id="1" name=""/>
+        <p:cNvGrpSpPr/>
+        <p:nvPr/>
+      </p:nvGrpSpPr>
+      <p:grpSpPr>
+        <a:xfrm>
+          <a:off x="0" y="0"/>
+          <a:ext cx="0" cy="0"/>
+          <a:chOff x="0" y="0"/>
+          <a:chExt cx="0" cy="0"/>
+        </a:xfrm>
+      </p:grpSpPr>
+      <p:sp>
+        <p:nvSpPr>
+          <p:cNvPr id="2" name="Title 1">
+            <a:extLst>
+              <a:ext uri="{FF2B5EF4-FFF2-40B4-BE49-F238E27FC236}">
+                <a16:creationId xmlns:a16="http://schemas.microsoft.com/office/drawing/2014/main" id="{8075144F-FD28-9641-AF0C-7EE2BFF43151}"/>
+              </a:ext>
+            </a:extLst>
+          </p:cNvPr>
+          <p:cNvSpPr>
+            <a:spLocks noGrp="1"/>
+          </p:cNvSpPr>
+          <p:nvPr>
+            <p:ph type="title"/>
+          </p:nvPr>
+        </p:nvSpPr>
+        <p:spPr/>
+        <p:txBody>
+          <a:bodyPr/>
+          <a:lstStyle/>
+          <a:p>
+            <a:r>
+              <a:rPr lang="en-US" dirty="0" err="1"/>
+              <a:t>Ntpdate</a:t>
+            </a:r>
+            <a:endParaRPr lang="en-US" dirty="0"/>
+          </a:p>
+        </p:txBody>
+      </p:sp>
+      <p:sp>
+        <p:nvSpPr>
+          <p:cNvPr id="3" name="Content Placeholder 2">
+            <a:extLst>
+              <a:ext uri="{FF2B5EF4-FFF2-40B4-BE49-F238E27FC236}">
+                <a16:creationId xmlns:a16="http://schemas.microsoft.com/office/drawing/2014/main" id="{E7CF5F52-55A1-8547-AD51-B47BDC51F33E}"/>
+              </a:ext>
+            </a:extLst>
+          </p:cNvPr>
+          <p:cNvSpPr>
+            <a:spLocks noGrp="1"/>
+          </p:cNvSpPr>
+          <p:nvPr>
+            <p:ph idx="1"/>
+          </p:nvPr>
+        </p:nvSpPr>
+        <p:spPr/>
+        <p:txBody>
+          <a:bodyPr/>
+          <a:lstStyle/>
+          <a:p>
+            <a:pPr marL="457200" indent="-457200">
+              <a:buFont typeface="Arial" panose="020B0604020202020204" pitchFamily="34" charset="0"/>
+              <a:buChar char="•"/>
+            </a:pPr>
+            <a:r>
+              <a:rPr lang="en-US" dirty="0">
+                <a:ea typeface="Arial" charset="0"/>
+                <a:cs typeface="Arial" charset="0"/>
+              </a:rPr>
+              <a:t>Install </a:t>
+            </a:r>
+            <a:r>
+              <a:rPr lang="en-US" dirty="0" err="1">
+                <a:ea typeface="Arial" charset="0"/>
+                <a:cs typeface="Arial" charset="0"/>
+              </a:rPr>
+              <a:t>ntpdate</a:t>
+            </a:r>
+            <a:r>
+              <a:rPr lang="en-US" dirty="0">
+                <a:ea typeface="Arial" charset="0"/>
+                <a:cs typeface="Arial" charset="0"/>
+              </a:rPr>
+              <a:t> </a:t>
+            </a:r>
+          </a:p>
+          <a:p>
+            <a:pPr marL="0" indent="0"/>
+            <a:endParaRPr lang="en-US" dirty="0">
+              <a:ea typeface="Arial" charset="0"/>
+              <a:cs typeface="Arial" charset="0"/>
+            </a:endParaRPr>
+          </a:p>
+          <a:p>
+            <a:pPr marL="457200" indent="-457200">
+              <a:buFont typeface="Arial" panose="020B0604020202020204" pitchFamily="34" charset="0"/>
+              <a:buChar char="•"/>
+            </a:pPr>
+            <a:r>
+              <a:rPr lang="en-US" dirty="0">
+                <a:ea typeface="Arial" charset="0"/>
+                <a:cs typeface="Arial" charset="0"/>
+              </a:rPr>
+              <a:t>Update your system clock</a:t>
+            </a:r>
+          </a:p>
+        </p:txBody>
+      </p:sp>
+      <p:sp>
+        <p:nvSpPr>
+          <p:cNvPr id="4" name="TextBox 3">
+            <a:extLst>
+              <a:ext uri="{FF2B5EF4-FFF2-40B4-BE49-F238E27FC236}">
+                <a16:creationId xmlns:a16="http://schemas.microsoft.com/office/drawing/2014/main" id="{488F4F87-D428-994D-B737-3BD3FCF683B7}"/>
+              </a:ext>
+            </a:extLst>
+          </p:cNvPr>
+          <p:cNvSpPr txBox="1"/>
+          <p:nvPr/>
+        </p:nvSpPr>
+        <p:spPr>
+          <a:xfrm>
+            <a:off x="476377" y="3826442"/>
+            <a:ext cx="8613776" cy="446917"/>
+          </a:xfrm>
+          <a:prstGeom prst="rect">
+            <a:avLst/>
+          </a:prstGeom>
+          <a:solidFill>
+            <a:schemeClr val="bg2"/>
+          </a:solidFill>
+        </p:spPr>
+        <p:txBody>
+          <a:bodyPr wrap="square" rtlCol="0">
+            <a:spAutoFit/>
+          </a:bodyPr>
+          <a:lstStyle/>
+          <a:p>
+            <a:r>
+              <a:rPr lang="en-US" dirty="0">
+                <a:solidFill>
+                  <a:schemeClr val="tx1"/>
+                </a:solidFill>
+                <a:latin typeface="Courier" charset="0"/>
+                <a:ea typeface="Courier" charset="0"/>
+                <a:cs typeface="Courier" charset="0"/>
+              </a:rPr>
+              <a:t>$ </a:t>
+            </a:r>
+            <a:r>
+              <a:rPr lang="en-US" dirty="0" err="1">
+                <a:solidFill>
+                  <a:schemeClr val="tx1"/>
+                </a:solidFill>
+                <a:latin typeface="Courier" charset="0"/>
+                <a:ea typeface="Courier" charset="0"/>
+                <a:cs typeface="Courier" charset="0"/>
+              </a:rPr>
+              <a:t>sudo</a:t>
+            </a:r>
+            <a:r>
+              <a:rPr lang="en-US" dirty="0">
+                <a:solidFill>
+                  <a:schemeClr val="tx1"/>
+                </a:solidFill>
+                <a:latin typeface="Courier" charset="0"/>
+                <a:ea typeface="Courier" charset="0"/>
+                <a:cs typeface="Courier" charset="0"/>
+              </a:rPr>
+              <a:t> </a:t>
+            </a:r>
+            <a:r>
+              <a:rPr lang="en-US" dirty="0" err="1">
+                <a:solidFill>
+                  <a:schemeClr val="tx1"/>
+                </a:solidFill>
+                <a:latin typeface="Courier" charset="0"/>
+                <a:ea typeface="Courier" charset="0"/>
+                <a:cs typeface="Courier" charset="0"/>
+              </a:rPr>
+              <a:t>ntpdate</a:t>
+            </a:r>
+            <a:r>
+              <a:rPr lang="en-US" dirty="0">
+                <a:solidFill>
+                  <a:schemeClr val="tx1"/>
+                </a:solidFill>
+                <a:latin typeface="Courier" charset="0"/>
+                <a:ea typeface="Courier" charset="0"/>
+                <a:cs typeface="Courier" charset="0"/>
+              </a:rPr>
+              <a:t> –u 0.pool.ntp.org</a:t>
+            </a:r>
+          </a:p>
+        </p:txBody>
+      </p:sp>
+      <p:sp>
+        <p:nvSpPr>
+          <p:cNvPr id="5" name="TextBox 4">
+            <a:extLst>
+              <a:ext uri="{FF2B5EF4-FFF2-40B4-BE49-F238E27FC236}">
+                <a16:creationId xmlns:a16="http://schemas.microsoft.com/office/drawing/2014/main" id="{366F2C08-71F6-B143-986F-43BAF9FF8DA8}"/>
+              </a:ext>
+            </a:extLst>
+          </p:cNvPr>
+          <p:cNvSpPr txBox="1"/>
+          <p:nvPr/>
+        </p:nvSpPr>
+        <p:spPr>
+          <a:xfrm>
+            <a:off x="468313" y="2350541"/>
+            <a:ext cx="8613776" cy="446917"/>
+          </a:xfrm>
+          <a:prstGeom prst="rect">
+            <a:avLst/>
+          </a:prstGeom>
+          <a:solidFill>
+            <a:schemeClr val="bg2"/>
+          </a:solidFill>
+        </p:spPr>
+        <p:txBody>
+          <a:bodyPr wrap="square" rtlCol="0">
+            <a:spAutoFit/>
+          </a:bodyPr>
+          <a:lstStyle/>
+          <a:p>
+            <a:r>
+              <a:rPr lang="en-US" dirty="0">
+                <a:solidFill>
+                  <a:schemeClr val="tx1"/>
+                </a:solidFill>
+                <a:latin typeface="Courier" charset="0"/>
+                <a:ea typeface="Courier" charset="0"/>
+                <a:cs typeface="Courier" charset="0"/>
+              </a:rPr>
+              <a:t>$ </a:t>
+            </a:r>
+            <a:r>
+              <a:rPr lang="en-US" dirty="0" err="1">
+                <a:solidFill>
+                  <a:schemeClr val="tx1"/>
+                </a:solidFill>
+                <a:latin typeface="Courier" charset="0"/>
+                <a:ea typeface="Courier" charset="0"/>
+                <a:cs typeface="Courier" charset="0"/>
+              </a:rPr>
+              <a:t>sudo</a:t>
+            </a:r>
+            <a:r>
+              <a:rPr lang="en-US" dirty="0">
+                <a:solidFill>
+                  <a:schemeClr val="tx1"/>
+                </a:solidFill>
+                <a:latin typeface="Courier" charset="0"/>
+                <a:ea typeface="Courier" charset="0"/>
+                <a:cs typeface="Courier" charset="0"/>
+              </a:rPr>
+              <a:t> apt-get install </a:t>
+            </a:r>
+            <a:r>
+              <a:rPr lang="en-US" dirty="0" err="1">
+                <a:solidFill>
+                  <a:schemeClr val="tx1"/>
+                </a:solidFill>
+                <a:latin typeface="Courier" charset="0"/>
+                <a:ea typeface="Courier" charset="0"/>
+                <a:cs typeface="Courier" charset="0"/>
+              </a:rPr>
+              <a:t>ntpdate</a:t>
+            </a:r>
+            <a:endParaRPr lang="en-US" dirty="0">
+              <a:solidFill>
+                <a:schemeClr val="tx1"/>
+              </a:solidFill>
+              <a:latin typeface="Courier" charset="0"/>
+              <a:ea typeface="Courier" charset="0"/>
+              <a:cs typeface="Courier" charset="0"/>
+            </a:endParaRPr>
+          </a:p>
+        </p:txBody>
+      </p:sp>
+    </p:spTree>
+    <p:extLst>
+      <p:ext uri="{BB962C8B-B14F-4D97-AF65-F5344CB8AC3E}">
+        <p14:creationId xmlns:p14="http://schemas.microsoft.com/office/powerpoint/2010/main" val="2127687722"/>
+      </p:ext>
+    </p:extLst>
+  </p:cSld>
+  <p:clrMapOvr>
+    <a:masterClrMapping/>
+  </p:clrMapOvr>
+</p:sld>
+</file>
+
+<file path=ppt/slides/slide23.xml><?xml version="1.0" encoding="utf-8"?>
+<p:sld xmlns:a="http://schemas.openxmlformats.org/drawingml/2006/main" xmlns:r="http://schemas.openxmlformats.org/officeDocument/2006/relationships" xmlns:p="http://schemas.openxmlformats.org/presentationml/2006/main">
+  <p:cSld>
+    <p:spTree>
+      <p:nvGrpSpPr>
+        <p:cNvPr id="1" name=""/>
+        <p:cNvGrpSpPr/>
+        <p:nvPr/>
+      </p:nvGrpSpPr>
+      <p:grpSpPr>
+        <a:xfrm>
+          <a:off x="0" y="0"/>
+          <a:ext cx="0" cy="0"/>
+          <a:chOff x="0" y="0"/>
+          <a:chExt cx="0" cy="0"/>
+        </a:xfrm>
+      </p:grpSpPr>
+      <p:sp>
+        <p:nvSpPr>
+          <p:cNvPr id="2" name="Title 1">
+            <a:extLst>
+              <a:ext uri="{FF2B5EF4-FFF2-40B4-BE49-F238E27FC236}">
+                <a16:creationId xmlns:a16="http://schemas.microsoft.com/office/drawing/2014/main" id="{B285CC9C-6C31-C049-8BAC-EB366CB04ACA}"/>
+              </a:ext>
+            </a:extLst>
+          </p:cNvPr>
+          <p:cNvSpPr>
+            <a:spLocks noGrp="1"/>
+          </p:cNvSpPr>
+          <p:nvPr>
+            <p:ph type="title"/>
+          </p:nvPr>
+        </p:nvSpPr>
+        <p:spPr/>
+        <p:txBody>
+          <a:bodyPr/>
+          <a:lstStyle/>
+          <a:p>
+            <a:r>
+              <a:rPr lang="en-US" dirty="0" err="1"/>
+              <a:t>Systemd-timesyncd</a:t>
+            </a:r>
+            <a:endParaRPr lang="en-US" dirty="0"/>
+          </a:p>
+        </p:txBody>
+      </p:sp>
+      <p:sp>
+        <p:nvSpPr>
+          <p:cNvPr id="3" name="Content Placeholder 2">
+            <a:extLst>
+              <a:ext uri="{FF2B5EF4-FFF2-40B4-BE49-F238E27FC236}">
+                <a16:creationId xmlns:a16="http://schemas.microsoft.com/office/drawing/2014/main" id="{BDBF5135-C04B-3D4C-9819-0A0A2E108C83}"/>
+              </a:ext>
+            </a:extLst>
+          </p:cNvPr>
+          <p:cNvSpPr>
+            <a:spLocks noGrp="1"/>
+          </p:cNvSpPr>
+          <p:nvPr>
+            <p:ph idx="1"/>
+          </p:nvPr>
+        </p:nvSpPr>
+        <p:spPr/>
+        <p:txBody>
+          <a:bodyPr>
+            <a:normAutofit fontScale="77500" lnSpcReduction="20000"/>
+          </a:bodyPr>
+          <a:lstStyle/>
+          <a:p>
+            <a:pPr marL="457200" indent="-457200">
+              <a:buFont typeface="Arial" panose="020B0604020202020204" pitchFamily="34" charset="0"/>
+              <a:buChar char="•"/>
+            </a:pPr>
+            <a:r>
+              <a:rPr lang="en-US" i="1" dirty="0" err="1"/>
+              <a:t>systemd-timesyncd</a:t>
+            </a:r>
+            <a:r>
+              <a:rPr lang="en-US" dirty="0"/>
+              <a:t> is a daemon that implements a simple SNTP client on Linux systems that us new </a:t>
+            </a:r>
+            <a:r>
+              <a:rPr lang="en-US" dirty="0" err="1"/>
+              <a:t>systemd</a:t>
+            </a:r>
+            <a:r>
+              <a:rPr lang="en-US" dirty="0"/>
+              <a:t> design   </a:t>
+            </a:r>
+          </a:p>
+          <a:p>
+            <a:pPr marL="457200" indent="-457200">
+              <a:buFont typeface="Arial" panose="020B0604020202020204" pitchFamily="34" charset="0"/>
+              <a:buChar char="•"/>
+            </a:pPr>
+            <a:r>
+              <a:rPr lang="en-US" i="1" dirty="0" err="1"/>
+              <a:t>systemd-timesyncd</a:t>
+            </a:r>
+            <a:r>
+              <a:rPr lang="en-US" dirty="0"/>
+              <a:t> will read the configuration file from /</a:t>
+            </a:r>
+            <a:r>
+              <a:rPr lang="en-US" dirty="0" err="1"/>
+              <a:t>etc</a:t>
+            </a:r>
+            <a:r>
+              <a:rPr lang="en-US" dirty="0"/>
+              <a:t>/</a:t>
+            </a:r>
+            <a:r>
+              <a:rPr lang="en-US" dirty="0" err="1"/>
+              <a:t>systemd</a:t>
+            </a:r>
+            <a:r>
+              <a:rPr lang="en-US" dirty="0"/>
+              <a:t>/</a:t>
+            </a:r>
+            <a:r>
+              <a:rPr lang="en-US" dirty="0" err="1"/>
+              <a:t>timesyncd.conf</a:t>
+            </a:r>
+            <a:r>
+              <a:rPr lang="en-US" dirty="0"/>
+              <a:t>, which looks like this:</a:t>
+            </a:r>
+          </a:p>
+          <a:p>
+            <a:pPr marL="457200" indent="-457200">
+              <a:buFont typeface="Arial" panose="020B0604020202020204" pitchFamily="34" charset="0"/>
+              <a:buChar char="•"/>
+            </a:pPr>
+            <a:endParaRPr lang="en-US" dirty="0"/>
+          </a:p>
+          <a:p>
+            <a:pPr marL="457200" indent="-457200">
+              <a:buFont typeface="Arial" panose="020B0604020202020204" pitchFamily="34" charset="0"/>
+              <a:buChar char="•"/>
+            </a:pPr>
+            <a:endParaRPr lang="en-US" dirty="0"/>
+          </a:p>
+          <a:p>
+            <a:pPr marL="457200" indent="-457200">
+              <a:buFont typeface="Arial" panose="020B0604020202020204" pitchFamily="34" charset="0"/>
+              <a:buChar char="•"/>
+            </a:pPr>
+            <a:endParaRPr lang="en-US" dirty="0"/>
+          </a:p>
+          <a:p>
+            <a:pPr marL="457200" indent="-457200">
+              <a:buFont typeface="Arial" panose="020B0604020202020204" pitchFamily="34" charset="0"/>
+              <a:buChar char="•"/>
+            </a:pPr>
+            <a:endParaRPr lang="en-US" dirty="0"/>
+          </a:p>
+          <a:p>
+            <a:pPr marL="457200" indent="-457200">
+              <a:buFont typeface="Arial" panose="020B0604020202020204" pitchFamily="34" charset="0"/>
+              <a:buChar char="•"/>
+            </a:pPr>
+            <a:r>
+              <a:rPr lang="en-US" dirty="0"/>
+              <a:t>To add time servers or change the provided ones, uncomment the relevant line and list their host name or IP separated by a space.</a:t>
+            </a:r>
+          </a:p>
+          <a:p>
+            <a:pPr marL="457200" indent="-457200">
+              <a:buFont typeface="Arial" panose="020B0604020202020204" pitchFamily="34" charset="0"/>
+              <a:buChar char="•"/>
+            </a:pPr>
+            <a:endParaRPr lang="en-US" dirty="0"/>
+          </a:p>
+        </p:txBody>
+      </p:sp>
+      <p:sp>
+        <p:nvSpPr>
+          <p:cNvPr id="4" name="TextBox 3">
+            <a:extLst>
+              <a:ext uri="{FF2B5EF4-FFF2-40B4-BE49-F238E27FC236}">
+                <a16:creationId xmlns:a16="http://schemas.microsoft.com/office/drawing/2014/main" id="{17059B29-956F-F548-974F-6E26D7B2988E}"/>
+              </a:ext>
+            </a:extLst>
+          </p:cNvPr>
+          <p:cNvSpPr txBox="1"/>
+          <p:nvPr/>
+        </p:nvSpPr>
+        <p:spPr>
+          <a:xfrm>
+            <a:off x="468313" y="3170237"/>
+            <a:ext cx="9102726" cy="1539973"/>
+          </a:xfrm>
+          <a:prstGeom prst="rect">
+            <a:avLst/>
+          </a:prstGeom>
+          <a:solidFill>
+            <a:schemeClr val="bg2"/>
+          </a:solidFill>
+        </p:spPr>
+        <p:txBody>
+          <a:bodyPr wrap="square" rtlCol="0">
+            <a:spAutoFit/>
+          </a:bodyPr>
+          <a:lstStyle/>
+          <a:p>
+            <a:r>
+              <a:rPr lang="en-US" sz="1800" dirty="0"/>
+              <a:t>[</a:t>
+            </a:r>
+            <a:r>
+              <a:rPr lang="en-US" sz="1600" dirty="0"/>
+              <a:t>Time] </a:t>
+            </a:r>
+          </a:p>
+          <a:p>
+            <a:r>
+              <a:rPr lang="en-US" sz="1600" dirty="0"/>
+              <a:t>#NTP= </a:t>
+            </a:r>
+          </a:p>
+          <a:p>
+            <a:r>
+              <a:rPr lang="en-US" sz="1600" dirty="0"/>
+              <a:t>#</a:t>
+            </a:r>
+            <a:r>
+              <a:rPr lang="en-US" sz="1600" dirty="0" err="1"/>
+              <a:t>FallbackNTP</a:t>
+            </a:r>
+            <a:r>
+              <a:rPr lang="en-US" sz="1600" dirty="0"/>
+              <a:t>=0.arch.pool.ntp.org 1.arch.pool.ntp.org 2.arch.pool.ntp.org 3.arch.pool.ntp.org </a:t>
+            </a:r>
+          </a:p>
+          <a:p>
+            <a:r>
+              <a:rPr lang="en-US" sz="1600" dirty="0"/>
+              <a:t>#</a:t>
+            </a:r>
+            <a:r>
+              <a:rPr lang="en-US" sz="1600" dirty="0" err="1"/>
+              <a:t>RootDistanceMaxSec</a:t>
+            </a:r>
+            <a:r>
+              <a:rPr lang="en-US" sz="1600" dirty="0"/>
+              <a:t>=5 </a:t>
+            </a:r>
+          </a:p>
+          <a:p>
+            <a:r>
+              <a:rPr lang="en-US" sz="1600" dirty="0"/>
+              <a:t>#</a:t>
+            </a:r>
+            <a:r>
+              <a:rPr lang="en-US" sz="1600" dirty="0" err="1"/>
+              <a:t>PollIntervalMinSec</a:t>
+            </a:r>
+            <a:r>
+              <a:rPr lang="en-US" sz="1600" dirty="0"/>
+              <a:t>=32 </a:t>
+            </a:r>
+          </a:p>
+          <a:p>
+            <a:r>
+              <a:rPr lang="en-US" sz="1600" dirty="0"/>
+              <a:t>#</a:t>
+            </a:r>
+            <a:r>
+              <a:rPr lang="en-US" sz="1600" dirty="0" err="1"/>
+              <a:t>PollIntervalMaxSec</a:t>
+            </a:r>
+            <a:r>
+              <a:rPr lang="en-US" sz="1600" dirty="0"/>
+              <a:t>=2048</a:t>
+            </a:r>
+            <a:endParaRPr lang="en-US" sz="1600" dirty="0">
+              <a:latin typeface="Courier" charset="0"/>
+              <a:ea typeface="Courier" charset="0"/>
+              <a:cs typeface="Courier" charset="0"/>
+            </a:endParaRPr>
+          </a:p>
+        </p:txBody>
+      </p:sp>
+    </p:spTree>
+    <p:extLst>
+      <p:ext uri="{BB962C8B-B14F-4D97-AF65-F5344CB8AC3E}">
+        <p14:creationId xmlns:p14="http://schemas.microsoft.com/office/powerpoint/2010/main" val="2252590735"/>
+      </p:ext>
+    </p:extLst>
+  </p:cSld>
+  <p:clrMapOvr>
+    <a:masterClrMapping/>
+  </p:clrMapOvr>
+</p:sld>
+</file>
+
+<file path=ppt/slides/slide24.xml><?xml version="1.0" encoding="utf-8"?>
+<p:sld xmlns:a="http://schemas.openxmlformats.org/drawingml/2006/main" xmlns:r="http://schemas.openxmlformats.org/officeDocument/2006/relationships" xmlns:p="http://schemas.openxmlformats.org/presentationml/2006/main">
+  <p:cSld>
+    <p:spTree>
+      <p:nvGrpSpPr>
+        <p:cNvPr id="1" name=""/>
+        <p:cNvGrpSpPr/>
+        <p:nvPr/>
+      </p:nvGrpSpPr>
+      <p:grpSpPr>
+        <a:xfrm>
+          <a:off x="0" y="0"/>
+          <a:ext cx="0" cy="0"/>
+          <a:chOff x="0" y="0"/>
+          <a:chExt cx="0" cy="0"/>
+        </a:xfrm>
+      </p:grpSpPr>
+      <p:sp>
+        <p:nvSpPr>
+          <p:cNvPr id="2" name="Title 1">
+            <a:extLst>
+              <a:ext uri="{FF2B5EF4-FFF2-40B4-BE49-F238E27FC236}">
+                <a16:creationId xmlns:a16="http://schemas.microsoft.com/office/drawing/2014/main" id="{B2D15390-DBEE-5746-BE97-EAB9D97D1892}"/>
+              </a:ext>
+            </a:extLst>
+          </p:cNvPr>
+          <p:cNvSpPr>
+            <a:spLocks noGrp="1"/>
+          </p:cNvSpPr>
+          <p:nvPr>
+            <p:ph type="title"/>
+          </p:nvPr>
+        </p:nvSpPr>
+        <p:spPr/>
+        <p:txBody>
+          <a:bodyPr/>
+          <a:lstStyle/>
+          <a:p>
+            <a:r>
+              <a:rPr lang="en-US" dirty="0" err="1"/>
+              <a:t>Systemd-timesyncd</a:t>
+            </a:r>
+            <a:endParaRPr lang="en-US" dirty="0"/>
+          </a:p>
+        </p:txBody>
+      </p:sp>
+      <p:sp>
+        <p:nvSpPr>
+          <p:cNvPr id="3" name="Content Placeholder 2">
+            <a:extLst>
+              <a:ext uri="{FF2B5EF4-FFF2-40B4-BE49-F238E27FC236}">
+                <a16:creationId xmlns:a16="http://schemas.microsoft.com/office/drawing/2014/main" id="{39591183-32BA-A04D-B850-691E27E75E72}"/>
+              </a:ext>
+            </a:extLst>
+          </p:cNvPr>
+          <p:cNvSpPr>
+            <a:spLocks noGrp="1"/>
+          </p:cNvSpPr>
+          <p:nvPr>
+            <p:ph idx="1"/>
+          </p:nvPr>
+        </p:nvSpPr>
+        <p:spPr>
+          <a:xfrm>
+            <a:off x="503238" y="1257300"/>
+            <a:ext cx="9067800" cy="5495925"/>
+          </a:xfrm>
+        </p:spPr>
+        <p:txBody>
+          <a:bodyPr/>
+          <a:lstStyle/>
+          <a:p>
+            <a:pPr marL="457200" indent="-457200">
+              <a:buFont typeface="Arial" panose="020B0604020202020204" pitchFamily="34" charset="0"/>
+              <a:buChar char="•"/>
+            </a:pPr>
+            <a:r>
+              <a:rPr lang="en-US" dirty="0"/>
+              <a:t>Enabling the Service</a:t>
+            </a:r>
+          </a:p>
+          <a:p>
+            <a:pPr marL="0" indent="0"/>
+            <a:endParaRPr lang="en-US" dirty="0"/>
+          </a:p>
+          <a:p>
+            <a:pPr marL="457200" indent="-457200">
+              <a:buFont typeface="Arial" panose="020B0604020202020204" pitchFamily="34" charset="0"/>
+              <a:buChar char="•"/>
+            </a:pPr>
+            <a:r>
+              <a:rPr lang="en-US" dirty="0"/>
+              <a:t>Or</a:t>
+            </a:r>
+          </a:p>
+          <a:p>
+            <a:pPr marL="457200" indent="-457200">
+              <a:buFont typeface="Arial" panose="020B0604020202020204" pitchFamily="34" charset="0"/>
+              <a:buChar char="•"/>
+            </a:pPr>
+            <a:r>
+              <a:rPr lang="en-US" dirty="0"/>
+              <a:t> To check the service status, use;</a:t>
+            </a:r>
+          </a:p>
+          <a:p>
+            <a:pPr marL="457200" indent="-457200">
+              <a:buFont typeface="Arial" panose="020B0604020202020204" pitchFamily="34" charset="0"/>
+              <a:buChar char="•"/>
+            </a:pPr>
+            <a:endParaRPr lang="en-US" dirty="0"/>
+          </a:p>
+          <a:p>
+            <a:pPr marL="0" indent="0"/>
+            <a:endParaRPr lang="en-US" dirty="0"/>
+          </a:p>
+          <a:p>
+            <a:pPr marL="457200" indent="-457200">
+              <a:buFont typeface="Arial" panose="020B0604020202020204" pitchFamily="34" charset="0"/>
+              <a:buChar char="•"/>
+            </a:pPr>
+            <a:r>
+              <a:rPr lang="en-US" dirty="0"/>
+              <a:t>To see verbose service information, use</a:t>
+            </a:r>
+          </a:p>
+          <a:p>
+            <a:pPr marL="457200" indent="-457200">
+              <a:buFont typeface="Arial" panose="020B0604020202020204" pitchFamily="34" charset="0"/>
+              <a:buChar char="•"/>
+            </a:pPr>
+            <a:endParaRPr lang="en-US" dirty="0"/>
+          </a:p>
+        </p:txBody>
+      </p:sp>
+      <p:sp>
+        <p:nvSpPr>
+          <p:cNvPr id="4" name="TextBox 3">
+            <a:extLst>
+              <a:ext uri="{FF2B5EF4-FFF2-40B4-BE49-F238E27FC236}">
+                <a16:creationId xmlns:a16="http://schemas.microsoft.com/office/drawing/2014/main" id="{96491121-9FBB-9842-A949-FBDEE10C090D}"/>
+              </a:ext>
+            </a:extLst>
+          </p:cNvPr>
+          <p:cNvSpPr txBox="1"/>
+          <p:nvPr/>
+        </p:nvSpPr>
+        <p:spPr>
+          <a:xfrm>
+            <a:off x="503238" y="1785551"/>
+            <a:ext cx="8648701" cy="1156086"/>
+          </a:xfrm>
+          <a:prstGeom prst="rect">
+            <a:avLst/>
+          </a:prstGeom>
+          <a:solidFill>
+            <a:schemeClr val="bg2"/>
+          </a:solidFill>
+        </p:spPr>
+        <p:txBody>
+          <a:bodyPr wrap="square" rtlCol="0">
+            <a:spAutoFit/>
+          </a:bodyPr>
+          <a:lstStyle/>
+          <a:p>
+            <a:r>
+              <a:rPr lang="en-US" dirty="0">
+                <a:latin typeface="Courier" charset="0"/>
+              </a:rPr>
+              <a:t>$ </a:t>
+            </a:r>
+            <a:r>
+              <a:rPr lang="en-US" dirty="0" err="1">
+                <a:latin typeface="Courier" charset="0"/>
+              </a:rPr>
+              <a:t>sudo</a:t>
+            </a:r>
+            <a:r>
+              <a:rPr lang="en-US" dirty="0">
+                <a:latin typeface="Courier" charset="0"/>
+              </a:rPr>
+              <a:t> </a:t>
+            </a:r>
+            <a:r>
+              <a:rPr lang="en-US" dirty="0" err="1"/>
+              <a:t>timedatectl</a:t>
+            </a:r>
+            <a:r>
+              <a:rPr lang="en-US" dirty="0"/>
+              <a:t> set-</a:t>
+            </a:r>
+            <a:r>
+              <a:rPr lang="en-US" dirty="0" err="1"/>
+              <a:t>ntp</a:t>
+            </a:r>
+            <a:r>
+              <a:rPr lang="en-US" dirty="0"/>
+              <a:t> true</a:t>
+            </a:r>
+            <a:endParaRPr lang="en-US" dirty="0">
+              <a:latin typeface="Courier" charset="0"/>
+              <a:ea typeface="Courier" charset="0"/>
+              <a:cs typeface="Courier" charset="0"/>
+            </a:endParaRPr>
+          </a:p>
+          <a:p>
+            <a:r>
+              <a:rPr lang="en-US" dirty="0">
+                <a:latin typeface="Courier" charset="0"/>
+                <a:ea typeface="Courier" charset="0"/>
+                <a:cs typeface="Courier" charset="0"/>
+              </a:rPr>
+              <a:t>OR </a:t>
+            </a:r>
+          </a:p>
+          <a:p>
+            <a:r>
+              <a:rPr lang="en-US" dirty="0"/>
+              <a:t>$ </a:t>
+            </a:r>
+            <a:r>
+              <a:rPr lang="en-US" dirty="0" err="1"/>
+              <a:t>sudo</a:t>
+            </a:r>
+            <a:r>
+              <a:rPr lang="en-US" dirty="0"/>
+              <a:t> </a:t>
+            </a:r>
+            <a:r>
+              <a:rPr lang="en-US" dirty="0" err="1"/>
+              <a:t>systemctl</a:t>
+            </a:r>
+            <a:r>
+              <a:rPr lang="en-US" dirty="0"/>
+              <a:t> start </a:t>
+            </a:r>
+            <a:r>
+              <a:rPr lang="en-US" dirty="0" err="1"/>
+              <a:t>systemd-timesyncd</a:t>
+            </a:r>
+            <a:endParaRPr lang="en-US" dirty="0"/>
+          </a:p>
+        </p:txBody>
+      </p:sp>
+      <p:sp>
+        <p:nvSpPr>
+          <p:cNvPr id="5" name="TextBox 4">
+            <a:extLst>
+              <a:ext uri="{FF2B5EF4-FFF2-40B4-BE49-F238E27FC236}">
+                <a16:creationId xmlns:a16="http://schemas.microsoft.com/office/drawing/2014/main" id="{392824B2-2DCC-8D49-A130-28EF7E88FD4A}"/>
+              </a:ext>
+            </a:extLst>
+          </p:cNvPr>
+          <p:cNvSpPr txBox="1"/>
+          <p:nvPr/>
+        </p:nvSpPr>
+        <p:spPr>
+          <a:xfrm>
+            <a:off x="503238" y="3691345"/>
+            <a:ext cx="8648701" cy="1156086"/>
+          </a:xfrm>
+          <a:prstGeom prst="rect">
+            <a:avLst/>
+          </a:prstGeom>
+          <a:solidFill>
+            <a:schemeClr val="bg2"/>
+          </a:solidFill>
+        </p:spPr>
+        <p:txBody>
+          <a:bodyPr wrap="square" rtlCol="0">
+            <a:spAutoFit/>
+          </a:bodyPr>
+          <a:lstStyle/>
+          <a:p>
+            <a:r>
+              <a:rPr lang="en-US" dirty="0"/>
+              <a:t>$ </a:t>
+            </a:r>
+            <a:r>
+              <a:rPr lang="en-US" dirty="0" err="1"/>
+              <a:t>timedatectl</a:t>
+            </a:r>
+            <a:r>
+              <a:rPr lang="en-US" dirty="0"/>
+              <a:t> status</a:t>
+            </a:r>
+          </a:p>
+          <a:p>
+            <a:r>
+              <a:rPr lang="en-US" dirty="0">
+                <a:latin typeface="Courier" charset="0"/>
+                <a:ea typeface="Courier" charset="0"/>
+                <a:cs typeface="Courier" charset="0"/>
+              </a:rPr>
+              <a:t>OR</a:t>
+            </a:r>
+          </a:p>
+          <a:p>
+            <a:r>
+              <a:rPr lang="en-US" dirty="0"/>
+              <a:t>$ </a:t>
+            </a:r>
+            <a:r>
+              <a:rPr lang="en-US" dirty="0" err="1"/>
+              <a:t>sudo</a:t>
+            </a:r>
+            <a:r>
+              <a:rPr lang="en-US" dirty="0"/>
+              <a:t> </a:t>
+            </a:r>
+            <a:r>
+              <a:rPr lang="en-US" dirty="0" err="1"/>
+              <a:t>systemctl</a:t>
+            </a:r>
+            <a:r>
+              <a:rPr lang="en-US" dirty="0"/>
+              <a:t> status </a:t>
+            </a:r>
+            <a:r>
+              <a:rPr lang="en-US" dirty="0" err="1"/>
+              <a:t>systemd-timesyncd</a:t>
+            </a:r>
+            <a:endParaRPr lang="en-US" dirty="0"/>
+          </a:p>
+        </p:txBody>
+      </p:sp>
+      <p:sp>
+        <p:nvSpPr>
+          <p:cNvPr id="6" name="TextBox 5">
+            <a:extLst>
+              <a:ext uri="{FF2B5EF4-FFF2-40B4-BE49-F238E27FC236}">
+                <a16:creationId xmlns:a16="http://schemas.microsoft.com/office/drawing/2014/main" id="{CCDBC7B5-EAC6-D94E-8433-571D2162A4C0}"/>
+              </a:ext>
+            </a:extLst>
+          </p:cNvPr>
+          <p:cNvSpPr txBox="1"/>
+          <p:nvPr/>
+        </p:nvSpPr>
+        <p:spPr>
+          <a:xfrm>
+            <a:off x="468313" y="5654158"/>
+            <a:ext cx="8683626" cy="450573"/>
+          </a:xfrm>
+          <a:prstGeom prst="rect">
+            <a:avLst/>
+          </a:prstGeom>
+          <a:solidFill>
+            <a:schemeClr val="bg2"/>
+          </a:solidFill>
+        </p:spPr>
+        <p:txBody>
+          <a:bodyPr wrap="square" rtlCol="0">
+            <a:spAutoFit/>
+          </a:bodyPr>
+          <a:lstStyle/>
+          <a:p>
+            <a:r>
+              <a:rPr lang="en-US" dirty="0"/>
+              <a:t>$ </a:t>
+            </a:r>
+            <a:r>
+              <a:rPr lang="en-US" dirty="0" err="1"/>
+              <a:t>timedatectl</a:t>
+            </a:r>
+            <a:r>
+              <a:rPr lang="en-US" dirty="0"/>
+              <a:t> </a:t>
+            </a:r>
+            <a:r>
+              <a:rPr lang="en-US" dirty="0" err="1"/>
+              <a:t>timesync</a:t>
+            </a:r>
+            <a:r>
+              <a:rPr lang="en-US" dirty="0"/>
+              <a:t>-status</a:t>
+            </a:r>
+            <a:endParaRPr lang="en-US" dirty="0">
+              <a:latin typeface="Courier" charset="0"/>
+              <a:ea typeface="Courier" charset="0"/>
+              <a:cs typeface="Courier" charset="0"/>
+            </a:endParaRPr>
+          </a:p>
+        </p:txBody>
+      </p:sp>
+    </p:spTree>
+    <p:extLst>
+      <p:ext uri="{BB962C8B-B14F-4D97-AF65-F5344CB8AC3E}">
+        <p14:creationId xmlns:p14="http://schemas.microsoft.com/office/powerpoint/2010/main" val="3499500226"/>
+      </p:ext>
+    </p:extLst>
+  </p:cSld>
+  <p:clrMapOvr>
+    <a:masterClrMapping/>
+  </p:clrMapOvr>
+</p:sld>
+</file>
+
+<file path=ppt/slides/slide25.xml><?xml version="1.0" encoding="utf-8"?>
 <p:sld xmlns:a="http://schemas.openxmlformats.org/drawingml/2006/main" xmlns:r="http://schemas.openxmlformats.org/officeDocument/2006/relationships" xmlns:p="http://schemas.openxmlformats.org/presentationml/2006/main">
   <p:cSld>
     <p:bg>
@@ -29544,14 +30698,14 @@
           <a:effectLst/>
           <a:extLst>
             <a:ext uri="{909E8E84-426E-40dd-AFC4-6F175D3DCCD1}">
-              <a14:hiddenFill xmlns:a14="http://schemas.microsoft.com/office/drawing/2010/main" xmlns="">
+              <a14:hiddenFill xmlns="" xmlns:a14="http://schemas.microsoft.com/office/drawing/2010/main">
                 <a:solidFill>
                   <a:srgbClr val="FFFFFF"/>
                 </a:solidFill>
               </a14:hiddenFill>
             </a:ext>
             <a:ext uri="{91240B29-F687-4f45-9708-019B960494DF}">
-              <a14:hiddenLine xmlns:a14="http://schemas.microsoft.com/office/drawing/2010/main" xmlns="" w="9525" cap="flat">
+              <a14:hiddenLine xmlns="" xmlns:a14="http://schemas.microsoft.com/office/drawing/2010/main" w="9525" cap="flat">
                 <a:solidFill>
                   <a:srgbClr val="3465A4"/>
                 </a:solidFill>
@@ -29561,7 +30715,7 @@
               </a14:hiddenLine>
             </a:ext>
             <a:ext uri="{AF507438-7753-43e0-B8FC-AC1667EBCBE1}">
-              <a14:hiddenEffects xmlns:a14="http://schemas.microsoft.com/office/drawing/2010/main" xmlns="">
+              <a14:hiddenEffects xmlns="" xmlns:a14="http://schemas.microsoft.com/office/drawing/2010/main">
                 <a:effectLst>
                   <a:outerShdw blurRad="63500" dist="38099" dir="2700000" algn="ctr" rotWithShape="0">
                     <a:srgbClr val="000000">
@@ -29973,14 +31127,14 @@
           <a:effectLst/>
           <a:extLst>
             <a:ext uri="{909E8E84-426E-40dd-AFC4-6F175D3DCCD1}">
-              <a14:hiddenFill xmlns:a14="http://schemas.microsoft.com/office/drawing/2010/main" xmlns="">
+              <a14:hiddenFill xmlns="" xmlns:a14="http://schemas.microsoft.com/office/drawing/2010/main">
                 <a:solidFill>
                   <a:srgbClr val="FFFFFF"/>
                 </a:solidFill>
               </a14:hiddenFill>
             </a:ext>
             <a:ext uri="{91240B29-F687-4f45-9708-019B960494DF}">
-              <a14:hiddenLine xmlns:a14="http://schemas.microsoft.com/office/drawing/2010/main" xmlns="" w="9525" cap="flat">
+              <a14:hiddenLine xmlns="" xmlns:a14="http://schemas.microsoft.com/office/drawing/2010/main" w="9525" cap="flat">
                 <a:solidFill>
                   <a:srgbClr val="3465A4"/>
                 </a:solidFill>
@@ -29990,7 +31144,7 @@
               </a14:hiddenLine>
             </a:ext>
             <a:ext uri="{AF507438-7753-43e0-B8FC-AC1667EBCBE1}">
-              <a14:hiddenEffects xmlns:a14="http://schemas.microsoft.com/office/drawing/2010/main" xmlns="">
+              <a14:hiddenEffects xmlns="" xmlns:a14="http://schemas.microsoft.com/office/drawing/2010/main">
                 <a:effectLst>
                   <a:outerShdw blurRad="63500" dist="38099" dir="2700000" algn="ctr" rotWithShape="0">
                     <a:srgbClr val="000000">
@@ -30101,14 +31255,14 @@
           <a:effectLst/>
           <a:extLst>
             <a:ext uri="{909E8E84-426E-40dd-AFC4-6F175D3DCCD1}">
-              <a14:hiddenFill xmlns:a14="http://schemas.microsoft.com/office/drawing/2010/main" xmlns="">
+              <a14:hiddenFill xmlns="" xmlns:a14="http://schemas.microsoft.com/office/drawing/2010/main">
                 <a:solidFill>
                   <a:srgbClr val="FFFFFF"/>
                 </a:solidFill>
               </a14:hiddenFill>
             </a:ext>
             <a:ext uri="{91240B29-F687-4f45-9708-019B960494DF}">
-              <a14:hiddenLine xmlns:a14="http://schemas.microsoft.com/office/drawing/2010/main" xmlns="" w="9525" cap="flat">
+              <a14:hiddenLine xmlns="" xmlns:a14="http://schemas.microsoft.com/office/drawing/2010/main" w="9525" cap="flat">
                 <a:solidFill>
                   <a:srgbClr val="3465A4"/>
                 </a:solidFill>
@@ -30118,7 +31272,7 @@
               </a14:hiddenLine>
             </a:ext>
             <a:ext uri="{AF507438-7753-43e0-B8FC-AC1667EBCBE1}">
-              <a14:hiddenEffects xmlns:a14="http://schemas.microsoft.com/office/drawing/2010/main" xmlns="">
+              <a14:hiddenEffects xmlns="" xmlns:a14="http://schemas.microsoft.com/office/drawing/2010/main">
                 <a:effectLst>
                   <a:outerShdw blurRad="63500" dist="38099" dir="2700000" algn="ctr" rotWithShape="0">
                     <a:srgbClr val="000000">
@@ -30530,14 +31684,14 @@
           <a:effectLst/>
           <a:extLst>
             <a:ext uri="{909E8E84-426E-40dd-AFC4-6F175D3DCCD1}">
-              <a14:hiddenFill xmlns:a14="http://schemas.microsoft.com/office/drawing/2010/main" xmlns="">
+              <a14:hiddenFill xmlns="" xmlns:a14="http://schemas.microsoft.com/office/drawing/2010/main">
                 <a:solidFill>
                   <a:srgbClr val="FFFFFF"/>
                 </a:solidFill>
               </a14:hiddenFill>
             </a:ext>
             <a:ext uri="{91240B29-F687-4f45-9708-019B960494DF}">
-              <a14:hiddenLine xmlns:a14="http://schemas.microsoft.com/office/drawing/2010/main" xmlns="" w="9525" cap="flat">
+              <a14:hiddenLine xmlns="" xmlns:a14="http://schemas.microsoft.com/office/drawing/2010/main" w="9525" cap="flat">
                 <a:solidFill>
                   <a:srgbClr val="3465A4"/>
                 </a:solidFill>
@@ -30547,7 +31701,7 @@
               </a14:hiddenLine>
             </a:ext>
             <a:ext uri="{AF507438-7753-43e0-B8FC-AC1667EBCBE1}">
-              <a14:hiddenEffects xmlns:a14="http://schemas.microsoft.com/office/drawing/2010/main" xmlns="">
+              <a14:hiddenEffects xmlns="" xmlns:a14="http://schemas.microsoft.com/office/drawing/2010/main">
                 <a:effectLst>
                   <a:outerShdw blurRad="63500" dist="38099" dir="2700000" algn="ctr" rotWithShape="0">
                     <a:srgbClr val="000000">
@@ -31144,14 +32298,14 @@
           <a:effectLst/>
           <a:extLst>
             <a:ext uri="{909E8E84-426E-40dd-AFC4-6F175D3DCCD1}">
-              <a14:hiddenFill xmlns:a14="http://schemas.microsoft.com/office/drawing/2010/main" xmlns="">
+              <a14:hiddenFill xmlns="" xmlns:a14="http://schemas.microsoft.com/office/drawing/2010/main">
                 <a:solidFill>
                   <a:srgbClr val="FFFFFF"/>
                 </a:solidFill>
               </a14:hiddenFill>
             </a:ext>
             <a:ext uri="{91240B29-F687-4f45-9708-019B960494DF}">
-              <a14:hiddenLine xmlns:a14="http://schemas.microsoft.com/office/drawing/2010/main" xmlns="" w="9525" cap="flat">
+              <a14:hiddenLine xmlns="" xmlns:a14="http://schemas.microsoft.com/office/drawing/2010/main" w="9525" cap="flat">
                 <a:solidFill>
                   <a:srgbClr val="3465A4"/>
                 </a:solidFill>
@@ -31161,7 +32315,7 @@
               </a14:hiddenLine>
             </a:ext>
             <a:ext uri="{AF507438-7753-43e0-B8FC-AC1667EBCBE1}">
-              <a14:hiddenEffects xmlns:a14="http://schemas.microsoft.com/office/drawing/2010/main" xmlns="">
+              <a14:hiddenEffects xmlns="" xmlns:a14="http://schemas.microsoft.com/office/drawing/2010/main">
                 <a:effectLst>
                   <a:outerShdw blurRad="63500" dist="38099" dir="2700000" algn="ctr" rotWithShape="0">
                     <a:srgbClr val="000000">
@@ -31573,14 +32727,14 @@
           <a:effectLst/>
           <a:extLst>
             <a:ext uri="{909E8E84-426E-40dd-AFC4-6F175D3DCCD1}">
-              <a14:hiddenFill xmlns:a14="http://schemas.microsoft.com/office/drawing/2010/main" xmlns="">
+              <a14:hiddenFill xmlns="" xmlns:a14="http://schemas.microsoft.com/office/drawing/2010/main">
                 <a:solidFill>
                   <a:srgbClr val="FFFFFF"/>
                 </a:solidFill>
               </a14:hiddenFill>
             </a:ext>
             <a:ext uri="{91240B29-F687-4f45-9708-019B960494DF}">
-              <a14:hiddenLine xmlns:a14="http://schemas.microsoft.com/office/drawing/2010/main" xmlns="" w="9525" cap="flat">
+              <a14:hiddenLine xmlns="" xmlns:a14="http://schemas.microsoft.com/office/drawing/2010/main" w="9525" cap="flat">
                 <a:solidFill>
                   <a:srgbClr val="3465A4"/>
                 </a:solidFill>
@@ -31590,7 +32744,7 @@
               </a14:hiddenLine>
             </a:ext>
             <a:ext uri="{AF507438-7753-43e0-B8FC-AC1667EBCBE1}">
-              <a14:hiddenEffects xmlns:a14="http://schemas.microsoft.com/office/drawing/2010/main" xmlns="">
+              <a14:hiddenEffects xmlns="" xmlns:a14="http://schemas.microsoft.com/office/drawing/2010/main">
                 <a:effectLst>
                   <a:outerShdw blurRad="63500" dist="38099" dir="2700000" algn="ctr" rotWithShape="0">
                     <a:srgbClr val="000000">
@@ -32176,14 +33330,14 @@
           <a:effectLst/>
           <a:extLst>
             <a:ext uri="{909E8E84-426E-40dd-AFC4-6F175D3DCCD1}">
-              <a14:hiddenFill xmlns:a14="http://schemas.microsoft.com/office/drawing/2010/main" xmlns="">
+              <a14:hiddenFill xmlns="" xmlns:a14="http://schemas.microsoft.com/office/drawing/2010/main">
                 <a:solidFill>
                   <a:srgbClr val="FFFFFF"/>
                 </a:solidFill>
               </a14:hiddenFill>
             </a:ext>
             <a:ext uri="{91240B29-F687-4f45-9708-019B960494DF}">
-              <a14:hiddenLine xmlns:a14="http://schemas.microsoft.com/office/drawing/2010/main" xmlns="" w="9525" cap="flat">
+              <a14:hiddenLine xmlns="" xmlns:a14="http://schemas.microsoft.com/office/drawing/2010/main" w="9525" cap="flat">
                 <a:solidFill>
                   <a:srgbClr val="3465A4"/>
                 </a:solidFill>
@@ -32193,7 +33347,7 @@
               </a14:hiddenLine>
             </a:ext>
             <a:ext uri="{AF507438-7753-43e0-B8FC-AC1667EBCBE1}">
-              <a14:hiddenEffects xmlns:a14="http://schemas.microsoft.com/office/drawing/2010/main" xmlns="">
+              <a14:hiddenEffects xmlns="" xmlns:a14="http://schemas.microsoft.com/office/drawing/2010/main">
                 <a:effectLst>
                   <a:outerShdw blurRad="63500" dist="38099" dir="2700000" algn="ctr" rotWithShape="0">
                     <a:srgbClr val="000000">
@@ -32605,14 +33759,14 @@
           <a:effectLst/>
           <a:extLst>
             <a:ext uri="{909E8E84-426E-40dd-AFC4-6F175D3DCCD1}">
-              <a14:hiddenFill xmlns:a14="http://schemas.microsoft.com/office/drawing/2010/main" xmlns="">
+              <a14:hiddenFill xmlns="" xmlns:a14="http://schemas.microsoft.com/office/drawing/2010/main">
                 <a:solidFill>
                   <a:srgbClr val="FFFFFF"/>
                 </a:solidFill>
               </a14:hiddenFill>
             </a:ext>
             <a:ext uri="{91240B29-F687-4f45-9708-019B960494DF}">
-              <a14:hiddenLine xmlns:a14="http://schemas.microsoft.com/office/drawing/2010/main" xmlns="" w="9525" cap="flat">
+              <a14:hiddenLine xmlns="" xmlns:a14="http://schemas.microsoft.com/office/drawing/2010/main" w="9525" cap="flat">
                 <a:solidFill>
                   <a:srgbClr val="3465A4"/>
                 </a:solidFill>
@@ -32622,7 +33776,7 @@
               </a14:hiddenLine>
             </a:ext>
             <a:ext uri="{AF507438-7753-43e0-B8FC-AC1667EBCBE1}">
-              <a14:hiddenEffects xmlns:a14="http://schemas.microsoft.com/office/drawing/2010/main" xmlns="">
+              <a14:hiddenEffects xmlns="" xmlns:a14="http://schemas.microsoft.com/office/drawing/2010/main">
                 <a:effectLst>
                   <a:outerShdw blurRad="63500" dist="38099" dir="2700000" algn="ctr" rotWithShape="0">
                     <a:srgbClr val="000000">
@@ -33163,14 +34317,14 @@
           <a:effectLst/>
           <a:extLst>
             <a:ext uri="{909E8E84-426E-40dd-AFC4-6F175D3DCCD1}">
-              <a14:hiddenFill xmlns:a14="http://schemas.microsoft.com/office/drawing/2010/main" xmlns="">
+              <a14:hiddenFill xmlns="" xmlns:a14="http://schemas.microsoft.com/office/drawing/2010/main">
                 <a:solidFill>
                   <a:srgbClr val="FFFFFF"/>
                 </a:solidFill>
               </a14:hiddenFill>
             </a:ext>
             <a:ext uri="{91240B29-F687-4f45-9708-019B960494DF}">
-              <a14:hiddenLine xmlns:a14="http://schemas.microsoft.com/office/drawing/2010/main" xmlns="" w="9525" cap="flat">
+              <a14:hiddenLine xmlns="" xmlns:a14="http://schemas.microsoft.com/office/drawing/2010/main" w="9525" cap="flat">
                 <a:solidFill>
                   <a:srgbClr val="3465A4"/>
                 </a:solidFill>
@@ -33180,7 +34334,7 @@
               </a14:hiddenLine>
             </a:ext>
             <a:ext uri="{AF507438-7753-43e0-B8FC-AC1667EBCBE1}">
-              <a14:hiddenEffects xmlns:a14="http://schemas.microsoft.com/office/drawing/2010/main" xmlns="">
+              <a14:hiddenEffects xmlns="" xmlns:a14="http://schemas.microsoft.com/office/drawing/2010/main">
                 <a:effectLst>
                   <a:outerShdw blurRad="63500" dist="38099" dir="2700000" algn="ctr" rotWithShape="0">
                     <a:srgbClr val="000000">
@@ -33592,14 +34746,14 @@
           <a:effectLst/>
           <a:extLst>
             <a:ext uri="{909E8E84-426E-40dd-AFC4-6F175D3DCCD1}">
-              <a14:hiddenFill xmlns:a14="http://schemas.microsoft.com/office/drawing/2010/main" xmlns="">
+              <a14:hiddenFill xmlns="" xmlns:a14="http://schemas.microsoft.com/office/drawing/2010/main">
                 <a:solidFill>
                   <a:srgbClr val="FFFFFF"/>
                 </a:solidFill>
               </a14:hiddenFill>
             </a:ext>
             <a:ext uri="{91240B29-F687-4f45-9708-019B960494DF}">
-              <a14:hiddenLine xmlns:a14="http://schemas.microsoft.com/office/drawing/2010/main" xmlns="" w="9525" cap="flat">
+              <a14:hiddenLine xmlns="" xmlns:a14="http://schemas.microsoft.com/office/drawing/2010/main" w="9525" cap="flat">
                 <a:solidFill>
                   <a:srgbClr val="3465A4"/>
                 </a:solidFill>
@@ -33609,7 +34763,7 @@
               </a14:hiddenLine>
             </a:ext>
             <a:ext uri="{AF507438-7753-43e0-B8FC-AC1667EBCBE1}">
-              <a14:hiddenEffects xmlns:a14="http://schemas.microsoft.com/office/drawing/2010/main" xmlns="">
+              <a14:hiddenEffects xmlns="" xmlns:a14="http://schemas.microsoft.com/office/drawing/2010/main">
                 <a:effectLst>
                   <a:outerShdw blurRad="63500" dist="38099" dir="2700000" algn="ctr" rotWithShape="0">
                     <a:srgbClr val="000000">
@@ -34052,14 +35206,14 @@
           <a:effectLst/>
           <a:extLst>
             <a:ext uri="{909E8E84-426E-40dd-AFC4-6F175D3DCCD1}">
-              <a14:hiddenFill xmlns:a14="http://schemas.microsoft.com/office/drawing/2010/main" xmlns="">
+              <a14:hiddenFill xmlns="" xmlns:a14="http://schemas.microsoft.com/office/drawing/2010/main">
                 <a:solidFill>
                   <a:srgbClr val="FFFFFF"/>
                 </a:solidFill>
               </a14:hiddenFill>
             </a:ext>
             <a:ext uri="{91240B29-F687-4f45-9708-019B960494DF}">
-              <a14:hiddenLine xmlns:a14="http://schemas.microsoft.com/office/drawing/2010/main" xmlns="" w="9525" cap="flat">
+              <a14:hiddenLine xmlns="" xmlns:a14="http://schemas.microsoft.com/office/drawing/2010/main" w="9525" cap="flat">
                 <a:solidFill>
                   <a:srgbClr val="3465A4"/>
                 </a:solidFill>
@@ -34069,7 +35223,7 @@
               </a14:hiddenLine>
             </a:ext>
             <a:ext uri="{AF507438-7753-43e0-B8FC-AC1667EBCBE1}">
-              <a14:hiddenEffects xmlns:a14="http://schemas.microsoft.com/office/drawing/2010/main" xmlns="">
+              <a14:hiddenEffects xmlns="" xmlns:a14="http://schemas.microsoft.com/office/drawing/2010/main">
                 <a:effectLst>
                   <a:outerShdw blurRad="63500" dist="38099" dir="2700000" algn="ctr" rotWithShape="0">
                     <a:srgbClr val="000000">
@@ -34488,14 +35642,14 @@
           <a:effectLst/>
           <a:extLst>
             <a:ext uri="{909E8E84-426E-40dd-AFC4-6F175D3DCCD1}">
-              <a14:hiddenFill xmlns:a14="http://schemas.microsoft.com/office/drawing/2010/main" xmlns="">
+              <a14:hiddenFill xmlns="" xmlns:a14="http://schemas.microsoft.com/office/drawing/2010/main">
                 <a:solidFill>
                   <a:srgbClr val="FFFFFF"/>
                 </a:solidFill>
               </a14:hiddenFill>
             </a:ext>
             <a:ext uri="{91240B29-F687-4f45-9708-019B960494DF}">
-              <a14:hiddenLine xmlns:a14="http://schemas.microsoft.com/office/drawing/2010/main" xmlns="" w="9525" cap="flat">
+              <a14:hiddenLine xmlns="" xmlns:a14="http://schemas.microsoft.com/office/drawing/2010/main" w="9525" cap="flat">
                 <a:solidFill>
                   <a:srgbClr val="3465A4"/>
                 </a:solidFill>
@@ -34505,7 +35659,7 @@
               </a14:hiddenLine>
             </a:ext>
             <a:ext uri="{AF507438-7753-43e0-B8FC-AC1667EBCBE1}">
-              <a14:hiddenEffects xmlns:a14="http://schemas.microsoft.com/office/drawing/2010/main" xmlns="">
+              <a14:hiddenEffects xmlns="" xmlns:a14="http://schemas.microsoft.com/office/drawing/2010/main">
                 <a:effectLst>
                   <a:outerShdw blurRad="63500" dist="38099" dir="2700000" algn="ctr" rotWithShape="0">
                     <a:srgbClr val="000000">
@@ -34924,14 +36078,14 @@
           <a:effectLst/>
           <a:extLst>
             <a:ext uri="{909E8E84-426E-40dd-AFC4-6F175D3DCCD1}">
-              <a14:hiddenFill xmlns:a14="http://schemas.microsoft.com/office/drawing/2010/main" xmlns="">
+              <a14:hiddenFill xmlns="" xmlns:a14="http://schemas.microsoft.com/office/drawing/2010/main">
                 <a:solidFill>
                   <a:srgbClr val="FFFFFF"/>
                 </a:solidFill>
               </a14:hiddenFill>
             </a:ext>
             <a:ext uri="{91240B29-F687-4f45-9708-019B960494DF}">
-              <a14:hiddenLine xmlns:a14="http://schemas.microsoft.com/office/drawing/2010/main" xmlns="" w="9525" cap="flat">
+              <a14:hiddenLine xmlns="" xmlns:a14="http://schemas.microsoft.com/office/drawing/2010/main" w="9525" cap="flat">
                 <a:solidFill>
                   <a:srgbClr val="3465A4"/>
                 </a:solidFill>
@@ -34941,7 +36095,7 @@
               </a14:hiddenLine>
             </a:ext>
             <a:ext uri="{AF507438-7753-43e0-B8FC-AC1667EBCBE1}">
-              <a14:hiddenEffects xmlns:a14="http://schemas.microsoft.com/office/drawing/2010/main" xmlns="">
+              <a14:hiddenEffects xmlns="" xmlns:a14="http://schemas.microsoft.com/office/drawing/2010/main">
                 <a:effectLst>
                   <a:outerShdw blurRad="63500" dist="38099" dir="2700000" algn="ctr" rotWithShape="0">
                     <a:srgbClr val="000000">
@@ -35360,14 +36514,14 @@
           <a:effectLst/>
           <a:extLst>
             <a:ext uri="{909E8E84-426E-40dd-AFC4-6F175D3DCCD1}">
-              <a14:hiddenFill xmlns:a14="http://schemas.microsoft.com/office/drawing/2010/main" xmlns="">
+              <a14:hiddenFill xmlns="" xmlns:a14="http://schemas.microsoft.com/office/drawing/2010/main">
                 <a:solidFill>
                   <a:srgbClr val="FFFFFF"/>
                 </a:solidFill>
               </a14:hiddenFill>
             </a:ext>
             <a:ext uri="{91240B29-F687-4f45-9708-019B960494DF}">
-              <a14:hiddenLine xmlns:a14="http://schemas.microsoft.com/office/drawing/2010/main" xmlns="" w="9525" cap="flat">
+              <a14:hiddenLine xmlns="" xmlns:a14="http://schemas.microsoft.com/office/drawing/2010/main" w="9525" cap="flat">
                 <a:solidFill>
                   <a:srgbClr val="3465A4"/>
                 </a:solidFill>
@@ -35377,7 +36531,7 @@
               </a14:hiddenLine>
             </a:ext>
             <a:ext uri="{AF507438-7753-43e0-B8FC-AC1667EBCBE1}">
-              <a14:hiddenEffects xmlns:a14="http://schemas.microsoft.com/office/drawing/2010/main" xmlns="">
+              <a14:hiddenEffects xmlns="" xmlns:a14="http://schemas.microsoft.com/office/drawing/2010/main">
                 <a:effectLst>
                   <a:outerShdw blurRad="63500" dist="38099" dir="2700000" algn="ctr" rotWithShape="0">
                     <a:srgbClr val="000000">
@@ -35871,7 +37025,7 @@
           <a:effectLst/>
           <a:extLst>
             <a:ext uri="{AF507438-7753-43e0-B8FC-AC1667EBCBE1}">
-              <a14:hiddenEffects xmlns:a14="http://schemas.microsoft.com/office/drawing/2010/main" xmlns="">
+              <a14:hiddenEffects xmlns="" xmlns:a14="http://schemas.microsoft.com/office/drawing/2010/main">
                 <a:effectLst>
                   <a:outerShdw blurRad="63500" dist="38099" dir="2700000" algn="ctr" rotWithShape="0">
                     <a:schemeClr val="bg2">
@@ -35947,14 +37101,14 @@
           <a:effectLst/>
           <a:extLst>
             <a:ext uri="{909E8E84-426E-40dd-AFC4-6F175D3DCCD1}">
-              <a14:hiddenFill xmlns:a14="http://schemas.microsoft.com/office/drawing/2010/main" xmlns="">
+              <a14:hiddenFill xmlns="" xmlns:a14="http://schemas.microsoft.com/office/drawing/2010/main">
                 <a:solidFill>
                   <a:srgbClr val="FFFFFF"/>
                 </a:solidFill>
               </a14:hiddenFill>
             </a:ext>
             <a:ext uri="{91240B29-F687-4f45-9708-019B960494DF}">
-              <a14:hiddenLine xmlns:a14="http://schemas.microsoft.com/office/drawing/2010/main" xmlns="" w="9525" cap="flat">
+              <a14:hiddenLine xmlns="" xmlns:a14="http://schemas.microsoft.com/office/drawing/2010/main" w="9525" cap="flat">
                 <a:solidFill>
                   <a:srgbClr val="3465A4"/>
                 </a:solidFill>
@@ -35964,7 +37118,7 @@
               </a14:hiddenLine>
             </a:ext>
             <a:ext uri="{AF507438-7753-43e0-B8FC-AC1667EBCBE1}">
-              <a14:hiddenEffects xmlns:a14="http://schemas.microsoft.com/office/drawing/2010/main" xmlns="">
+              <a14:hiddenEffects xmlns="" xmlns:a14="http://schemas.microsoft.com/office/drawing/2010/main">
                 <a:effectLst>
                   <a:outerShdw blurRad="63500" dist="38099" dir="2700000" algn="ctr" rotWithShape="0">
                     <a:srgbClr val="000000">
@@ -36382,7 +37536,7 @@
           <a:effectLst/>
           <a:extLst>
             <a:ext uri="{AF507438-7753-43e0-B8FC-AC1667EBCBE1}">
-              <a14:hiddenEffects xmlns:a14="http://schemas.microsoft.com/office/drawing/2010/main" xmlns="">
+              <a14:hiddenEffects xmlns="" xmlns:a14="http://schemas.microsoft.com/office/drawing/2010/main">
                 <a:effectLst>
                   <a:outerShdw blurRad="63500" dist="38099" dir="2700000" algn="ctr" rotWithShape="0">
                     <a:schemeClr val="bg2">
@@ -36464,7 +37618,7 @@
           <a:effectLst/>
           <a:extLst>
             <a:ext uri="{AF507438-7753-43e0-B8FC-AC1667EBCBE1}">
-              <a14:hiddenEffects xmlns:a14="http://schemas.microsoft.com/office/drawing/2010/main" xmlns="">
+              <a14:hiddenEffects xmlns="" xmlns:a14="http://schemas.microsoft.com/office/drawing/2010/main">
                 <a:effectLst>
                   <a:outerShdw blurRad="63500" dist="38099" dir="2700000" algn="ctr" rotWithShape="0">
                     <a:schemeClr val="bg2">
@@ -36546,7 +37700,7 @@
           <a:effectLst/>
           <a:extLst>
             <a:ext uri="{AF507438-7753-43e0-B8FC-AC1667EBCBE1}">
-              <a14:hiddenEffects xmlns:a14="http://schemas.microsoft.com/office/drawing/2010/main" xmlns="">
+              <a14:hiddenEffects xmlns="" xmlns:a14="http://schemas.microsoft.com/office/drawing/2010/main">
                 <a:effectLst>
                   <a:outerShdw blurRad="63500" dist="38099" dir="2700000" algn="ctr" rotWithShape="0">
                     <a:schemeClr val="bg2">
@@ -36628,7 +37782,7 @@
           <a:effectLst/>
           <a:extLst>
             <a:ext uri="{AF507438-7753-43e0-B8FC-AC1667EBCBE1}">
-              <a14:hiddenEffects xmlns:a14="http://schemas.microsoft.com/office/drawing/2010/main" xmlns="">
+              <a14:hiddenEffects xmlns="" xmlns:a14="http://schemas.microsoft.com/office/drawing/2010/main">
                 <a:effectLst>
                   <a:outerShdw blurRad="63500" dist="38099" dir="2700000" algn="ctr" rotWithShape="0">
                     <a:schemeClr val="bg2">
@@ -36710,7 +37864,7 @@
           <a:effectLst/>
           <a:extLst>
             <a:ext uri="{AF507438-7753-43e0-B8FC-AC1667EBCBE1}">
-              <a14:hiddenEffects xmlns:a14="http://schemas.microsoft.com/office/drawing/2010/main" xmlns="">
+              <a14:hiddenEffects xmlns="" xmlns:a14="http://schemas.microsoft.com/office/drawing/2010/main">
                 <a:effectLst>
                   <a:outerShdw blurRad="63500" dist="38099" dir="2700000" algn="ctr" rotWithShape="0">
                     <a:schemeClr val="bg2">
@@ -36792,7 +37946,7 @@
           <a:effectLst/>
           <a:extLst>
             <a:ext uri="{AF507438-7753-43e0-B8FC-AC1667EBCBE1}">
-              <a14:hiddenEffects xmlns:a14="http://schemas.microsoft.com/office/drawing/2010/main" xmlns="">
+              <a14:hiddenEffects xmlns="" xmlns:a14="http://schemas.microsoft.com/office/drawing/2010/main">
                 <a:effectLst>
                   <a:outerShdw blurRad="63500" dist="38099" dir="2700000" algn="ctr" rotWithShape="0">
                     <a:schemeClr val="bg2">
@@ -36874,7 +38028,7 @@
           <a:effectLst/>
           <a:extLst>
             <a:ext uri="{AF507438-7753-43e0-B8FC-AC1667EBCBE1}">
-              <a14:hiddenEffects xmlns:a14="http://schemas.microsoft.com/office/drawing/2010/main" xmlns="">
+              <a14:hiddenEffects xmlns="" xmlns:a14="http://schemas.microsoft.com/office/drawing/2010/main">
                 <a:effectLst>
                   <a:outerShdw blurRad="63500" dist="38099" dir="2700000" algn="ctr" rotWithShape="0">
                     <a:schemeClr val="bg2">
@@ -36916,7 +38070,7 @@
           <a:effectLst/>
           <a:extLst>
             <a:ext uri="{AF507438-7753-43e0-B8FC-AC1667EBCBE1}">
-              <a14:hiddenEffects xmlns:a14="http://schemas.microsoft.com/office/drawing/2010/main" xmlns="">
+              <a14:hiddenEffects xmlns="" xmlns:a14="http://schemas.microsoft.com/office/drawing/2010/main">
                 <a:effectLst>
                   <a:outerShdw blurRad="63500" dist="38099" dir="2700000" algn="ctr" rotWithShape="0">
                     <a:schemeClr val="bg2">
@@ -36958,7 +38112,7 @@
           <a:effectLst/>
           <a:extLst>
             <a:ext uri="{AF507438-7753-43e0-B8FC-AC1667EBCBE1}">
-              <a14:hiddenEffects xmlns:a14="http://schemas.microsoft.com/office/drawing/2010/main" xmlns="">
+              <a14:hiddenEffects xmlns="" xmlns:a14="http://schemas.microsoft.com/office/drawing/2010/main">
                 <a:effectLst>
                   <a:outerShdw blurRad="63500" dist="38099" dir="2700000" algn="ctr" rotWithShape="0">
                     <a:schemeClr val="bg2">
@@ -37000,7 +38154,7 @@
           <a:effectLst/>
           <a:extLst>
             <a:ext uri="{AF507438-7753-43e0-B8FC-AC1667EBCBE1}">
-              <a14:hiddenEffects xmlns:a14="http://schemas.microsoft.com/office/drawing/2010/main" xmlns="">
+              <a14:hiddenEffects xmlns="" xmlns:a14="http://schemas.microsoft.com/office/drawing/2010/main">
                 <a:effectLst>
                   <a:outerShdw blurRad="63500" dist="38099" dir="2700000" algn="ctr" rotWithShape="0">
                     <a:schemeClr val="bg2">
@@ -37042,7 +38196,7 @@
           <a:effectLst/>
           <a:extLst>
             <a:ext uri="{AF507438-7753-43e0-B8FC-AC1667EBCBE1}">
-              <a14:hiddenEffects xmlns:a14="http://schemas.microsoft.com/office/drawing/2010/main" xmlns="">
+              <a14:hiddenEffects xmlns="" xmlns:a14="http://schemas.microsoft.com/office/drawing/2010/main">
                 <a:effectLst>
                   <a:outerShdw blurRad="63500" dist="38099" dir="2700000" algn="ctr" rotWithShape="0">
                     <a:schemeClr val="bg2">
@@ -37084,7 +38238,7 @@
           <a:effectLst/>
           <a:extLst>
             <a:ext uri="{AF507438-7753-43e0-B8FC-AC1667EBCBE1}">
-              <a14:hiddenEffects xmlns:a14="http://schemas.microsoft.com/office/drawing/2010/main" xmlns="">
+              <a14:hiddenEffects xmlns="" xmlns:a14="http://schemas.microsoft.com/office/drawing/2010/main">
                 <a:effectLst>
                   <a:outerShdw blurRad="63500" dist="38099" dir="2700000" algn="ctr" rotWithShape="0">
                     <a:schemeClr val="bg2">
@@ -37258,7 +38412,7 @@
           <a:effectLst/>
           <a:extLst>
             <a:ext uri="{AF507438-7753-43e0-B8FC-AC1667EBCBE1}">
-              <a14:hiddenEffects xmlns:a14="http://schemas.microsoft.com/office/drawing/2010/main" xmlns="">
+              <a14:hiddenEffects xmlns="" xmlns:a14="http://schemas.microsoft.com/office/drawing/2010/main">
                 <a:effectLst>
                   <a:outerShdw blurRad="63500" dist="38099" dir="2700000" algn="ctr" rotWithShape="0">
                     <a:schemeClr val="bg2">
@@ -37340,7 +38494,7 @@
           <a:effectLst/>
           <a:extLst>
             <a:ext uri="{AF507438-7753-43e0-B8FC-AC1667EBCBE1}">
-              <a14:hiddenEffects xmlns:a14="http://schemas.microsoft.com/office/drawing/2010/main" xmlns="">
+              <a14:hiddenEffects xmlns="" xmlns:a14="http://schemas.microsoft.com/office/drawing/2010/main">
                 <a:effectLst>
                   <a:outerShdw blurRad="63500" dist="38099" dir="2700000" algn="ctr" rotWithShape="0">
                     <a:schemeClr val="bg2">
@@ -37422,7 +38576,7 @@
           <a:effectLst/>
           <a:extLst>
             <a:ext uri="{AF507438-7753-43e0-B8FC-AC1667EBCBE1}">
-              <a14:hiddenEffects xmlns:a14="http://schemas.microsoft.com/office/drawing/2010/main" xmlns="">
+              <a14:hiddenEffects xmlns="" xmlns:a14="http://schemas.microsoft.com/office/drawing/2010/main">
                 <a:effectLst>
                   <a:outerShdw blurRad="63500" dist="38099" dir="2700000" algn="ctr" rotWithShape="0">
                     <a:schemeClr val="bg2">
@@ -37504,7 +38658,7 @@
           <a:effectLst/>
           <a:extLst>
             <a:ext uri="{AF507438-7753-43e0-B8FC-AC1667EBCBE1}">
-              <a14:hiddenEffects xmlns:a14="http://schemas.microsoft.com/office/drawing/2010/main" xmlns="">
+              <a14:hiddenEffects xmlns="" xmlns:a14="http://schemas.microsoft.com/office/drawing/2010/main">
                 <a:effectLst>
                   <a:outerShdw blurRad="63500" dist="38099" dir="2700000" algn="ctr" rotWithShape="0">
                     <a:schemeClr val="bg2">
@@ -37586,7 +38740,7 @@
           <a:effectLst/>
           <a:extLst>
             <a:ext uri="{AF507438-7753-43e0-B8FC-AC1667EBCBE1}">
-              <a14:hiddenEffects xmlns:a14="http://schemas.microsoft.com/office/drawing/2010/main" xmlns="">
+              <a14:hiddenEffects xmlns="" xmlns:a14="http://schemas.microsoft.com/office/drawing/2010/main">
                 <a:effectLst>
                   <a:outerShdw blurRad="63500" dist="38099" dir="2700000" algn="ctr" rotWithShape="0">
                     <a:schemeClr val="bg2">
@@ -37668,7 +38822,7 @@
           <a:effectLst/>
           <a:extLst>
             <a:ext uri="{AF507438-7753-43e0-B8FC-AC1667EBCBE1}">
-              <a14:hiddenEffects xmlns:a14="http://schemas.microsoft.com/office/drawing/2010/main" xmlns="">
+              <a14:hiddenEffects xmlns="" xmlns:a14="http://schemas.microsoft.com/office/drawing/2010/main">
                 <a:effectLst>
                   <a:outerShdw blurRad="63500" dist="38099" dir="2700000" algn="ctr" rotWithShape="0">
                     <a:schemeClr val="bg2">
@@ -37750,7 +38904,7 @@
           <a:effectLst/>
           <a:extLst>
             <a:ext uri="{AF507438-7753-43e0-B8FC-AC1667EBCBE1}">
-              <a14:hiddenEffects xmlns:a14="http://schemas.microsoft.com/office/drawing/2010/main" xmlns="">
+              <a14:hiddenEffects xmlns="" xmlns:a14="http://schemas.microsoft.com/office/drawing/2010/main">
                 <a:effectLst>
                   <a:outerShdw blurRad="63500" dist="38099" dir="2700000" algn="ctr" rotWithShape="0">
                     <a:schemeClr val="bg2">
@@ -37792,7 +38946,7 @@
           <a:effectLst/>
           <a:extLst>
             <a:ext uri="{AF507438-7753-43e0-B8FC-AC1667EBCBE1}">
-              <a14:hiddenEffects xmlns:a14="http://schemas.microsoft.com/office/drawing/2010/main" xmlns="">
+              <a14:hiddenEffects xmlns="" xmlns:a14="http://schemas.microsoft.com/office/drawing/2010/main">
                 <a:effectLst>
                   <a:outerShdw blurRad="63500" dist="38099" dir="2700000" algn="ctr" rotWithShape="0">
                     <a:schemeClr val="bg2">
@@ -37834,7 +38988,7 @@
           <a:effectLst/>
           <a:extLst>
             <a:ext uri="{AF507438-7753-43e0-B8FC-AC1667EBCBE1}">
-              <a14:hiddenEffects xmlns:a14="http://schemas.microsoft.com/office/drawing/2010/main" xmlns="">
+              <a14:hiddenEffects xmlns="" xmlns:a14="http://schemas.microsoft.com/office/drawing/2010/main">
                 <a:effectLst>
                   <a:outerShdw blurRad="63500" dist="38099" dir="2700000" algn="ctr" rotWithShape="0">
                     <a:schemeClr val="bg2">
@@ -37876,7 +39030,7 @@
           <a:effectLst/>
           <a:extLst>
             <a:ext uri="{AF507438-7753-43e0-B8FC-AC1667EBCBE1}">
-              <a14:hiddenEffects xmlns:a14="http://schemas.microsoft.com/office/drawing/2010/main" xmlns="">
+              <a14:hiddenEffects xmlns="" xmlns:a14="http://schemas.microsoft.com/office/drawing/2010/main">
                 <a:effectLst>
                   <a:outerShdw blurRad="63500" dist="38099" dir="2700000" algn="ctr" rotWithShape="0">
                     <a:schemeClr val="bg2">
@@ -37918,7 +39072,7 @@
           <a:effectLst/>
           <a:extLst>
             <a:ext uri="{AF507438-7753-43e0-B8FC-AC1667EBCBE1}">
-              <a14:hiddenEffects xmlns:a14="http://schemas.microsoft.com/office/drawing/2010/main" xmlns="">
+              <a14:hiddenEffects xmlns="" xmlns:a14="http://schemas.microsoft.com/office/drawing/2010/main">
                 <a:effectLst>
                   <a:outerShdw blurRad="63500" dist="38099" dir="2700000" algn="ctr" rotWithShape="0">
                     <a:schemeClr val="bg2">
@@ -37960,7 +39114,7 @@
           <a:effectLst/>
           <a:extLst>
             <a:ext uri="{AF507438-7753-43e0-B8FC-AC1667EBCBE1}">
-              <a14:hiddenEffects xmlns:a14="http://schemas.microsoft.com/office/drawing/2010/main" xmlns="">
+              <a14:hiddenEffects xmlns="" xmlns:a14="http://schemas.microsoft.com/office/drawing/2010/main">
                 <a:effectLst>
                   <a:outerShdw blurRad="63500" dist="38099" dir="2700000" algn="ctr" rotWithShape="0">
                     <a:schemeClr val="bg2">
@@ -38002,7 +39156,7 @@
           <a:effectLst/>
           <a:extLst>
             <a:ext uri="{AF507438-7753-43e0-B8FC-AC1667EBCBE1}">
-              <a14:hiddenEffects xmlns:a14="http://schemas.microsoft.com/office/drawing/2010/main" xmlns="">
+              <a14:hiddenEffects xmlns="" xmlns:a14="http://schemas.microsoft.com/office/drawing/2010/main">
                 <a:effectLst>
                   <a:outerShdw blurRad="63500" dist="38099" dir="2700000" algn="ctr" rotWithShape="0">
                     <a:schemeClr val="bg2">
@@ -38110,7 +39264,7 @@
           <a:effectLst/>
           <a:extLst>
             <a:ext uri="{AF507438-7753-43e0-B8FC-AC1667EBCBE1}">
-              <a14:hiddenEffects xmlns:a14="http://schemas.microsoft.com/office/drawing/2010/main" xmlns="">
+              <a14:hiddenEffects xmlns="" xmlns:a14="http://schemas.microsoft.com/office/drawing/2010/main">
                 <a:effectLst>
                   <a:outerShdw blurRad="63500" dist="38099" dir="2700000" algn="ctr" rotWithShape="0">
                     <a:schemeClr val="bg2">
@@ -38152,7 +39306,7 @@
           <a:effectLst/>
           <a:extLst>
             <a:ext uri="{AF507438-7753-43e0-B8FC-AC1667EBCBE1}">
-              <a14:hiddenEffects xmlns:a14="http://schemas.microsoft.com/office/drawing/2010/main" xmlns="">
+              <a14:hiddenEffects xmlns="" xmlns:a14="http://schemas.microsoft.com/office/drawing/2010/main">
                 <a:effectLst>
                   <a:outerShdw blurRad="63500" dist="38099" dir="2700000" algn="ctr" rotWithShape="0">
                     <a:schemeClr val="bg2">
@@ -38194,7 +39348,7 @@
           <a:effectLst/>
           <a:extLst>
             <a:ext uri="{AF507438-7753-43e0-B8FC-AC1667EBCBE1}">
-              <a14:hiddenEffects xmlns:a14="http://schemas.microsoft.com/office/drawing/2010/main" xmlns="">
+              <a14:hiddenEffects xmlns="" xmlns:a14="http://schemas.microsoft.com/office/drawing/2010/main">
                 <a:effectLst>
                   <a:outerShdw blurRad="63500" dist="38099" dir="2700000" algn="ctr" rotWithShape="0">
                     <a:schemeClr val="bg2">
@@ -38277,7 +39431,7 @@
           <a:effectLst/>
           <a:extLst>
             <a:ext uri="{AF507438-7753-43e0-B8FC-AC1667EBCBE1}">
-              <a14:hiddenEffects xmlns:a14="http://schemas.microsoft.com/office/drawing/2010/main" xmlns="">
+              <a14:hiddenEffects xmlns="" xmlns:a14="http://schemas.microsoft.com/office/drawing/2010/main">
                 <a:effectLst>
                   <a:outerShdw blurRad="63500" dist="38099" dir="2700000" algn="ctr" rotWithShape="0">
                     <a:schemeClr val="bg2">
@@ -38322,7 +39476,7 @@
           <a:effectLst/>
           <a:extLst>
             <a:ext uri="{AF507438-7753-43e0-B8FC-AC1667EBCBE1}">
-              <a14:hiddenEffects xmlns:a14="http://schemas.microsoft.com/office/drawing/2010/main" xmlns="">
+              <a14:hiddenEffects xmlns="" xmlns:a14="http://schemas.microsoft.com/office/drawing/2010/main">
                 <a:effectLst>
                   <a:outerShdw blurRad="63500" dist="38099" dir="2700000" algn="ctr" rotWithShape="0">
                     <a:schemeClr val="bg2">
@@ -38984,7 +40138,7 @@
         <a:effectLst/>
         <a:extLst>
           <a:ext uri="{AF507438-7753-43e0-B8FC-AC1667EBCBE1}">
-            <a14:hiddenEffects xmlns:a14="http://schemas.microsoft.com/office/drawing/2010/main" xmlns="">
+            <a14:hiddenEffects xmlns="" xmlns:a14="http://schemas.microsoft.com/office/drawing/2010/main">
               <a:effectLst>
                 <a:outerShdw blurRad="63500" dist="38099" dir="2700000" algn="ctr" rotWithShape="0">
                   <a:schemeClr val="bg2">
@@ -39063,7 +40217,7 @@
         <a:effectLst/>
         <a:extLst>
           <a:ext uri="{AF507438-7753-43e0-B8FC-AC1667EBCBE1}">
-            <a14:hiddenEffects xmlns:a14="http://schemas.microsoft.com/office/drawing/2010/main" xmlns="">
+            <a14:hiddenEffects xmlns="" xmlns:a14="http://schemas.microsoft.com/office/drawing/2010/main">
               <a:effectLst>
                 <a:outerShdw blurRad="63500" dist="38099" dir="2700000" algn="ctr" rotWithShape="0">
                   <a:schemeClr val="bg2">

</xml_diff>